<commit_message>
TB added. Source code compiles successfully. Simulation WIP
</commit_message>
<xml_diff>
--- a/Block diagram.pptx
+++ b/Block diagram.pptx
@@ -6,10 +6,11 @@
   </p:sldMasterIdLst>
   <p:sldIdLst>
     <p:sldId id="258" r:id="rId2"/>
-    <p:sldId id="257" r:id="rId3"/>
-    <p:sldId id="260" r:id="rId4"/>
-    <p:sldId id="262" r:id="rId5"/>
-    <p:sldId id="263" r:id="rId6"/>
+    <p:sldId id="264" r:id="rId3"/>
+    <p:sldId id="257" r:id="rId4"/>
+    <p:sldId id="260" r:id="rId5"/>
+    <p:sldId id="262" r:id="rId6"/>
+    <p:sldId id="263" r:id="rId7"/>
   </p:sldIdLst>
   <p:sldSz cx="12192000" cy="6858000"/>
   <p:notesSz cx="6858000" cy="9144000"/>
@@ -247,7 +248,7 @@
           <a:p>
             <a:fld id="{24A49771-5452-4D9A-8E7A-D408295BE7A1}" type="datetimeFigureOut">
               <a:rPr lang="en-GB" smtClean="0"/>
-              <a:t>10/11/2020</a:t>
+              <a:t>15/11/2020</a:t>
             </a:fld>
             <a:endParaRPr lang="en-GB"/>
           </a:p>
@@ -289,7 +290,7 @@
           <a:p>
             <a:fld id="{7901E498-D8D8-45FF-A431-0926372A905E}" type="slidenum">
               <a:rPr lang="en-GB" smtClean="0"/>
-              <a:t>‹Nr.›</a:t>
+              <a:t>‹Nº›</a:t>
             </a:fld>
             <a:endParaRPr lang="en-GB"/>
           </a:p>
@@ -417,7 +418,7 @@
           <a:p>
             <a:fld id="{24A49771-5452-4D9A-8E7A-D408295BE7A1}" type="datetimeFigureOut">
               <a:rPr lang="en-GB" smtClean="0"/>
-              <a:t>10/11/2020</a:t>
+              <a:t>15/11/2020</a:t>
             </a:fld>
             <a:endParaRPr lang="en-GB"/>
           </a:p>
@@ -459,7 +460,7 @@
           <a:p>
             <a:fld id="{7901E498-D8D8-45FF-A431-0926372A905E}" type="slidenum">
               <a:rPr lang="en-GB" smtClean="0"/>
-              <a:t>‹Nr.›</a:t>
+              <a:t>‹Nº›</a:t>
             </a:fld>
             <a:endParaRPr lang="en-GB"/>
           </a:p>
@@ -597,7 +598,7 @@
           <a:p>
             <a:fld id="{24A49771-5452-4D9A-8E7A-D408295BE7A1}" type="datetimeFigureOut">
               <a:rPr lang="en-GB" smtClean="0"/>
-              <a:t>10/11/2020</a:t>
+              <a:t>15/11/2020</a:t>
             </a:fld>
             <a:endParaRPr lang="en-GB"/>
           </a:p>
@@ -639,7 +640,7 @@
           <a:p>
             <a:fld id="{7901E498-D8D8-45FF-A431-0926372A905E}" type="slidenum">
               <a:rPr lang="en-GB" smtClean="0"/>
-              <a:t>‹Nr.›</a:t>
+              <a:t>‹Nº›</a:t>
             </a:fld>
             <a:endParaRPr lang="en-GB"/>
           </a:p>
@@ -767,7 +768,7 @@
           <a:p>
             <a:fld id="{24A49771-5452-4D9A-8E7A-D408295BE7A1}" type="datetimeFigureOut">
               <a:rPr lang="en-GB" smtClean="0"/>
-              <a:t>10/11/2020</a:t>
+              <a:t>15/11/2020</a:t>
             </a:fld>
             <a:endParaRPr lang="en-GB"/>
           </a:p>
@@ -809,7 +810,7 @@
           <a:p>
             <a:fld id="{7901E498-D8D8-45FF-A431-0926372A905E}" type="slidenum">
               <a:rPr lang="en-GB" smtClean="0"/>
-              <a:t>‹Nr.›</a:t>
+              <a:t>‹Nº›</a:t>
             </a:fld>
             <a:endParaRPr lang="en-GB"/>
           </a:p>
@@ -1013,7 +1014,7 @@
           <a:p>
             <a:fld id="{24A49771-5452-4D9A-8E7A-D408295BE7A1}" type="datetimeFigureOut">
               <a:rPr lang="en-GB" smtClean="0"/>
-              <a:t>10/11/2020</a:t>
+              <a:t>15/11/2020</a:t>
             </a:fld>
             <a:endParaRPr lang="en-GB"/>
           </a:p>
@@ -1055,7 +1056,7 @@
           <a:p>
             <a:fld id="{7901E498-D8D8-45FF-A431-0926372A905E}" type="slidenum">
               <a:rPr lang="en-GB" smtClean="0"/>
-              <a:t>‹Nr.›</a:t>
+              <a:t>‹Nº›</a:t>
             </a:fld>
             <a:endParaRPr lang="en-GB"/>
           </a:p>
@@ -1245,7 +1246,7 @@
           <a:p>
             <a:fld id="{24A49771-5452-4D9A-8E7A-D408295BE7A1}" type="datetimeFigureOut">
               <a:rPr lang="en-GB" smtClean="0"/>
-              <a:t>10/11/2020</a:t>
+              <a:t>15/11/2020</a:t>
             </a:fld>
             <a:endParaRPr lang="en-GB"/>
           </a:p>
@@ -1287,7 +1288,7 @@
           <a:p>
             <a:fld id="{7901E498-D8D8-45FF-A431-0926372A905E}" type="slidenum">
               <a:rPr lang="en-GB" smtClean="0"/>
-              <a:t>‹Nr.›</a:t>
+              <a:t>‹Nº›</a:t>
             </a:fld>
             <a:endParaRPr lang="en-GB"/>
           </a:p>
@@ -1612,7 +1613,7 @@
           <a:p>
             <a:fld id="{24A49771-5452-4D9A-8E7A-D408295BE7A1}" type="datetimeFigureOut">
               <a:rPr lang="en-GB" smtClean="0"/>
-              <a:t>10/11/2020</a:t>
+              <a:t>15/11/2020</a:t>
             </a:fld>
             <a:endParaRPr lang="en-GB"/>
           </a:p>
@@ -1654,7 +1655,7 @@
           <a:p>
             <a:fld id="{7901E498-D8D8-45FF-A431-0926372A905E}" type="slidenum">
               <a:rPr lang="en-GB" smtClean="0"/>
-              <a:t>‹Nr.›</a:t>
+              <a:t>‹Nº›</a:t>
             </a:fld>
             <a:endParaRPr lang="en-GB"/>
           </a:p>
@@ -1730,7 +1731,7 @@
           <a:p>
             <a:fld id="{24A49771-5452-4D9A-8E7A-D408295BE7A1}" type="datetimeFigureOut">
               <a:rPr lang="en-GB" smtClean="0"/>
-              <a:t>10/11/2020</a:t>
+              <a:t>15/11/2020</a:t>
             </a:fld>
             <a:endParaRPr lang="en-GB"/>
           </a:p>
@@ -1772,7 +1773,7 @@
           <a:p>
             <a:fld id="{7901E498-D8D8-45FF-A431-0926372A905E}" type="slidenum">
               <a:rPr lang="en-GB" smtClean="0"/>
-              <a:t>‹Nr.›</a:t>
+              <a:t>‹Nº›</a:t>
             </a:fld>
             <a:endParaRPr lang="en-GB"/>
           </a:p>
@@ -1825,7 +1826,7 @@
           <a:p>
             <a:fld id="{24A49771-5452-4D9A-8E7A-D408295BE7A1}" type="datetimeFigureOut">
               <a:rPr lang="en-GB" smtClean="0"/>
-              <a:t>10/11/2020</a:t>
+              <a:t>15/11/2020</a:t>
             </a:fld>
             <a:endParaRPr lang="en-GB"/>
           </a:p>
@@ -1867,7 +1868,7 @@
           <a:p>
             <a:fld id="{7901E498-D8D8-45FF-A431-0926372A905E}" type="slidenum">
               <a:rPr lang="en-GB" smtClean="0"/>
-              <a:t>‹Nr.›</a:t>
+              <a:t>‹Nº›</a:t>
             </a:fld>
             <a:endParaRPr lang="en-GB"/>
           </a:p>
@@ -2102,7 +2103,7 @@
           <a:p>
             <a:fld id="{24A49771-5452-4D9A-8E7A-D408295BE7A1}" type="datetimeFigureOut">
               <a:rPr lang="en-GB" smtClean="0"/>
-              <a:t>10/11/2020</a:t>
+              <a:t>15/11/2020</a:t>
             </a:fld>
             <a:endParaRPr lang="en-GB"/>
           </a:p>
@@ -2144,7 +2145,7 @@
           <a:p>
             <a:fld id="{7901E498-D8D8-45FF-A431-0926372A905E}" type="slidenum">
               <a:rPr lang="en-GB" smtClean="0"/>
-              <a:t>‹Nr.›</a:t>
+              <a:t>‹Nº›</a:t>
             </a:fld>
             <a:endParaRPr lang="en-GB"/>
           </a:p>
@@ -2355,7 +2356,7 @@
           <a:p>
             <a:fld id="{24A49771-5452-4D9A-8E7A-D408295BE7A1}" type="datetimeFigureOut">
               <a:rPr lang="en-GB" smtClean="0"/>
-              <a:t>10/11/2020</a:t>
+              <a:t>15/11/2020</a:t>
             </a:fld>
             <a:endParaRPr lang="en-GB"/>
           </a:p>
@@ -2397,7 +2398,7 @@
           <a:p>
             <a:fld id="{7901E498-D8D8-45FF-A431-0926372A905E}" type="slidenum">
               <a:rPr lang="en-GB" smtClean="0"/>
-              <a:t>‹Nr.›</a:t>
+              <a:t>‹Nº›</a:t>
             </a:fld>
             <a:endParaRPr lang="en-GB"/>
           </a:p>
@@ -2568,7 +2569,7 @@
           <a:p>
             <a:fld id="{24A49771-5452-4D9A-8E7A-D408295BE7A1}" type="datetimeFigureOut">
               <a:rPr lang="en-GB" smtClean="0"/>
-              <a:t>10/11/2020</a:t>
+              <a:t>15/11/2020</a:t>
             </a:fld>
             <a:endParaRPr lang="en-GB"/>
           </a:p>
@@ -2646,7 +2647,7 @@
           <a:p>
             <a:fld id="{7901E498-D8D8-45FF-A431-0926372A905E}" type="slidenum">
               <a:rPr lang="en-GB" smtClean="0"/>
-              <a:t>‹Nr.›</a:t>
+              <a:t>‹Nº›</a:t>
             </a:fld>
             <a:endParaRPr lang="en-GB"/>
           </a:p>
@@ -2986,23 +2987,862 @@
         <p:spPr>
           <a:xfrm>
             <a:off x="838199" y="365125"/>
-            <a:ext cx="5364637" cy="1325563"/>
+            <a:ext cx="7271327" cy="1325563"/>
           </a:xfrm>
         </p:spPr>
         <p:txBody>
           <a:bodyPr>
-            <a:normAutofit fontScale="90000"/>
+            <a:normAutofit/>
           </a:bodyPr>
           <a:lstStyle/>
           <a:p>
             <a:r>
-              <a:rPr lang="es-ES" sz="5000" b="1" u="sng" dirty="0"/>
-              <a:t>Main block ‘Predictor’</a:t>
+              <a:rPr lang="en-GB" sz="5000" b="1" u="sng" dirty="0" smtClean="0"/>
+              <a:t>CCSDS123 Issue 2 Standard</a:t>
             </a:r>
             <a:endParaRPr lang="en-GB" sz="5000" b="1" u="sng" dirty="0"/>
           </a:p>
         </p:txBody>
       </p:sp>
+      <p:sp>
+        <p:nvSpPr>
+          <p:cNvPr id="8" name="Rectángulo 7"/>
+          <p:cNvSpPr/>
+          <p:nvPr/>
+        </p:nvSpPr>
+        <p:spPr>
+          <a:xfrm>
+            <a:off x="2459609" y="3128200"/>
+            <a:ext cx="2618767" cy="1358957"/>
+          </a:xfrm>
+          <a:prstGeom prst="rect">
+            <a:avLst/>
+          </a:prstGeom>
+          <a:solidFill>
+            <a:schemeClr val="tx1"/>
+          </a:solidFill>
+        </p:spPr>
+        <p:style>
+          <a:lnRef idx="2">
+            <a:schemeClr val="accent1">
+              <a:shade val="50000"/>
+            </a:schemeClr>
+          </a:lnRef>
+          <a:fillRef idx="1">
+            <a:schemeClr val="accent1"/>
+          </a:fillRef>
+          <a:effectRef idx="0">
+            <a:schemeClr val="accent1"/>
+          </a:effectRef>
+          <a:fontRef idx="minor">
+            <a:schemeClr val="lt1"/>
+          </a:fontRef>
+        </p:style>
+        <p:txBody>
+          <a:bodyPr rtlCol="0" anchor="ctr"/>
+          <a:lstStyle/>
+          <a:p>
+            <a:pPr algn="ctr"/>
+            <a:r>
+              <a:rPr lang="en-GB" sz="3600" b="1" dirty="0" smtClean="0">
+                <a:solidFill>
+                  <a:schemeClr val="bg1"/>
+                </a:solidFill>
+              </a:rPr>
+              <a:t>Predictor block</a:t>
+            </a:r>
+            <a:endParaRPr lang="en-GB" sz="3600" b="1" dirty="0">
+              <a:solidFill>
+                <a:schemeClr val="bg1"/>
+              </a:solidFill>
+            </a:endParaRPr>
+          </a:p>
+        </p:txBody>
+      </p:sp>
+      <p:cxnSp>
+        <p:nvCxnSpPr>
+          <p:cNvPr id="24" name="Conector recto de flecha 23"/>
+          <p:cNvCxnSpPr>
+            <a:endCxn id="8" idx="1"/>
+          </p:cNvCxnSpPr>
+          <p:nvPr/>
+        </p:nvCxnSpPr>
+        <p:spPr>
+          <a:xfrm>
+            <a:off x="1036162" y="3807678"/>
+            <a:ext cx="1423447" cy="1"/>
+          </a:xfrm>
+          <a:prstGeom prst="straightConnector1">
+            <a:avLst/>
+          </a:prstGeom>
+          <a:ln w="38100">
+            <a:solidFill>
+              <a:srgbClr val="7030A0"/>
+            </a:solidFill>
+            <a:tailEnd type="triangle"/>
+          </a:ln>
+        </p:spPr>
+        <p:style>
+          <a:lnRef idx="1">
+            <a:schemeClr val="accent1"/>
+          </a:lnRef>
+          <a:fillRef idx="0">
+            <a:schemeClr val="accent1"/>
+          </a:fillRef>
+          <a:effectRef idx="0">
+            <a:schemeClr val="accent1"/>
+          </a:effectRef>
+          <a:fontRef idx="minor">
+            <a:schemeClr val="tx1"/>
+          </a:fontRef>
+        </p:style>
+      </p:cxnSp>
+      <p:sp>
+        <p:nvSpPr>
+          <p:cNvPr id="75" name="Marcador de contenido 2"/>
+          <p:cNvSpPr>
+            <a:spLocks noGrp="1"/>
+          </p:cNvSpPr>
+          <p:nvPr>
+            <p:ph idx="1"/>
+          </p:nvPr>
+        </p:nvSpPr>
+        <p:spPr>
+          <a:xfrm>
+            <a:off x="1036162" y="2702527"/>
+            <a:ext cx="1423446" cy="1699789"/>
+          </a:xfrm>
+        </p:spPr>
+        <p:txBody>
+          <a:bodyPr>
+            <a:noAutofit/>
+          </a:bodyPr>
+          <a:lstStyle/>
+          <a:p>
+            <a:pPr marL="0" indent="0" algn="r">
+              <a:buNone/>
+            </a:pPr>
+            <a:r>
+              <a:rPr lang="en-GB" sz="2400" b="1" dirty="0" smtClean="0">
+                <a:solidFill>
+                  <a:srgbClr val="7030A0"/>
+                </a:solidFill>
+              </a:rPr>
+              <a:t>Original simple values</a:t>
+            </a:r>
+            <a:br>
+              <a:rPr lang="en-GB" sz="2400" b="1" dirty="0" smtClean="0">
+                <a:solidFill>
+                  <a:srgbClr val="7030A0"/>
+                </a:solidFill>
+              </a:rPr>
+            </a:br>
+            <a:r>
+              <a:rPr lang="en-GB" sz="2400" b="1" dirty="0" smtClean="0">
+                <a:solidFill>
+                  <a:srgbClr val="7030A0"/>
+                </a:solidFill>
+              </a:rPr>
+              <a:t/>
+            </a:r>
+            <a:br>
+              <a:rPr lang="en-GB" sz="2400" b="1" dirty="0" smtClean="0">
+                <a:solidFill>
+                  <a:srgbClr val="7030A0"/>
+                </a:solidFill>
+              </a:rPr>
+            </a:br>
+            <a:r>
+              <a:rPr lang="en-GB" sz="2400" b="1" dirty="0" err="1" smtClean="0">
+                <a:solidFill>
+                  <a:srgbClr val="7030A0"/>
+                </a:solidFill>
+              </a:rPr>
+              <a:t>S</a:t>
+            </a:r>
+            <a:r>
+              <a:rPr lang="en-GB" sz="2400" b="1" baseline="-25000" dirty="0" err="1" smtClean="0">
+                <a:solidFill>
+                  <a:srgbClr val="7030A0"/>
+                </a:solidFill>
+              </a:rPr>
+              <a:t>z</a:t>
+            </a:r>
+            <a:r>
+              <a:rPr lang="en-GB" sz="2400" b="1" dirty="0" smtClean="0">
+                <a:solidFill>
+                  <a:srgbClr val="7030A0"/>
+                </a:solidFill>
+              </a:rPr>
+              <a:t>(t)</a:t>
+            </a:r>
+            <a:endParaRPr lang="en-GB" sz="2400" b="1" dirty="0">
+              <a:solidFill>
+                <a:srgbClr val="7030A0"/>
+              </a:solidFill>
+            </a:endParaRPr>
+          </a:p>
+        </p:txBody>
+      </p:sp>
+      <p:cxnSp>
+        <p:nvCxnSpPr>
+          <p:cNvPr id="37" name="Conector recto de flecha 36"/>
+          <p:cNvCxnSpPr/>
+          <p:nvPr/>
+        </p:nvCxnSpPr>
+        <p:spPr>
+          <a:xfrm>
+            <a:off x="5078376" y="3807678"/>
+            <a:ext cx="1423447" cy="1"/>
+          </a:xfrm>
+          <a:prstGeom prst="straightConnector1">
+            <a:avLst/>
+          </a:prstGeom>
+          <a:ln w="38100">
+            <a:solidFill>
+              <a:srgbClr val="FFC000"/>
+            </a:solidFill>
+            <a:tailEnd type="triangle"/>
+          </a:ln>
+        </p:spPr>
+        <p:style>
+          <a:lnRef idx="1">
+            <a:schemeClr val="accent1"/>
+          </a:lnRef>
+          <a:fillRef idx="0">
+            <a:schemeClr val="accent1"/>
+          </a:fillRef>
+          <a:effectRef idx="0">
+            <a:schemeClr val="accent1"/>
+          </a:effectRef>
+          <a:fontRef idx="minor">
+            <a:schemeClr val="tx1"/>
+          </a:fontRef>
+        </p:style>
+      </p:cxnSp>
+      <p:sp>
+        <p:nvSpPr>
+          <p:cNvPr id="38" name="Marcador de contenido 2"/>
+          <p:cNvSpPr txBox="1">
+            <a:spLocks/>
+          </p:cNvSpPr>
+          <p:nvPr/>
+        </p:nvSpPr>
+        <p:spPr>
+          <a:xfrm>
+            <a:off x="5078375" y="2702527"/>
+            <a:ext cx="1423447" cy="1699789"/>
+          </a:xfrm>
+          <a:prstGeom prst="rect">
+            <a:avLst/>
+          </a:prstGeom>
+        </p:spPr>
+        <p:txBody>
+          <a:bodyPr vert="horz" lIns="91440" tIns="45720" rIns="91440" bIns="45720" rtlCol="0">
+            <a:noAutofit/>
+          </a:bodyPr>
+          <a:lstStyle>
+            <a:lvl1pPr marL="228600" indent="-228600" algn="l" defTabSz="914400" rtl="0" eaLnBrk="1" latinLnBrk="0" hangingPunct="1">
+              <a:lnSpc>
+                <a:spcPct val="90000"/>
+              </a:lnSpc>
+              <a:spcBef>
+                <a:spcPts val="1000"/>
+              </a:spcBef>
+              <a:buFont typeface="Arial" panose="020B0604020202020204" pitchFamily="34" charset="0"/>
+              <a:buChar char="•"/>
+              <a:defRPr sz="2800" kern="1200">
+                <a:solidFill>
+                  <a:schemeClr val="tx1"/>
+                </a:solidFill>
+                <a:latin typeface="+mn-lt"/>
+                <a:ea typeface="+mn-ea"/>
+                <a:cs typeface="+mn-cs"/>
+              </a:defRPr>
+            </a:lvl1pPr>
+            <a:lvl2pPr marL="685800" indent="-228600" algn="l" defTabSz="914400" rtl="0" eaLnBrk="1" latinLnBrk="0" hangingPunct="1">
+              <a:lnSpc>
+                <a:spcPct val="90000"/>
+              </a:lnSpc>
+              <a:spcBef>
+                <a:spcPts val="500"/>
+              </a:spcBef>
+              <a:buFont typeface="Arial" panose="020B0604020202020204" pitchFamily="34" charset="0"/>
+              <a:buChar char="•"/>
+              <a:defRPr sz="2400" kern="1200">
+                <a:solidFill>
+                  <a:schemeClr val="tx1"/>
+                </a:solidFill>
+                <a:latin typeface="+mn-lt"/>
+                <a:ea typeface="+mn-ea"/>
+                <a:cs typeface="+mn-cs"/>
+              </a:defRPr>
+            </a:lvl2pPr>
+            <a:lvl3pPr marL="1143000" indent="-228600" algn="l" defTabSz="914400" rtl="0" eaLnBrk="1" latinLnBrk="0" hangingPunct="1">
+              <a:lnSpc>
+                <a:spcPct val="90000"/>
+              </a:lnSpc>
+              <a:spcBef>
+                <a:spcPts val="500"/>
+              </a:spcBef>
+              <a:buFont typeface="Arial" panose="020B0604020202020204" pitchFamily="34" charset="0"/>
+              <a:buChar char="•"/>
+              <a:defRPr sz="2000" kern="1200">
+                <a:solidFill>
+                  <a:schemeClr val="tx1"/>
+                </a:solidFill>
+                <a:latin typeface="+mn-lt"/>
+                <a:ea typeface="+mn-ea"/>
+                <a:cs typeface="+mn-cs"/>
+              </a:defRPr>
+            </a:lvl3pPr>
+            <a:lvl4pPr marL="1600200" indent="-228600" algn="l" defTabSz="914400" rtl="0" eaLnBrk="1" latinLnBrk="0" hangingPunct="1">
+              <a:lnSpc>
+                <a:spcPct val="90000"/>
+              </a:lnSpc>
+              <a:spcBef>
+                <a:spcPts val="500"/>
+              </a:spcBef>
+              <a:buFont typeface="Arial" panose="020B0604020202020204" pitchFamily="34" charset="0"/>
+              <a:buChar char="•"/>
+              <a:defRPr sz="1800" kern="1200">
+                <a:solidFill>
+                  <a:schemeClr val="tx1"/>
+                </a:solidFill>
+                <a:latin typeface="+mn-lt"/>
+                <a:ea typeface="+mn-ea"/>
+                <a:cs typeface="+mn-cs"/>
+              </a:defRPr>
+            </a:lvl4pPr>
+            <a:lvl5pPr marL="2057400" indent="-228600" algn="l" defTabSz="914400" rtl="0" eaLnBrk="1" latinLnBrk="0" hangingPunct="1">
+              <a:lnSpc>
+                <a:spcPct val="90000"/>
+              </a:lnSpc>
+              <a:spcBef>
+                <a:spcPts val="500"/>
+              </a:spcBef>
+              <a:buFont typeface="Arial" panose="020B0604020202020204" pitchFamily="34" charset="0"/>
+              <a:buChar char="•"/>
+              <a:defRPr sz="1800" kern="1200">
+                <a:solidFill>
+                  <a:schemeClr val="tx1"/>
+                </a:solidFill>
+                <a:latin typeface="+mn-lt"/>
+                <a:ea typeface="+mn-ea"/>
+                <a:cs typeface="+mn-cs"/>
+              </a:defRPr>
+            </a:lvl5pPr>
+            <a:lvl6pPr marL="2514600" indent="-228600" algn="l" defTabSz="914400" rtl="0" eaLnBrk="1" latinLnBrk="0" hangingPunct="1">
+              <a:lnSpc>
+                <a:spcPct val="90000"/>
+              </a:lnSpc>
+              <a:spcBef>
+                <a:spcPts val="500"/>
+              </a:spcBef>
+              <a:buFont typeface="Arial" panose="020B0604020202020204" pitchFamily="34" charset="0"/>
+              <a:buChar char="•"/>
+              <a:defRPr sz="1800" kern="1200">
+                <a:solidFill>
+                  <a:schemeClr val="tx1"/>
+                </a:solidFill>
+                <a:latin typeface="+mn-lt"/>
+                <a:ea typeface="+mn-ea"/>
+                <a:cs typeface="+mn-cs"/>
+              </a:defRPr>
+            </a:lvl6pPr>
+            <a:lvl7pPr marL="2971800" indent="-228600" algn="l" defTabSz="914400" rtl="0" eaLnBrk="1" latinLnBrk="0" hangingPunct="1">
+              <a:lnSpc>
+                <a:spcPct val="90000"/>
+              </a:lnSpc>
+              <a:spcBef>
+                <a:spcPts val="500"/>
+              </a:spcBef>
+              <a:buFont typeface="Arial" panose="020B0604020202020204" pitchFamily="34" charset="0"/>
+              <a:buChar char="•"/>
+              <a:defRPr sz="1800" kern="1200">
+                <a:solidFill>
+                  <a:schemeClr val="tx1"/>
+                </a:solidFill>
+                <a:latin typeface="+mn-lt"/>
+                <a:ea typeface="+mn-ea"/>
+                <a:cs typeface="+mn-cs"/>
+              </a:defRPr>
+            </a:lvl7pPr>
+            <a:lvl8pPr marL="3429000" indent="-228600" algn="l" defTabSz="914400" rtl="0" eaLnBrk="1" latinLnBrk="0" hangingPunct="1">
+              <a:lnSpc>
+                <a:spcPct val="90000"/>
+              </a:lnSpc>
+              <a:spcBef>
+                <a:spcPts val="500"/>
+              </a:spcBef>
+              <a:buFont typeface="Arial" panose="020B0604020202020204" pitchFamily="34" charset="0"/>
+              <a:buChar char="•"/>
+              <a:defRPr sz="1800" kern="1200">
+                <a:solidFill>
+                  <a:schemeClr val="tx1"/>
+                </a:solidFill>
+                <a:latin typeface="+mn-lt"/>
+                <a:ea typeface="+mn-ea"/>
+                <a:cs typeface="+mn-cs"/>
+              </a:defRPr>
+            </a:lvl8pPr>
+            <a:lvl9pPr marL="3886200" indent="-228600" algn="l" defTabSz="914400" rtl="0" eaLnBrk="1" latinLnBrk="0" hangingPunct="1">
+              <a:lnSpc>
+                <a:spcPct val="90000"/>
+              </a:lnSpc>
+              <a:spcBef>
+                <a:spcPts val="500"/>
+              </a:spcBef>
+              <a:buFont typeface="Arial" panose="020B0604020202020204" pitchFamily="34" charset="0"/>
+              <a:buChar char="•"/>
+              <a:defRPr sz="1800" kern="1200">
+                <a:solidFill>
+                  <a:schemeClr val="tx1"/>
+                </a:solidFill>
+                <a:latin typeface="+mn-lt"/>
+                <a:ea typeface="+mn-ea"/>
+                <a:cs typeface="+mn-cs"/>
+              </a:defRPr>
+            </a:lvl9pPr>
+          </a:lstStyle>
+          <a:p>
+            <a:pPr marL="0" indent="0" algn="r">
+              <a:buNone/>
+            </a:pPr>
+            <a:r>
+              <a:rPr lang="en-GB" sz="2400" b="1" dirty="0" smtClean="0">
+                <a:solidFill>
+                  <a:srgbClr val="FFC000"/>
+                </a:solidFill>
+              </a:rPr>
+              <a:t>Mapped </a:t>
+            </a:r>
+            <a:r>
+              <a:rPr lang="en-GB" sz="2400" b="1" dirty="0" err="1" smtClean="0">
+                <a:solidFill>
+                  <a:srgbClr val="FFC000"/>
+                </a:solidFill>
+              </a:rPr>
+              <a:t>quantizer</a:t>
+            </a:r>
+            <a:r>
+              <a:rPr lang="en-GB" sz="2400" b="1" dirty="0" smtClean="0">
+                <a:solidFill>
+                  <a:srgbClr val="FFC000"/>
+                </a:solidFill>
+              </a:rPr>
+              <a:t> </a:t>
+            </a:r>
+            <a:r>
+              <a:rPr lang="en-GB" sz="2400" b="1" dirty="0" smtClean="0">
+                <a:solidFill>
+                  <a:srgbClr val="FFC000"/>
+                </a:solidFill>
+              </a:rPr>
+              <a:t>index</a:t>
+            </a:r>
+            <a:br>
+              <a:rPr lang="en-GB" sz="2400" b="1" dirty="0" smtClean="0">
+                <a:solidFill>
+                  <a:srgbClr val="FFC000"/>
+                </a:solidFill>
+              </a:rPr>
+            </a:br>
+            <a:r>
+              <a:rPr lang="en-GB" sz="2400" b="1" dirty="0" smtClean="0">
+                <a:solidFill>
+                  <a:srgbClr val="FFC000"/>
+                </a:solidFill>
+              </a:rPr>
+              <a:t/>
+            </a:r>
+            <a:br>
+              <a:rPr lang="en-GB" sz="2400" b="1" dirty="0" smtClean="0">
+                <a:solidFill>
+                  <a:srgbClr val="FFC000"/>
+                </a:solidFill>
+              </a:rPr>
+            </a:br>
+            <a:r>
+              <a:rPr lang="el-GR" sz="2400" b="1" dirty="0" smtClean="0">
+                <a:solidFill>
+                  <a:srgbClr val="FFC000"/>
+                </a:solidFill>
+              </a:rPr>
+              <a:t>δ</a:t>
+            </a:r>
+            <a:r>
+              <a:rPr lang="es-ES" sz="2400" b="1" baseline="-25000" dirty="0">
+                <a:solidFill>
+                  <a:srgbClr val="FFC000"/>
+                </a:solidFill>
+              </a:rPr>
+              <a:t>z</a:t>
+            </a:r>
+            <a:r>
+              <a:rPr lang="es-ES" sz="2400" b="1" dirty="0">
+                <a:solidFill>
+                  <a:srgbClr val="FFC000"/>
+                </a:solidFill>
+              </a:rPr>
+              <a:t>(t)</a:t>
+            </a:r>
+            <a:endParaRPr lang="en-GB" sz="2400" b="1" dirty="0">
+              <a:solidFill>
+                <a:srgbClr val="FFC000"/>
+              </a:solidFill>
+            </a:endParaRPr>
+          </a:p>
+        </p:txBody>
+      </p:sp>
+      <p:sp>
+        <p:nvSpPr>
+          <p:cNvPr id="39" name="Rectángulo 38"/>
+          <p:cNvSpPr/>
+          <p:nvPr/>
+        </p:nvSpPr>
+        <p:spPr>
+          <a:xfrm>
+            <a:off x="6501823" y="3128200"/>
+            <a:ext cx="2618767" cy="1358957"/>
+          </a:xfrm>
+          <a:prstGeom prst="rect">
+            <a:avLst/>
+          </a:prstGeom>
+          <a:solidFill>
+            <a:schemeClr val="tx1"/>
+          </a:solidFill>
+        </p:spPr>
+        <p:style>
+          <a:lnRef idx="2">
+            <a:schemeClr val="accent1">
+              <a:shade val="50000"/>
+            </a:schemeClr>
+          </a:lnRef>
+          <a:fillRef idx="1">
+            <a:schemeClr val="accent1"/>
+          </a:fillRef>
+          <a:effectRef idx="0">
+            <a:schemeClr val="accent1"/>
+          </a:effectRef>
+          <a:fontRef idx="minor">
+            <a:schemeClr val="lt1"/>
+          </a:fontRef>
+        </p:style>
+        <p:txBody>
+          <a:bodyPr rtlCol="0" anchor="ctr"/>
+          <a:lstStyle/>
+          <a:p>
+            <a:pPr algn="ctr"/>
+            <a:r>
+              <a:rPr lang="en-GB" sz="3600" b="1" dirty="0" smtClean="0">
+                <a:solidFill>
+                  <a:schemeClr val="bg1"/>
+                </a:solidFill>
+              </a:rPr>
+              <a:t>Encoder</a:t>
+            </a:r>
+            <a:br>
+              <a:rPr lang="en-GB" sz="3600" b="1" dirty="0" smtClean="0">
+                <a:solidFill>
+                  <a:schemeClr val="bg1"/>
+                </a:solidFill>
+              </a:rPr>
+            </a:br>
+            <a:r>
+              <a:rPr lang="en-GB" sz="3600" b="1" dirty="0" smtClean="0">
+                <a:solidFill>
+                  <a:schemeClr val="bg1"/>
+                </a:solidFill>
+              </a:rPr>
+              <a:t>block</a:t>
+            </a:r>
+            <a:endParaRPr lang="en-GB" sz="3600" b="1" dirty="0">
+              <a:solidFill>
+                <a:schemeClr val="bg1"/>
+              </a:solidFill>
+            </a:endParaRPr>
+          </a:p>
+        </p:txBody>
+      </p:sp>
+      <p:cxnSp>
+        <p:nvCxnSpPr>
+          <p:cNvPr id="42" name="Conector recto de flecha 41"/>
+          <p:cNvCxnSpPr/>
+          <p:nvPr/>
+        </p:nvCxnSpPr>
+        <p:spPr>
+          <a:xfrm>
+            <a:off x="9120590" y="3807678"/>
+            <a:ext cx="1423447" cy="1"/>
+          </a:xfrm>
+          <a:prstGeom prst="straightConnector1">
+            <a:avLst/>
+          </a:prstGeom>
+          <a:ln w="38100">
+            <a:solidFill>
+              <a:srgbClr val="FF0000"/>
+            </a:solidFill>
+            <a:tailEnd type="triangle"/>
+          </a:ln>
+        </p:spPr>
+        <p:style>
+          <a:lnRef idx="1">
+            <a:schemeClr val="accent1"/>
+          </a:lnRef>
+          <a:fillRef idx="0">
+            <a:schemeClr val="accent1"/>
+          </a:fillRef>
+          <a:effectRef idx="0">
+            <a:schemeClr val="accent1"/>
+          </a:effectRef>
+          <a:fontRef idx="minor">
+            <a:schemeClr val="tx1"/>
+          </a:fontRef>
+        </p:style>
+      </p:cxnSp>
+      <p:sp>
+        <p:nvSpPr>
+          <p:cNvPr id="43" name="Marcador de contenido 2"/>
+          <p:cNvSpPr txBox="1">
+            <a:spLocks/>
+          </p:cNvSpPr>
+          <p:nvPr/>
+        </p:nvSpPr>
+        <p:spPr>
+          <a:xfrm>
+            <a:off x="9120589" y="2941162"/>
+            <a:ext cx="1757155" cy="1131218"/>
+          </a:xfrm>
+          <a:prstGeom prst="rect">
+            <a:avLst/>
+          </a:prstGeom>
+        </p:spPr>
+        <p:txBody>
+          <a:bodyPr vert="horz" lIns="91440" tIns="45720" rIns="91440" bIns="45720" rtlCol="0">
+            <a:noAutofit/>
+          </a:bodyPr>
+          <a:lstStyle>
+            <a:lvl1pPr marL="228600" indent="-228600" algn="l" defTabSz="914400" rtl="0" eaLnBrk="1" latinLnBrk="0" hangingPunct="1">
+              <a:lnSpc>
+                <a:spcPct val="90000"/>
+              </a:lnSpc>
+              <a:spcBef>
+                <a:spcPts val="1000"/>
+              </a:spcBef>
+              <a:buFont typeface="Arial" panose="020B0604020202020204" pitchFamily="34" charset="0"/>
+              <a:buChar char="•"/>
+              <a:defRPr sz="2800" kern="1200">
+                <a:solidFill>
+                  <a:schemeClr val="tx1"/>
+                </a:solidFill>
+                <a:latin typeface="+mn-lt"/>
+                <a:ea typeface="+mn-ea"/>
+                <a:cs typeface="+mn-cs"/>
+              </a:defRPr>
+            </a:lvl1pPr>
+            <a:lvl2pPr marL="685800" indent="-228600" algn="l" defTabSz="914400" rtl="0" eaLnBrk="1" latinLnBrk="0" hangingPunct="1">
+              <a:lnSpc>
+                <a:spcPct val="90000"/>
+              </a:lnSpc>
+              <a:spcBef>
+                <a:spcPts val="500"/>
+              </a:spcBef>
+              <a:buFont typeface="Arial" panose="020B0604020202020204" pitchFamily="34" charset="0"/>
+              <a:buChar char="•"/>
+              <a:defRPr sz="2400" kern="1200">
+                <a:solidFill>
+                  <a:schemeClr val="tx1"/>
+                </a:solidFill>
+                <a:latin typeface="+mn-lt"/>
+                <a:ea typeface="+mn-ea"/>
+                <a:cs typeface="+mn-cs"/>
+              </a:defRPr>
+            </a:lvl2pPr>
+            <a:lvl3pPr marL="1143000" indent="-228600" algn="l" defTabSz="914400" rtl="0" eaLnBrk="1" latinLnBrk="0" hangingPunct="1">
+              <a:lnSpc>
+                <a:spcPct val="90000"/>
+              </a:lnSpc>
+              <a:spcBef>
+                <a:spcPts val="500"/>
+              </a:spcBef>
+              <a:buFont typeface="Arial" panose="020B0604020202020204" pitchFamily="34" charset="0"/>
+              <a:buChar char="•"/>
+              <a:defRPr sz="2000" kern="1200">
+                <a:solidFill>
+                  <a:schemeClr val="tx1"/>
+                </a:solidFill>
+                <a:latin typeface="+mn-lt"/>
+                <a:ea typeface="+mn-ea"/>
+                <a:cs typeface="+mn-cs"/>
+              </a:defRPr>
+            </a:lvl3pPr>
+            <a:lvl4pPr marL="1600200" indent="-228600" algn="l" defTabSz="914400" rtl="0" eaLnBrk="1" latinLnBrk="0" hangingPunct="1">
+              <a:lnSpc>
+                <a:spcPct val="90000"/>
+              </a:lnSpc>
+              <a:spcBef>
+                <a:spcPts val="500"/>
+              </a:spcBef>
+              <a:buFont typeface="Arial" panose="020B0604020202020204" pitchFamily="34" charset="0"/>
+              <a:buChar char="•"/>
+              <a:defRPr sz="1800" kern="1200">
+                <a:solidFill>
+                  <a:schemeClr val="tx1"/>
+                </a:solidFill>
+                <a:latin typeface="+mn-lt"/>
+                <a:ea typeface="+mn-ea"/>
+                <a:cs typeface="+mn-cs"/>
+              </a:defRPr>
+            </a:lvl4pPr>
+            <a:lvl5pPr marL="2057400" indent="-228600" algn="l" defTabSz="914400" rtl="0" eaLnBrk="1" latinLnBrk="0" hangingPunct="1">
+              <a:lnSpc>
+                <a:spcPct val="90000"/>
+              </a:lnSpc>
+              <a:spcBef>
+                <a:spcPts val="500"/>
+              </a:spcBef>
+              <a:buFont typeface="Arial" panose="020B0604020202020204" pitchFamily="34" charset="0"/>
+              <a:buChar char="•"/>
+              <a:defRPr sz="1800" kern="1200">
+                <a:solidFill>
+                  <a:schemeClr val="tx1"/>
+                </a:solidFill>
+                <a:latin typeface="+mn-lt"/>
+                <a:ea typeface="+mn-ea"/>
+                <a:cs typeface="+mn-cs"/>
+              </a:defRPr>
+            </a:lvl5pPr>
+            <a:lvl6pPr marL="2514600" indent="-228600" algn="l" defTabSz="914400" rtl="0" eaLnBrk="1" latinLnBrk="0" hangingPunct="1">
+              <a:lnSpc>
+                <a:spcPct val="90000"/>
+              </a:lnSpc>
+              <a:spcBef>
+                <a:spcPts val="500"/>
+              </a:spcBef>
+              <a:buFont typeface="Arial" panose="020B0604020202020204" pitchFamily="34" charset="0"/>
+              <a:buChar char="•"/>
+              <a:defRPr sz="1800" kern="1200">
+                <a:solidFill>
+                  <a:schemeClr val="tx1"/>
+                </a:solidFill>
+                <a:latin typeface="+mn-lt"/>
+                <a:ea typeface="+mn-ea"/>
+                <a:cs typeface="+mn-cs"/>
+              </a:defRPr>
+            </a:lvl6pPr>
+            <a:lvl7pPr marL="2971800" indent="-228600" algn="l" defTabSz="914400" rtl="0" eaLnBrk="1" latinLnBrk="0" hangingPunct="1">
+              <a:lnSpc>
+                <a:spcPct val="90000"/>
+              </a:lnSpc>
+              <a:spcBef>
+                <a:spcPts val="500"/>
+              </a:spcBef>
+              <a:buFont typeface="Arial" panose="020B0604020202020204" pitchFamily="34" charset="0"/>
+              <a:buChar char="•"/>
+              <a:defRPr sz="1800" kern="1200">
+                <a:solidFill>
+                  <a:schemeClr val="tx1"/>
+                </a:solidFill>
+                <a:latin typeface="+mn-lt"/>
+                <a:ea typeface="+mn-ea"/>
+                <a:cs typeface="+mn-cs"/>
+              </a:defRPr>
+            </a:lvl7pPr>
+            <a:lvl8pPr marL="3429000" indent="-228600" algn="l" defTabSz="914400" rtl="0" eaLnBrk="1" latinLnBrk="0" hangingPunct="1">
+              <a:lnSpc>
+                <a:spcPct val="90000"/>
+              </a:lnSpc>
+              <a:spcBef>
+                <a:spcPts val="500"/>
+              </a:spcBef>
+              <a:buFont typeface="Arial" panose="020B0604020202020204" pitchFamily="34" charset="0"/>
+              <a:buChar char="•"/>
+              <a:defRPr sz="1800" kern="1200">
+                <a:solidFill>
+                  <a:schemeClr val="tx1"/>
+                </a:solidFill>
+                <a:latin typeface="+mn-lt"/>
+                <a:ea typeface="+mn-ea"/>
+                <a:cs typeface="+mn-cs"/>
+              </a:defRPr>
+            </a:lvl8pPr>
+            <a:lvl9pPr marL="3886200" indent="-228600" algn="l" defTabSz="914400" rtl="0" eaLnBrk="1" latinLnBrk="0" hangingPunct="1">
+              <a:lnSpc>
+                <a:spcPct val="90000"/>
+              </a:lnSpc>
+              <a:spcBef>
+                <a:spcPts val="500"/>
+              </a:spcBef>
+              <a:buFont typeface="Arial" panose="020B0604020202020204" pitchFamily="34" charset="0"/>
+              <a:buChar char="•"/>
+              <a:defRPr sz="1800" kern="1200">
+                <a:solidFill>
+                  <a:schemeClr val="tx1"/>
+                </a:solidFill>
+                <a:latin typeface="+mn-lt"/>
+                <a:ea typeface="+mn-ea"/>
+                <a:cs typeface="+mn-cs"/>
+              </a:defRPr>
+            </a:lvl9pPr>
+          </a:lstStyle>
+          <a:p>
+            <a:pPr marL="0" indent="0">
+              <a:buNone/>
+            </a:pPr>
+            <a:r>
+              <a:rPr lang="en-GB" sz="2400" b="1" dirty="0" smtClean="0">
+                <a:solidFill>
+                  <a:srgbClr val="FF0000"/>
+                </a:solidFill>
+              </a:rPr>
+              <a:t>Compressed image</a:t>
+            </a:r>
+            <a:endParaRPr lang="en-GB" sz="2400" b="1" dirty="0">
+              <a:solidFill>
+                <a:srgbClr val="FF0000"/>
+              </a:solidFill>
+            </a:endParaRPr>
+          </a:p>
+        </p:txBody>
+      </p:sp>
+    </p:spTree>
+    <p:extLst>
+      <p:ext uri="{BB962C8B-B14F-4D97-AF65-F5344CB8AC3E}">
+        <p14:creationId xmlns:p14="http://schemas.microsoft.com/office/powerpoint/2010/main" val="632095789"/>
+      </p:ext>
+    </p:extLst>
+  </p:cSld>
+  <p:clrMapOvr>
+    <a:masterClrMapping/>
+  </p:clrMapOvr>
+  <p:timing>
+    <p:tnLst>
+      <p:par>
+        <p:cTn id="1" dur="indefinite" restart="never" nodeType="tmRoot"/>
+      </p:par>
+    </p:tnLst>
+  </p:timing>
+</p:sld>
+</file>
+
+<file path=ppt/slides/slide2.xml><?xml version="1.0" encoding="utf-8"?>
+<p:sld xmlns:a="http://schemas.openxmlformats.org/drawingml/2006/main" xmlns:r="http://schemas.openxmlformats.org/officeDocument/2006/relationships" xmlns:p="http://schemas.openxmlformats.org/presentationml/2006/main">
+  <p:cSld>
+    <p:spTree>
+      <p:nvGrpSpPr>
+        <p:cNvPr id="1" name=""/>
+        <p:cNvGrpSpPr/>
+        <p:nvPr/>
+      </p:nvGrpSpPr>
+      <p:grpSpPr>
+        <a:xfrm>
+          <a:off x="0" y="0"/>
+          <a:ext cx="0" cy="0"/>
+          <a:chOff x="0" y="0"/>
+          <a:chExt cx="0" cy="0"/>
+        </a:xfrm>
+      </p:grpSpPr>
       <p:sp>
         <p:nvSpPr>
           <p:cNvPr id="6" name="Rectángulo 5"/>
@@ -3158,12 +3998,12 @@
           <a:p>
             <a:pPr algn="ctr"/>
             <a:r>
-              <a:rPr lang="en-GB" sz="2400" b="1" dirty="0" err="1">
+              <a:rPr lang="en-GB" sz="2400" b="1" dirty="0" err="1" smtClean="0">
                 <a:solidFill>
                   <a:schemeClr val="bg1"/>
                 </a:solidFill>
               </a:rPr>
-              <a:t>Quantizer</a:t>
+              <a:t>Quantizier</a:t>
             </a:r>
             <a:endParaRPr lang="en-GB" sz="2400" b="1" dirty="0">
               <a:solidFill>
@@ -3590,47 +4430,6 @@
       </p:cxnSp>
       <p:cxnSp>
         <p:nvCxnSpPr>
-          <p:cNvPr id="36" name="Conector recto de flecha 35"/>
-          <p:cNvCxnSpPr>
-            <a:stCxn id="9" idx="3"/>
-          </p:cNvCxnSpPr>
-          <p:nvPr/>
-        </p:nvCxnSpPr>
-        <p:spPr>
-          <a:xfrm>
-            <a:off x="10518743" y="2694569"/>
-            <a:ext cx="962057" cy="0"/>
-          </a:xfrm>
-          <a:prstGeom prst="straightConnector1">
-            <a:avLst/>
-          </a:prstGeom>
-          <a:ln w="38100">
-            <a:solidFill>
-              <a:schemeClr val="accent3">
-                <a:lumMod val="60000"/>
-                <a:lumOff val="40000"/>
-              </a:schemeClr>
-            </a:solidFill>
-            <a:tailEnd type="triangle"/>
-          </a:ln>
-        </p:spPr>
-        <p:style>
-          <a:lnRef idx="1">
-            <a:schemeClr val="accent1"/>
-          </a:lnRef>
-          <a:fillRef idx="0">
-            <a:schemeClr val="accent1"/>
-          </a:fillRef>
-          <a:effectRef idx="0">
-            <a:schemeClr val="accent1"/>
-          </a:effectRef>
-          <a:fontRef idx="minor">
-            <a:schemeClr val="tx1"/>
-          </a:fontRef>
-        </p:style>
-      </p:cxnSp>
-      <p:cxnSp>
-        <p:nvCxnSpPr>
           <p:cNvPr id="44" name="Conector angular 43"/>
           <p:cNvCxnSpPr>
             <a:endCxn id="8" idx="2"/>
@@ -5337,6 +6136,14 @@
               </a:rPr>
               <a:t>(t)</a:t>
             </a:r>
+            <a:r>
+              <a:rPr lang="es-ES" sz="2400" b="1" dirty="0">
+                <a:solidFill>
+                  <a:srgbClr val="7030A0"/>
+                </a:solidFill>
+              </a:rPr>
+              <a:t/>
+            </a:r>
             <a:br>
               <a:rPr lang="es-ES" sz="2400" b="1" dirty="0">
                 <a:solidFill>
@@ -5383,6 +6190,14 @@
                 </a:solidFill>
               </a:rPr>
               <a:t>(t)</a:t>
+            </a:r>
+            <a:r>
+              <a:rPr lang="es-ES" sz="2400" b="1" dirty="0">
+                <a:solidFill>
+                  <a:srgbClr val="7030A0"/>
+                </a:solidFill>
+              </a:rPr>
+              <a:t/>
             </a:r>
             <a:br>
               <a:rPr lang="es-ES" sz="2400" b="1" dirty="0">
@@ -5431,9 +6246,94 @@
           </a:p>
         </p:txBody>
       </p:sp>
+      <p:cxnSp>
+        <p:nvCxnSpPr>
+          <p:cNvPr id="36" name="Conector recto de flecha 35"/>
+          <p:cNvCxnSpPr>
+            <a:stCxn id="9" idx="3"/>
+          </p:cNvCxnSpPr>
+          <p:nvPr/>
+        </p:nvCxnSpPr>
+        <p:spPr>
+          <a:xfrm>
+            <a:off x="10518743" y="2694569"/>
+            <a:ext cx="962057" cy="0"/>
+          </a:xfrm>
+          <a:prstGeom prst="straightConnector1">
+            <a:avLst/>
+          </a:prstGeom>
+          <a:ln w="38100">
+            <a:solidFill>
+              <a:schemeClr val="accent3">
+                <a:lumMod val="60000"/>
+                <a:lumOff val="40000"/>
+              </a:schemeClr>
+            </a:solidFill>
+            <a:tailEnd type="triangle"/>
+          </a:ln>
+        </p:spPr>
+        <p:style>
+          <a:lnRef idx="1">
+            <a:schemeClr val="accent1"/>
+          </a:lnRef>
+          <a:fillRef idx="0">
+            <a:schemeClr val="accent1"/>
+          </a:fillRef>
+          <a:effectRef idx="0">
+            <a:schemeClr val="accent1"/>
+          </a:effectRef>
+          <a:fontRef idx="minor">
+            <a:schemeClr val="tx1"/>
+          </a:fontRef>
+        </p:style>
+      </p:cxnSp>
       <p:sp>
         <p:nvSpPr>
-          <p:cNvPr id="89" name="Marcador de contenido 2"/>
+          <p:cNvPr id="37" name="Título 1"/>
+          <p:cNvSpPr>
+            <a:spLocks noGrp="1"/>
+          </p:cNvSpPr>
+          <p:nvPr>
+            <p:ph type="title"/>
+          </p:nvPr>
+        </p:nvSpPr>
+        <p:spPr>
+          <a:xfrm>
+            <a:off x="838199" y="365125"/>
+            <a:ext cx="5952243" cy="1325563"/>
+          </a:xfrm>
+        </p:spPr>
+        <p:txBody>
+          <a:bodyPr>
+            <a:noAutofit/>
+          </a:bodyPr>
+          <a:lstStyle/>
+          <a:p>
+            <a:r>
+              <a:rPr lang="en-GB" sz="5000" b="1" u="sng" dirty="0" smtClean="0"/>
+              <a:t>Main block ‘</a:t>
+            </a:r>
+            <a:r>
+              <a:rPr lang="en-GB" sz="5000" b="1" u="sng" dirty="0" smtClean="0"/>
+              <a:t>Predictor</a:t>
+            </a:r>
+            <a:r>
+              <a:rPr lang="en-GB" sz="5000" b="1" u="sng" dirty="0" smtClean="0"/>
+              <a:t>’</a:t>
+            </a:r>
+            <a:endParaRPr lang="en-GB" sz="5000" b="1" u="sng" dirty="0"/>
+          </a:p>
+        </p:txBody>
+      </p:sp>
+      <p:sp>
+        <p:nvSpPr>
+          <p:cNvPr id="38" name="Marcador de contenido 2">
+            <a:extLst>
+              <a:ext uri="{FF2B5EF4-FFF2-40B4-BE49-F238E27FC236}">
+                <a16:creationId xmlns="" xmlns:a16="http://schemas.microsoft.com/office/drawing/2014/main" id="{3EE211A9-695F-4D32-867F-D6F32A429FE6}"/>
+              </a:ext>
+            </a:extLst>
+          </p:cNvPr>
           <p:cNvSpPr txBox="1">
             <a:spLocks/>
           </p:cNvSpPr>
@@ -5441,8 +6341,8 @@
         </p:nvSpPr>
         <p:spPr>
           <a:xfrm>
-            <a:off x="6979465" y="724769"/>
-            <a:ext cx="4831265" cy="784309"/>
+            <a:off x="6871855" y="724769"/>
+            <a:ext cx="5033818" cy="784309"/>
           </a:xfrm>
           <a:prstGeom prst="rect">
             <a:avLst/>
@@ -5623,7 +6523,7 @@
             </a:pPr>
             <a:r>
               <a:rPr lang="en-GB" sz="2400" b="1" dirty="0"/>
-              <a:t>Enable signal and image coordinates are also sent through all design.</a:t>
+              <a:t>Enable signal and image coordinates are also sent through all submodules.</a:t>
             </a:r>
           </a:p>
         </p:txBody>
@@ -5631,17 +6531,24 @@
     </p:spTree>
     <p:extLst>
       <p:ext uri="{BB962C8B-B14F-4D97-AF65-F5344CB8AC3E}">
-        <p14:creationId xmlns:p14="http://schemas.microsoft.com/office/powerpoint/2010/main" val="632095789"/>
+        <p14:creationId xmlns:p14="http://schemas.microsoft.com/office/powerpoint/2010/main" val="192351317"/>
       </p:ext>
     </p:extLst>
   </p:cSld>
   <p:clrMapOvr>
     <a:masterClrMapping/>
   </p:clrMapOvr>
+  <p:timing>
+    <p:tnLst>
+      <p:par>
+        <p:cTn id="1" dur="indefinite" restart="never" nodeType="tmRoot"/>
+      </p:par>
+    </p:tnLst>
+  </p:timing>
 </p:sld>
 </file>
 
-<file path=ppt/slides/slide2.xml><?xml version="1.0" encoding="utf-8"?>
+<file path=ppt/slides/slide3.xml><?xml version="1.0" encoding="utf-8"?>
 <p:sld xmlns:a="http://schemas.openxmlformats.org/drawingml/2006/main" xmlns:r="http://schemas.openxmlformats.org/officeDocument/2006/relationships" xmlns:p="http://schemas.openxmlformats.org/presentationml/2006/main">
   <p:cSld>
     <p:spTree>
@@ -5663,7 +6570,7 @@
           <p:cNvPr id="5" name="Rectángulo 7">
             <a:extLst>
               <a:ext uri="{FF2B5EF4-FFF2-40B4-BE49-F238E27FC236}">
-                <a16:creationId xmlns:a16="http://schemas.microsoft.com/office/drawing/2014/main" id="{1ECC8163-F603-4099-B707-80E03D2D2A6B}"/>
+                <a16:creationId xmlns="" xmlns:a16="http://schemas.microsoft.com/office/drawing/2014/main" id="{1ECC8163-F603-4099-B707-80E03D2D2A6B}"/>
               </a:ext>
             </a:extLst>
           </p:cNvPr>
@@ -5709,12 +6616,12 @@
           <a:p>
             <a:pPr algn="ctr"/>
             <a:r>
-              <a:rPr lang="en-GB" sz="3600" b="1" dirty="0">
-                <a:solidFill>
-                  <a:schemeClr val="tx1"/>
-                </a:solidFill>
-              </a:rPr>
-              <a:t>Quantizer</a:t>
+              <a:rPr lang="en-GB" sz="3600" b="1" dirty="0" err="1" smtClean="0">
+                <a:solidFill>
+                  <a:schemeClr val="tx1"/>
+                </a:solidFill>
+              </a:rPr>
+              <a:t>Quantizier</a:t>
             </a:r>
             <a:endParaRPr lang="en-GB" sz="3200" b="1" dirty="0">
               <a:solidFill>
@@ -5779,18 +6686,30 @@
         <p:spPr>
           <a:xfrm>
             <a:off x="838199" y="365125"/>
-            <a:ext cx="5544127" cy="1325563"/>
+            <a:ext cx="5939673" cy="1325563"/>
           </a:xfrm>
         </p:spPr>
         <p:txBody>
           <a:bodyPr>
-            <a:normAutofit/>
+            <a:noAutofit/>
           </a:bodyPr>
           <a:lstStyle/>
           <a:p>
             <a:r>
-              <a:rPr lang="es-ES" sz="5000" b="1" u="sng" dirty="0"/>
-              <a:t>Subblock ‘Quantizer’</a:t>
+              <a:rPr lang="en-GB" sz="5000" b="1" u="sng" dirty="0" smtClean="0"/>
+              <a:t>Sub-block </a:t>
+            </a:r>
+            <a:r>
+              <a:rPr lang="en-GB" sz="5000" b="1" u="sng" dirty="0" smtClean="0"/>
+              <a:t>‘</a:t>
+            </a:r>
+            <a:r>
+              <a:rPr lang="en-GB" sz="5000" b="1" u="sng" dirty="0" err="1" smtClean="0"/>
+              <a:t>Quantizier</a:t>
+            </a:r>
+            <a:r>
+              <a:rPr lang="en-GB" sz="5000" b="1" u="sng" dirty="0" smtClean="0"/>
+              <a:t>’</a:t>
             </a:r>
             <a:endParaRPr lang="en-GB" sz="5000" b="1" u="sng" dirty="0"/>
           </a:p>
@@ -6823,7 +7742,7 @@
           <p:cNvPr id="11" name="Rectángulo 7">
             <a:extLst>
               <a:ext uri="{FF2B5EF4-FFF2-40B4-BE49-F238E27FC236}">
-                <a16:creationId xmlns:a16="http://schemas.microsoft.com/office/drawing/2014/main" id="{71BD35C5-AEBB-4FD4-9D25-E86EF7E0C0D5}"/>
+                <a16:creationId xmlns="" xmlns:a16="http://schemas.microsoft.com/office/drawing/2014/main" id="{71BD35C5-AEBB-4FD4-9D25-E86EF7E0C0D5}"/>
               </a:ext>
             </a:extLst>
           </p:cNvPr>
@@ -6886,7 +7805,7 @@
           <p:cNvPr id="17" name="Verbinder: gewinkelt 16">
             <a:extLst>
               <a:ext uri="{FF2B5EF4-FFF2-40B4-BE49-F238E27FC236}">
-                <a16:creationId xmlns:a16="http://schemas.microsoft.com/office/drawing/2014/main" id="{3AB05A42-C510-4141-ADA2-415420603577}"/>
+                <a16:creationId xmlns="" xmlns:a16="http://schemas.microsoft.com/office/drawing/2014/main" id="{3AB05A42-C510-4141-ADA2-415420603577}"/>
               </a:ext>
             </a:extLst>
           </p:cNvPr>
@@ -6931,7 +7850,7 @@
           <p:cNvPr id="26" name="Gerade Verbindung mit Pfeil 25">
             <a:extLst>
               <a:ext uri="{FF2B5EF4-FFF2-40B4-BE49-F238E27FC236}">
-                <a16:creationId xmlns:a16="http://schemas.microsoft.com/office/drawing/2014/main" id="{DB8EABC4-920D-45BD-842D-61F1DC324FB2}"/>
+                <a16:creationId xmlns="" xmlns:a16="http://schemas.microsoft.com/office/drawing/2014/main" id="{DB8EABC4-920D-45BD-842D-61F1DC324FB2}"/>
               </a:ext>
             </a:extLst>
           </p:cNvPr>
@@ -6976,7 +7895,7 @@
           <p:cNvPr id="50" name="Gerade Verbindung mit Pfeil 49">
             <a:extLst>
               <a:ext uri="{FF2B5EF4-FFF2-40B4-BE49-F238E27FC236}">
-                <a16:creationId xmlns:a16="http://schemas.microsoft.com/office/drawing/2014/main" id="{5F06E84D-000A-4028-A540-78FACC5CD61F}"/>
+                <a16:creationId xmlns="" xmlns:a16="http://schemas.microsoft.com/office/drawing/2014/main" id="{5F06E84D-000A-4028-A540-78FACC5CD61F}"/>
               </a:ext>
             </a:extLst>
           </p:cNvPr>
@@ -7020,7 +7939,7 @@
           <p:cNvPr id="45" name="Marcador de contenido 2">
             <a:extLst>
               <a:ext uri="{FF2B5EF4-FFF2-40B4-BE49-F238E27FC236}">
-                <a16:creationId xmlns:a16="http://schemas.microsoft.com/office/drawing/2014/main" id="{3EE211A9-695F-4D32-867F-D6F32A429FE6}"/>
+                <a16:creationId xmlns="" xmlns:a16="http://schemas.microsoft.com/office/drawing/2014/main" id="{3EE211A9-695F-4D32-867F-D6F32A429FE6}"/>
               </a:ext>
             </a:extLst>
           </p:cNvPr>
@@ -7228,10 +8147,17 @@
   <p:clrMapOvr>
     <a:masterClrMapping/>
   </p:clrMapOvr>
+  <p:timing>
+    <p:tnLst>
+      <p:par>
+        <p:cTn id="1" dur="indefinite" restart="never" nodeType="tmRoot"/>
+      </p:par>
+    </p:tnLst>
+  </p:timing>
 </p:sld>
 </file>
 
-<file path=ppt/slides/slide3.xml><?xml version="1.0" encoding="utf-8"?>
+<file path=ppt/slides/slide4.xml><?xml version="1.0" encoding="utf-8"?>
 <p:sld xmlns:a="http://schemas.openxmlformats.org/drawingml/2006/main" xmlns:r="http://schemas.openxmlformats.org/officeDocument/2006/relationships" xmlns:p="http://schemas.openxmlformats.org/presentationml/2006/main">
   <p:cSld>
     <p:spTree>
@@ -7253,7 +8179,7 @@
           <p:cNvPr id="5" name="Rectángulo 7">
             <a:extLst>
               <a:ext uri="{FF2B5EF4-FFF2-40B4-BE49-F238E27FC236}">
-                <a16:creationId xmlns:a16="http://schemas.microsoft.com/office/drawing/2014/main" id="{1ECC8163-F603-4099-B707-80E03D2D2A6B}"/>
+                <a16:creationId xmlns="" xmlns:a16="http://schemas.microsoft.com/office/drawing/2014/main" id="{1ECC8163-F603-4099-B707-80E03D2D2A6B}"/>
               </a:ext>
             </a:extLst>
           </p:cNvPr>
@@ -7379,8 +8305,8 @@
           <a:lstStyle/>
           <a:p>
             <a:r>
-              <a:rPr lang="es-ES" sz="5000" b="1" u="sng" dirty="0"/>
-              <a:t>Subblock ‘Mapper’</a:t>
+              <a:rPr lang="en-GB" sz="5000" b="1" u="sng" dirty="0" smtClean="0"/>
+              <a:t>Sub-block ‘Mapper’</a:t>
             </a:r>
             <a:endParaRPr lang="en-GB" sz="5000" b="1" u="sng" dirty="0"/>
           </a:p>
@@ -8196,7 +9122,7 @@
           <p:cNvPr id="11" name="Rectángulo 7">
             <a:extLst>
               <a:ext uri="{FF2B5EF4-FFF2-40B4-BE49-F238E27FC236}">
-                <a16:creationId xmlns:a16="http://schemas.microsoft.com/office/drawing/2014/main" id="{71BD35C5-AEBB-4FD4-9D25-E86EF7E0C0D5}"/>
+                <a16:creationId xmlns="" xmlns:a16="http://schemas.microsoft.com/office/drawing/2014/main" id="{71BD35C5-AEBB-4FD4-9D25-E86EF7E0C0D5}"/>
               </a:ext>
             </a:extLst>
           </p:cNvPr>
@@ -8259,7 +9185,7 @@
           <p:cNvPr id="17" name="Verbinder: gewinkelt 16">
             <a:extLst>
               <a:ext uri="{FF2B5EF4-FFF2-40B4-BE49-F238E27FC236}">
-                <a16:creationId xmlns:a16="http://schemas.microsoft.com/office/drawing/2014/main" id="{3AB05A42-C510-4141-ADA2-415420603577}"/>
+                <a16:creationId xmlns="" xmlns:a16="http://schemas.microsoft.com/office/drawing/2014/main" id="{3AB05A42-C510-4141-ADA2-415420603577}"/>
               </a:ext>
             </a:extLst>
           </p:cNvPr>
@@ -8305,7 +9231,7 @@
           <p:cNvPr id="26" name="Gerade Verbindung mit Pfeil 25">
             <a:extLst>
               <a:ext uri="{FF2B5EF4-FFF2-40B4-BE49-F238E27FC236}">
-                <a16:creationId xmlns:a16="http://schemas.microsoft.com/office/drawing/2014/main" id="{DB8EABC4-920D-45BD-842D-61F1DC324FB2}"/>
+                <a16:creationId xmlns="" xmlns:a16="http://schemas.microsoft.com/office/drawing/2014/main" id="{DB8EABC4-920D-45BD-842D-61F1DC324FB2}"/>
               </a:ext>
             </a:extLst>
           </p:cNvPr>
@@ -8349,7 +9275,7 @@
           <p:cNvPr id="45" name="Marcador de contenido 2">
             <a:extLst>
               <a:ext uri="{FF2B5EF4-FFF2-40B4-BE49-F238E27FC236}">
-                <a16:creationId xmlns:a16="http://schemas.microsoft.com/office/drawing/2014/main" id="{3EE211A9-695F-4D32-867F-D6F32A429FE6}"/>
+                <a16:creationId xmlns="" xmlns:a16="http://schemas.microsoft.com/office/drawing/2014/main" id="{3EE211A9-695F-4D32-867F-D6F32A429FE6}"/>
               </a:ext>
             </a:extLst>
           </p:cNvPr>
@@ -8552,7 +9478,7 @@
           <p:cNvPr id="18" name="Gerade Verbindung mit Pfeil 17">
             <a:extLst>
               <a:ext uri="{FF2B5EF4-FFF2-40B4-BE49-F238E27FC236}">
-                <a16:creationId xmlns:a16="http://schemas.microsoft.com/office/drawing/2014/main" id="{B8F7B892-C2D7-45A6-970D-4FD58CB6B03B}"/>
+                <a16:creationId xmlns="" xmlns:a16="http://schemas.microsoft.com/office/drawing/2014/main" id="{B8F7B892-C2D7-45A6-970D-4FD58CB6B03B}"/>
               </a:ext>
             </a:extLst>
           </p:cNvPr>
@@ -8596,7 +9522,7 @@
           <p:cNvPr id="3" name="Marcador de contenido 2">
             <a:extLst>
               <a:ext uri="{FF2B5EF4-FFF2-40B4-BE49-F238E27FC236}">
-                <a16:creationId xmlns:a16="http://schemas.microsoft.com/office/drawing/2014/main" id="{7F380432-ABF4-4795-9B7C-FCFA63447678}"/>
+                <a16:creationId xmlns="" xmlns:a16="http://schemas.microsoft.com/office/drawing/2014/main" id="{7F380432-ABF4-4795-9B7C-FCFA63447678}"/>
               </a:ext>
             </a:extLst>
           </p:cNvPr>
@@ -8841,7 +9767,7 @@
           <p:cNvPr id="22" name="Marcador de contenido 2">
             <a:extLst>
               <a:ext uri="{FF2B5EF4-FFF2-40B4-BE49-F238E27FC236}">
-                <a16:creationId xmlns:a16="http://schemas.microsoft.com/office/drawing/2014/main" id="{A3AF7771-BF25-45F5-884B-16ACFE48791D}"/>
+                <a16:creationId xmlns="" xmlns:a16="http://schemas.microsoft.com/office/drawing/2014/main" id="{A3AF7771-BF25-45F5-884B-16ACFE48791D}"/>
               </a:ext>
             </a:extLst>
           </p:cNvPr>
@@ -9071,10 +9997,17 @@
   <p:clrMapOvr>
     <a:masterClrMapping/>
   </p:clrMapOvr>
+  <p:timing>
+    <p:tnLst>
+      <p:par>
+        <p:cTn id="1" dur="indefinite" restart="never" nodeType="tmRoot"/>
+      </p:par>
+    </p:tnLst>
+  </p:timing>
 </p:sld>
 </file>
 
-<file path=ppt/slides/slide4.xml><?xml version="1.0" encoding="utf-8"?>
+<file path=ppt/slides/slide5.xml><?xml version="1.0" encoding="utf-8"?>
 <p:sld xmlns:a="http://schemas.openxmlformats.org/drawingml/2006/main" xmlns:r="http://schemas.openxmlformats.org/officeDocument/2006/relationships" xmlns:p="http://schemas.openxmlformats.org/presentationml/2006/main">
   <p:cSld>
     <p:spTree>
@@ -9096,7 +10029,7 @@
           <p:cNvPr id="5" name="Rectángulo 7">
             <a:extLst>
               <a:ext uri="{FF2B5EF4-FFF2-40B4-BE49-F238E27FC236}">
-                <a16:creationId xmlns:a16="http://schemas.microsoft.com/office/drawing/2014/main" id="{1ECC8163-F603-4099-B707-80E03D2D2A6B}"/>
+                <a16:creationId xmlns="" xmlns:a16="http://schemas.microsoft.com/office/drawing/2014/main" id="{1ECC8163-F603-4099-B707-80E03D2D2A6B}"/>
               </a:ext>
             </a:extLst>
           </p:cNvPr>
@@ -9233,8 +10166,8 @@
           <a:lstStyle/>
           <a:p>
             <a:r>
-              <a:rPr lang="es-ES" sz="5000" b="1" u="sng" dirty="0"/>
-              <a:t>Subblock ‘Sample Representative’</a:t>
+              <a:rPr lang="en-GB" sz="5000" b="1" u="sng" dirty="0" smtClean="0"/>
+              <a:t>Sub-block ‘Sample Representative’</a:t>
             </a:r>
             <a:endParaRPr lang="en-GB" sz="5000" b="1" u="sng" dirty="0"/>
           </a:p>
@@ -10280,7 +11213,7 @@
           <p:cNvPr id="11" name="Rectángulo 7">
             <a:extLst>
               <a:ext uri="{FF2B5EF4-FFF2-40B4-BE49-F238E27FC236}">
-                <a16:creationId xmlns:a16="http://schemas.microsoft.com/office/drawing/2014/main" id="{71BD35C5-AEBB-4FD4-9D25-E86EF7E0C0D5}"/>
+                <a16:creationId xmlns="" xmlns:a16="http://schemas.microsoft.com/office/drawing/2014/main" id="{71BD35C5-AEBB-4FD4-9D25-E86EF7E0C0D5}"/>
               </a:ext>
             </a:extLst>
           </p:cNvPr>
@@ -10343,7 +11276,7 @@
           <p:cNvPr id="17" name="Verbinder: gewinkelt 16">
             <a:extLst>
               <a:ext uri="{FF2B5EF4-FFF2-40B4-BE49-F238E27FC236}">
-                <a16:creationId xmlns:a16="http://schemas.microsoft.com/office/drawing/2014/main" id="{3AB05A42-C510-4141-ADA2-415420603577}"/>
+                <a16:creationId xmlns="" xmlns:a16="http://schemas.microsoft.com/office/drawing/2014/main" id="{3AB05A42-C510-4141-ADA2-415420603577}"/>
               </a:ext>
             </a:extLst>
           </p:cNvPr>
@@ -10389,7 +11322,7 @@
           <p:cNvPr id="26" name="Gerade Verbindung mit Pfeil 25">
             <a:extLst>
               <a:ext uri="{FF2B5EF4-FFF2-40B4-BE49-F238E27FC236}">
-                <a16:creationId xmlns:a16="http://schemas.microsoft.com/office/drawing/2014/main" id="{DB8EABC4-920D-45BD-842D-61F1DC324FB2}"/>
+                <a16:creationId xmlns="" xmlns:a16="http://schemas.microsoft.com/office/drawing/2014/main" id="{DB8EABC4-920D-45BD-842D-61F1DC324FB2}"/>
               </a:ext>
             </a:extLst>
           </p:cNvPr>
@@ -10433,7 +11366,7 @@
           <p:cNvPr id="50" name="Gerade Verbindung mit Pfeil 49">
             <a:extLst>
               <a:ext uri="{FF2B5EF4-FFF2-40B4-BE49-F238E27FC236}">
-                <a16:creationId xmlns:a16="http://schemas.microsoft.com/office/drawing/2014/main" id="{5F06E84D-000A-4028-A540-78FACC5CD61F}"/>
+                <a16:creationId xmlns="" xmlns:a16="http://schemas.microsoft.com/office/drawing/2014/main" id="{5F06E84D-000A-4028-A540-78FACC5CD61F}"/>
               </a:ext>
             </a:extLst>
           </p:cNvPr>
@@ -10477,7 +11410,7 @@
           <p:cNvPr id="45" name="Marcador de contenido 2">
             <a:extLst>
               <a:ext uri="{FF2B5EF4-FFF2-40B4-BE49-F238E27FC236}">
-                <a16:creationId xmlns:a16="http://schemas.microsoft.com/office/drawing/2014/main" id="{3EE211A9-695F-4D32-867F-D6F32A429FE6}"/>
+                <a16:creationId xmlns="" xmlns:a16="http://schemas.microsoft.com/office/drawing/2014/main" id="{3EE211A9-695F-4D32-867F-D6F32A429FE6}"/>
               </a:ext>
             </a:extLst>
           </p:cNvPr>
@@ -10680,7 +11613,7 @@
           <p:cNvPr id="15" name="Rectángulo 7">
             <a:extLst>
               <a:ext uri="{FF2B5EF4-FFF2-40B4-BE49-F238E27FC236}">
-                <a16:creationId xmlns:a16="http://schemas.microsoft.com/office/drawing/2014/main" id="{B625A4D9-CFEC-4FAC-82EC-2BFA2DCC5868}"/>
+                <a16:creationId xmlns="" xmlns:a16="http://schemas.microsoft.com/office/drawing/2014/main" id="{B625A4D9-CFEC-4FAC-82EC-2BFA2DCC5868}"/>
               </a:ext>
             </a:extLst>
           </p:cNvPr>
@@ -10757,7 +11690,7 @@
           <p:cNvPr id="48" name="Verbinder: gewinkelt 47">
             <a:extLst>
               <a:ext uri="{FF2B5EF4-FFF2-40B4-BE49-F238E27FC236}">
-                <a16:creationId xmlns:a16="http://schemas.microsoft.com/office/drawing/2014/main" id="{DB56B9FE-3839-4A58-8A37-7142F36EE39F}"/>
+                <a16:creationId xmlns="" xmlns:a16="http://schemas.microsoft.com/office/drawing/2014/main" id="{DB56B9FE-3839-4A58-8A37-7142F36EE39F}"/>
               </a:ext>
             </a:extLst>
           </p:cNvPr>
@@ -10803,7 +11736,7 @@
           <p:cNvPr id="53" name="Verbinder: gewinkelt 52">
             <a:extLst>
               <a:ext uri="{FF2B5EF4-FFF2-40B4-BE49-F238E27FC236}">
-                <a16:creationId xmlns:a16="http://schemas.microsoft.com/office/drawing/2014/main" id="{3702386D-9223-4C63-A2B5-3187FE1D4453}"/>
+                <a16:creationId xmlns="" xmlns:a16="http://schemas.microsoft.com/office/drawing/2014/main" id="{3702386D-9223-4C63-A2B5-3187FE1D4453}"/>
               </a:ext>
             </a:extLst>
           </p:cNvPr>
@@ -10850,7 +11783,7 @@
           <p:cNvPr id="56" name="Gerade Verbindung mit Pfeil 55">
             <a:extLst>
               <a:ext uri="{FF2B5EF4-FFF2-40B4-BE49-F238E27FC236}">
-                <a16:creationId xmlns:a16="http://schemas.microsoft.com/office/drawing/2014/main" id="{9D3DCB1B-916C-40EB-9497-CC584C428CDB}"/>
+                <a16:creationId xmlns="" xmlns:a16="http://schemas.microsoft.com/office/drawing/2014/main" id="{9D3DCB1B-916C-40EB-9497-CC584C428CDB}"/>
               </a:ext>
             </a:extLst>
           </p:cNvPr>
@@ -10891,7 +11824,7 @@
           <p:cNvPr id="64" name="Gerade Verbindung mit Pfeil 63">
             <a:extLst>
               <a:ext uri="{FF2B5EF4-FFF2-40B4-BE49-F238E27FC236}">
-                <a16:creationId xmlns:a16="http://schemas.microsoft.com/office/drawing/2014/main" id="{35C35D07-4F11-4963-8F5D-D351F6A8DC85}"/>
+                <a16:creationId xmlns="" xmlns:a16="http://schemas.microsoft.com/office/drawing/2014/main" id="{35C35D07-4F11-4963-8F5D-D351F6A8DC85}"/>
               </a:ext>
             </a:extLst>
           </p:cNvPr>
@@ -10935,7 +11868,7 @@
           <p:cNvPr id="68" name="Gerade Verbindung mit Pfeil 67">
             <a:extLst>
               <a:ext uri="{FF2B5EF4-FFF2-40B4-BE49-F238E27FC236}">
-                <a16:creationId xmlns:a16="http://schemas.microsoft.com/office/drawing/2014/main" id="{A706B8BF-B77D-4323-B72B-61CE0E7289F9}"/>
+                <a16:creationId xmlns="" xmlns:a16="http://schemas.microsoft.com/office/drawing/2014/main" id="{A706B8BF-B77D-4323-B72B-61CE0E7289F9}"/>
               </a:ext>
             </a:extLst>
           </p:cNvPr>
@@ -10979,7 +11912,7 @@
           <p:cNvPr id="66" name="Marcador de contenido 2">
             <a:extLst>
               <a:ext uri="{FF2B5EF4-FFF2-40B4-BE49-F238E27FC236}">
-                <a16:creationId xmlns:a16="http://schemas.microsoft.com/office/drawing/2014/main" id="{67AFBC5F-11DB-4AFD-B983-37506272AC6E}"/>
+                <a16:creationId xmlns="" xmlns:a16="http://schemas.microsoft.com/office/drawing/2014/main" id="{67AFBC5F-11DB-4AFD-B983-37506272AC6E}"/>
               </a:ext>
             </a:extLst>
           </p:cNvPr>
@@ -11215,7 +12148,7 @@
           <p:cNvPr id="69" name="Marcador de contenido 2">
             <a:extLst>
               <a:ext uri="{FF2B5EF4-FFF2-40B4-BE49-F238E27FC236}">
-                <a16:creationId xmlns:a16="http://schemas.microsoft.com/office/drawing/2014/main" id="{83317A75-5D50-4518-9832-3DBDD18B0FE9}"/>
+                <a16:creationId xmlns="" xmlns:a16="http://schemas.microsoft.com/office/drawing/2014/main" id="{83317A75-5D50-4518-9832-3DBDD18B0FE9}"/>
               </a:ext>
             </a:extLst>
           </p:cNvPr>
@@ -11451,7 +12384,7 @@
           <p:cNvPr id="78" name="Verbinder: gewinkelt 77">
             <a:extLst>
               <a:ext uri="{FF2B5EF4-FFF2-40B4-BE49-F238E27FC236}">
-                <a16:creationId xmlns:a16="http://schemas.microsoft.com/office/drawing/2014/main" id="{3B91319E-C7F0-4CAD-97A9-E4944A8721ED}"/>
+                <a16:creationId xmlns="" xmlns:a16="http://schemas.microsoft.com/office/drawing/2014/main" id="{3B91319E-C7F0-4CAD-97A9-E4944A8721ED}"/>
               </a:ext>
             </a:extLst>
           </p:cNvPr>
@@ -11497,7 +12430,7 @@
           <p:cNvPr id="86" name="Marcador de contenido 2">
             <a:extLst>
               <a:ext uri="{FF2B5EF4-FFF2-40B4-BE49-F238E27FC236}">
-                <a16:creationId xmlns:a16="http://schemas.microsoft.com/office/drawing/2014/main" id="{463492BC-41A5-4E3E-9E3F-C639B565FA16}"/>
+                <a16:creationId xmlns="" xmlns:a16="http://schemas.microsoft.com/office/drawing/2014/main" id="{463492BC-41A5-4E3E-9E3F-C639B565FA16}"/>
               </a:ext>
             </a:extLst>
           </p:cNvPr>
@@ -11730,10 +12663,17 @@
   <p:clrMapOvr>
     <a:masterClrMapping/>
   </p:clrMapOvr>
+  <p:timing>
+    <p:tnLst>
+      <p:par>
+        <p:cTn id="1" dur="indefinite" restart="never" nodeType="tmRoot"/>
+      </p:par>
+    </p:tnLst>
+  </p:timing>
 </p:sld>
 </file>
 
-<file path=ppt/slides/slide5.xml><?xml version="1.0" encoding="utf-8"?>
+<file path=ppt/slides/slide6.xml><?xml version="1.0" encoding="utf-8"?>
 <p:sld xmlns:a="http://schemas.openxmlformats.org/drawingml/2006/main" xmlns:r="http://schemas.openxmlformats.org/officeDocument/2006/relationships" xmlns:p="http://schemas.openxmlformats.org/presentationml/2006/main">
   <p:cSld>
     <p:spTree>
@@ -11755,7 +12695,7 @@
           <p:cNvPr id="5" name="Rectángulo 7">
             <a:extLst>
               <a:ext uri="{FF2B5EF4-FFF2-40B4-BE49-F238E27FC236}">
-                <a16:creationId xmlns:a16="http://schemas.microsoft.com/office/drawing/2014/main" id="{1ECC8163-F603-4099-B707-80E03D2D2A6B}"/>
+                <a16:creationId xmlns="" xmlns:a16="http://schemas.microsoft.com/office/drawing/2014/main" id="{1ECC8163-F603-4099-B707-80E03D2D2A6B}"/>
               </a:ext>
             </a:extLst>
           </p:cNvPr>
@@ -11898,18 +12838,18 @@
         <p:spPr>
           <a:xfrm>
             <a:off x="838199" y="365125"/>
-            <a:ext cx="5544127" cy="1325563"/>
+            <a:ext cx="5951265" cy="1325563"/>
           </a:xfrm>
         </p:spPr>
         <p:txBody>
           <a:bodyPr>
-            <a:normAutofit/>
+            <a:noAutofit/>
           </a:bodyPr>
           <a:lstStyle/>
           <a:p>
             <a:r>
-              <a:rPr lang="es-ES" sz="5000" b="1" u="sng" dirty="0"/>
-              <a:t>Subblock ‘Prediction’</a:t>
+              <a:rPr lang="en-GB" sz="5000" b="1" u="sng" dirty="0" smtClean="0"/>
+              <a:t>Sub-block ‘Prediction’</a:t>
             </a:r>
             <a:endParaRPr lang="en-GB" sz="5000" b="1" u="sng" dirty="0"/>
           </a:p>
@@ -12650,7 +13590,7 @@
           <p:cNvPr id="6" name="Rectángulo 7">
             <a:extLst>
               <a:ext uri="{FF2B5EF4-FFF2-40B4-BE49-F238E27FC236}">
-                <a16:creationId xmlns:a16="http://schemas.microsoft.com/office/drawing/2014/main" id="{5903C895-12E9-439D-9159-CC2D857F46B5}"/>
+                <a16:creationId xmlns="" xmlns:a16="http://schemas.microsoft.com/office/drawing/2014/main" id="{5903C895-12E9-439D-9159-CC2D857F46B5}"/>
               </a:ext>
             </a:extLst>
           </p:cNvPr>
@@ -12730,7 +13670,7 @@
           <p:cNvPr id="9" name="Rectángulo 7">
             <a:extLst>
               <a:ext uri="{FF2B5EF4-FFF2-40B4-BE49-F238E27FC236}">
-                <a16:creationId xmlns:a16="http://schemas.microsoft.com/office/drawing/2014/main" id="{FE2AEA42-CDB6-4A48-AF2B-4AD1DBF8AB03}"/>
+                <a16:creationId xmlns="" xmlns:a16="http://schemas.microsoft.com/office/drawing/2014/main" id="{FE2AEA42-CDB6-4A48-AF2B-4AD1DBF8AB03}"/>
               </a:ext>
             </a:extLst>
           </p:cNvPr>
@@ -12810,7 +13750,7 @@
           <p:cNvPr id="10" name="Rectángulo 7">
             <a:extLst>
               <a:ext uri="{FF2B5EF4-FFF2-40B4-BE49-F238E27FC236}">
-                <a16:creationId xmlns:a16="http://schemas.microsoft.com/office/drawing/2014/main" id="{0FE4B587-7F1D-4AE0-8B87-9D22B4A10EAB}"/>
+                <a16:creationId xmlns="" xmlns:a16="http://schemas.microsoft.com/office/drawing/2014/main" id="{0FE4B587-7F1D-4AE0-8B87-9D22B4A10EAB}"/>
               </a:ext>
             </a:extLst>
           </p:cNvPr>
@@ -12882,7 +13822,7 @@
           <p:cNvPr id="12" name="Rectángulo 7">
             <a:extLst>
               <a:ext uri="{FF2B5EF4-FFF2-40B4-BE49-F238E27FC236}">
-                <a16:creationId xmlns:a16="http://schemas.microsoft.com/office/drawing/2014/main" id="{BD2B439C-CEE8-4F32-AED0-65EF9A04DD12}"/>
+                <a16:creationId xmlns="" xmlns:a16="http://schemas.microsoft.com/office/drawing/2014/main" id="{BD2B439C-CEE8-4F32-AED0-65EF9A04DD12}"/>
               </a:ext>
             </a:extLst>
           </p:cNvPr>
@@ -12946,7 +13886,7 @@
           <p:cNvPr id="13" name="Rectángulo 7">
             <a:extLst>
               <a:ext uri="{FF2B5EF4-FFF2-40B4-BE49-F238E27FC236}">
-                <a16:creationId xmlns:a16="http://schemas.microsoft.com/office/drawing/2014/main" id="{22EC68C4-217B-4AE1-950D-BF62F7632DFF}"/>
+                <a16:creationId xmlns="" xmlns:a16="http://schemas.microsoft.com/office/drawing/2014/main" id="{22EC68C4-217B-4AE1-950D-BF62F7632DFF}"/>
               </a:ext>
             </a:extLst>
           </p:cNvPr>
@@ -13002,7 +13942,7 @@
           <p:cNvPr id="15" name="Rectángulo 7">
             <a:extLst>
               <a:ext uri="{FF2B5EF4-FFF2-40B4-BE49-F238E27FC236}">
-                <a16:creationId xmlns:a16="http://schemas.microsoft.com/office/drawing/2014/main" id="{5F7D1610-EEA2-4A89-A7D9-FCC867A8DD33}"/>
+                <a16:creationId xmlns="" xmlns:a16="http://schemas.microsoft.com/office/drawing/2014/main" id="{5F7D1610-EEA2-4A89-A7D9-FCC867A8DD33}"/>
               </a:ext>
             </a:extLst>
           </p:cNvPr>
@@ -13058,7 +13998,7 @@
           <p:cNvPr id="19" name="Rectángulo 7">
             <a:extLst>
               <a:ext uri="{FF2B5EF4-FFF2-40B4-BE49-F238E27FC236}">
-                <a16:creationId xmlns:a16="http://schemas.microsoft.com/office/drawing/2014/main" id="{F016A086-D83E-41A9-BAC8-C9C02AF18D88}"/>
+                <a16:creationId xmlns="" xmlns:a16="http://schemas.microsoft.com/office/drawing/2014/main" id="{F016A086-D83E-41A9-BAC8-C9C02AF18D88}"/>
               </a:ext>
             </a:extLst>
           </p:cNvPr>
@@ -13114,7 +14054,7 @@
           <p:cNvPr id="21" name="Rectángulo 7">
             <a:extLst>
               <a:ext uri="{FF2B5EF4-FFF2-40B4-BE49-F238E27FC236}">
-                <a16:creationId xmlns:a16="http://schemas.microsoft.com/office/drawing/2014/main" id="{D89BC219-78D8-48A1-9D78-97F58D16063A}"/>
+                <a16:creationId xmlns="" xmlns:a16="http://schemas.microsoft.com/office/drawing/2014/main" id="{D89BC219-78D8-48A1-9D78-97F58D16063A}"/>
               </a:ext>
             </a:extLst>
           </p:cNvPr>
@@ -13165,68 +14105,12 @@
           </a:p>
         </p:txBody>
       </p:sp>
-      <p:sp>
-        <p:nvSpPr>
-          <p:cNvPr id="23" name="Rectángulo 7">
-            <a:extLst>
-              <a:ext uri="{FF2B5EF4-FFF2-40B4-BE49-F238E27FC236}">
-                <a16:creationId xmlns:a16="http://schemas.microsoft.com/office/drawing/2014/main" id="{A11A2109-062E-4812-927D-38C165E290A1}"/>
-              </a:ext>
-            </a:extLst>
-          </p:cNvPr>
-          <p:cNvSpPr/>
-          <p:nvPr/>
-        </p:nvSpPr>
-        <p:spPr>
-          <a:xfrm>
-            <a:off x="515131" y="1650044"/>
-            <a:ext cx="1104608" cy="728435"/>
-          </a:xfrm>
-          <a:prstGeom prst="rect">
-            <a:avLst/>
-          </a:prstGeom>
-          <a:solidFill>
-            <a:schemeClr val="tx1"/>
-          </a:solidFill>
-        </p:spPr>
-        <p:style>
-          <a:lnRef idx="2">
-            <a:schemeClr val="accent1">
-              <a:shade val="50000"/>
-            </a:schemeClr>
-          </a:lnRef>
-          <a:fillRef idx="1">
-            <a:schemeClr val="accent1"/>
-          </a:fillRef>
-          <a:effectRef idx="0">
-            <a:schemeClr val="accent1"/>
-          </a:effectRef>
-          <a:fontRef idx="minor">
-            <a:schemeClr val="lt1"/>
-          </a:fontRef>
-        </p:style>
-        <p:txBody>
-          <a:bodyPr rtlCol="0" anchor="ctr"/>
-          <a:lstStyle/>
-          <a:p>
-            <a:pPr algn="ctr"/>
-            <a:r>
-              <a:rPr lang="en-GB" sz="2200" b="1" dirty="0">
-                <a:solidFill>
-                  <a:schemeClr val="bg1"/>
-                </a:solidFill>
-              </a:rPr>
-              <a:t>Sample store</a:t>
-            </a:r>
-          </a:p>
-        </p:txBody>
-      </p:sp>
       <p:cxnSp>
         <p:nvCxnSpPr>
           <p:cNvPr id="35" name="Gerade Verbindung mit Pfeil 34">
             <a:extLst>
               <a:ext uri="{FF2B5EF4-FFF2-40B4-BE49-F238E27FC236}">
-                <a16:creationId xmlns:a16="http://schemas.microsoft.com/office/drawing/2014/main" id="{0801C7E1-4E67-4B3D-BBC0-A1ABB2790C94}"/>
+                <a16:creationId xmlns="" xmlns:a16="http://schemas.microsoft.com/office/drawing/2014/main" id="{0801C7E1-4E67-4B3D-BBC0-A1ABB2790C94}"/>
               </a:ext>
             </a:extLst>
           </p:cNvPr>
@@ -13272,7 +14156,7 @@
           <p:cNvPr id="47" name="Gerade Verbindung mit Pfeil 46">
             <a:extLst>
               <a:ext uri="{FF2B5EF4-FFF2-40B4-BE49-F238E27FC236}">
-                <a16:creationId xmlns:a16="http://schemas.microsoft.com/office/drawing/2014/main" id="{BB85F613-CED4-4663-9529-33358615403B}"/>
+                <a16:creationId xmlns="" xmlns:a16="http://schemas.microsoft.com/office/drawing/2014/main" id="{BB85F613-CED4-4663-9529-33358615403B}"/>
               </a:ext>
             </a:extLst>
           </p:cNvPr>
@@ -13320,7 +14204,7 @@
           <p:cNvPr id="49" name="Verbinder: gewinkelt 48">
             <a:extLst>
               <a:ext uri="{FF2B5EF4-FFF2-40B4-BE49-F238E27FC236}">
-                <a16:creationId xmlns:a16="http://schemas.microsoft.com/office/drawing/2014/main" id="{6E09AE40-8954-4915-B5AF-456622FB63B0}"/>
+                <a16:creationId xmlns="" xmlns:a16="http://schemas.microsoft.com/office/drawing/2014/main" id="{6E09AE40-8954-4915-B5AF-456622FB63B0}"/>
               </a:ext>
             </a:extLst>
           </p:cNvPr>
@@ -13367,7 +14251,7 @@
           <p:cNvPr id="58" name="Gerade Verbindung mit Pfeil 57">
             <a:extLst>
               <a:ext uri="{FF2B5EF4-FFF2-40B4-BE49-F238E27FC236}">
-                <a16:creationId xmlns:a16="http://schemas.microsoft.com/office/drawing/2014/main" id="{B156E089-0A03-4B29-938D-CAD7DD8A32FF}"/>
+                <a16:creationId xmlns="" xmlns:a16="http://schemas.microsoft.com/office/drawing/2014/main" id="{B156E089-0A03-4B29-938D-CAD7DD8A32FF}"/>
               </a:ext>
             </a:extLst>
           </p:cNvPr>
@@ -13413,7 +14297,7 @@
           <p:cNvPr id="62" name="Verbinder: gewinkelt 61">
             <a:extLst>
               <a:ext uri="{FF2B5EF4-FFF2-40B4-BE49-F238E27FC236}">
-                <a16:creationId xmlns:a16="http://schemas.microsoft.com/office/drawing/2014/main" id="{DEF7EEA7-1609-472E-8632-9AB35FE0595A}"/>
+                <a16:creationId xmlns="" xmlns:a16="http://schemas.microsoft.com/office/drawing/2014/main" id="{DEF7EEA7-1609-472E-8632-9AB35FE0595A}"/>
               </a:ext>
             </a:extLst>
           </p:cNvPr>
@@ -13460,7 +14344,7 @@
           <p:cNvPr id="64" name="Gerade Verbindung mit Pfeil 63">
             <a:extLst>
               <a:ext uri="{FF2B5EF4-FFF2-40B4-BE49-F238E27FC236}">
-                <a16:creationId xmlns:a16="http://schemas.microsoft.com/office/drawing/2014/main" id="{F3F9138E-22B1-41CD-B502-F19F637F0C54}"/>
+                <a16:creationId xmlns="" xmlns:a16="http://schemas.microsoft.com/office/drawing/2014/main" id="{F3F9138E-22B1-41CD-B502-F19F637F0C54}"/>
               </a:ext>
             </a:extLst>
           </p:cNvPr>
@@ -13507,7 +14391,7 @@
           <p:cNvPr id="66" name="Gerade Verbindung mit Pfeil 65">
             <a:extLst>
               <a:ext uri="{FF2B5EF4-FFF2-40B4-BE49-F238E27FC236}">
-                <a16:creationId xmlns:a16="http://schemas.microsoft.com/office/drawing/2014/main" id="{CC51581C-AA6A-4C49-A9F2-F1BE3BD0794A}"/>
+                <a16:creationId xmlns="" xmlns:a16="http://schemas.microsoft.com/office/drawing/2014/main" id="{CC51581C-AA6A-4C49-A9F2-F1BE3BD0794A}"/>
               </a:ext>
             </a:extLst>
           </p:cNvPr>
@@ -13551,7 +14435,7 @@
           <p:cNvPr id="68" name="Gerade Verbindung mit Pfeil 67">
             <a:extLst>
               <a:ext uri="{FF2B5EF4-FFF2-40B4-BE49-F238E27FC236}">
-                <a16:creationId xmlns:a16="http://schemas.microsoft.com/office/drawing/2014/main" id="{D74EFDDC-F45A-4A39-ABB6-DEC1AF1A13EB}"/>
+                <a16:creationId xmlns="" xmlns:a16="http://schemas.microsoft.com/office/drawing/2014/main" id="{D74EFDDC-F45A-4A39-ABB6-DEC1AF1A13EB}"/>
               </a:ext>
             </a:extLst>
           </p:cNvPr>
@@ -13596,7 +14480,7 @@
           <p:cNvPr id="77" name="Gerade Verbindung mit Pfeil 76">
             <a:extLst>
               <a:ext uri="{FF2B5EF4-FFF2-40B4-BE49-F238E27FC236}">
-                <a16:creationId xmlns:a16="http://schemas.microsoft.com/office/drawing/2014/main" id="{762E819D-8F2D-408C-B871-AFE9B9BD4758}"/>
+                <a16:creationId xmlns="" xmlns:a16="http://schemas.microsoft.com/office/drawing/2014/main" id="{762E819D-8F2D-408C-B871-AFE9B9BD4758}"/>
               </a:ext>
             </a:extLst>
           </p:cNvPr>
@@ -13641,7 +14525,7 @@
           <p:cNvPr id="84" name="Verbinder: gewinkelt 83">
             <a:extLst>
               <a:ext uri="{FF2B5EF4-FFF2-40B4-BE49-F238E27FC236}">
-                <a16:creationId xmlns:a16="http://schemas.microsoft.com/office/drawing/2014/main" id="{EAC92638-4F92-484D-9D68-76A311C79DB9}"/>
+                <a16:creationId xmlns="" xmlns:a16="http://schemas.microsoft.com/office/drawing/2014/main" id="{EAC92638-4F92-484D-9D68-76A311C79DB9}"/>
               </a:ext>
             </a:extLst>
           </p:cNvPr>
@@ -13685,7 +14569,7 @@
           <p:cNvPr id="89" name="Verbinder: gewinkelt 88">
             <a:extLst>
               <a:ext uri="{FF2B5EF4-FFF2-40B4-BE49-F238E27FC236}">
-                <a16:creationId xmlns:a16="http://schemas.microsoft.com/office/drawing/2014/main" id="{F6A8991C-54FD-4BC6-BBE4-E8FD6B443304}"/>
+                <a16:creationId xmlns="" xmlns:a16="http://schemas.microsoft.com/office/drawing/2014/main" id="{F6A8991C-54FD-4BC6-BBE4-E8FD6B443304}"/>
               </a:ext>
             </a:extLst>
           </p:cNvPr>
@@ -13731,7 +14615,7 @@
           <p:cNvPr id="94" name="Gerade Verbindung mit Pfeil 93">
             <a:extLst>
               <a:ext uri="{FF2B5EF4-FFF2-40B4-BE49-F238E27FC236}">
-                <a16:creationId xmlns:a16="http://schemas.microsoft.com/office/drawing/2014/main" id="{211FC14A-D98B-461D-AC7E-A1580AC3803D}"/>
+                <a16:creationId xmlns="" xmlns:a16="http://schemas.microsoft.com/office/drawing/2014/main" id="{211FC14A-D98B-461D-AC7E-A1580AC3803D}"/>
               </a:ext>
             </a:extLst>
           </p:cNvPr>
@@ -13776,7 +14660,7 @@
           <p:cNvPr id="106" name="Gerade Verbindung mit Pfeil 105">
             <a:extLst>
               <a:ext uri="{FF2B5EF4-FFF2-40B4-BE49-F238E27FC236}">
-                <a16:creationId xmlns:a16="http://schemas.microsoft.com/office/drawing/2014/main" id="{6456C598-7929-4E21-BDD5-5F2BBEF95CDE}"/>
+                <a16:creationId xmlns="" xmlns:a16="http://schemas.microsoft.com/office/drawing/2014/main" id="{6456C598-7929-4E21-BDD5-5F2BBEF95CDE}"/>
               </a:ext>
             </a:extLst>
           </p:cNvPr>
@@ -13820,7 +14704,7 @@
           <p:cNvPr id="112" name="Verbinder: gewinkelt 111">
             <a:extLst>
               <a:ext uri="{FF2B5EF4-FFF2-40B4-BE49-F238E27FC236}">
-                <a16:creationId xmlns:a16="http://schemas.microsoft.com/office/drawing/2014/main" id="{11754048-6F6B-4FE9-ACC8-B27B40CAB5B9}"/>
+                <a16:creationId xmlns="" xmlns:a16="http://schemas.microsoft.com/office/drawing/2014/main" id="{11754048-6F6B-4FE9-ACC8-B27B40CAB5B9}"/>
               </a:ext>
             </a:extLst>
           </p:cNvPr>
@@ -13866,7 +14750,7 @@
           <p:cNvPr id="115" name="Gerade Verbindung mit Pfeil 114">
             <a:extLst>
               <a:ext uri="{FF2B5EF4-FFF2-40B4-BE49-F238E27FC236}">
-                <a16:creationId xmlns:a16="http://schemas.microsoft.com/office/drawing/2014/main" id="{EB4D37A0-899A-4135-B446-D504B7B66BA1}"/>
+                <a16:creationId xmlns="" xmlns:a16="http://schemas.microsoft.com/office/drawing/2014/main" id="{EB4D37A0-899A-4135-B446-D504B7B66BA1}"/>
               </a:ext>
             </a:extLst>
           </p:cNvPr>
@@ -13911,7 +14795,7 @@
           <p:cNvPr id="120" name="Gerade Verbindung mit Pfeil 119">
             <a:extLst>
               <a:ext uri="{FF2B5EF4-FFF2-40B4-BE49-F238E27FC236}">
-                <a16:creationId xmlns:a16="http://schemas.microsoft.com/office/drawing/2014/main" id="{91801948-4FEA-4FDD-AF58-00FFB683304C}"/>
+                <a16:creationId xmlns="" xmlns:a16="http://schemas.microsoft.com/office/drawing/2014/main" id="{91801948-4FEA-4FDD-AF58-00FFB683304C}"/>
               </a:ext>
             </a:extLst>
           </p:cNvPr>
@@ -13955,7 +14839,7 @@
           <p:cNvPr id="125" name="Verbinder: gewinkelt 124">
             <a:extLst>
               <a:ext uri="{FF2B5EF4-FFF2-40B4-BE49-F238E27FC236}">
-                <a16:creationId xmlns:a16="http://schemas.microsoft.com/office/drawing/2014/main" id="{CA5402BA-A1E7-4E98-A3FC-1DADCE9EF67B}"/>
+                <a16:creationId xmlns="" xmlns:a16="http://schemas.microsoft.com/office/drawing/2014/main" id="{CA5402BA-A1E7-4E98-A3FC-1DADCE9EF67B}"/>
               </a:ext>
             </a:extLst>
           </p:cNvPr>
@@ -14001,7 +14885,7 @@
           <p:cNvPr id="132" name="Gerade Verbindung mit Pfeil 131">
             <a:extLst>
               <a:ext uri="{FF2B5EF4-FFF2-40B4-BE49-F238E27FC236}">
-                <a16:creationId xmlns:a16="http://schemas.microsoft.com/office/drawing/2014/main" id="{9F2F45A7-2831-470F-8445-96018BF8ACBF}"/>
+                <a16:creationId xmlns="" xmlns:a16="http://schemas.microsoft.com/office/drawing/2014/main" id="{9F2F45A7-2831-470F-8445-96018BF8ACBF}"/>
               </a:ext>
             </a:extLst>
           </p:cNvPr>
@@ -14045,7 +14929,7 @@
           <p:cNvPr id="136" name="Marcador de contenido 2">
             <a:extLst>
               <a:ext uri="{FF2B5EF4-FFF2-40B4-BE49-F238E27FC236}">
-                <a16:creationId xmlns:a16="http://schemas.microsoft.com/office/drawing/2014/main" id="{9E7F5DF6-DB42-477A-BCDB-54940BDE3B0D}"/>
+                <a16:creationId xmlns="" xmlns:a16="http://schemas.microsoft.com/office/drawing/2014/main" id="{9E7F5DF6-DB42-477A-BCDB-54940BDE3B0D}"/>
               </a:ext>
             </a:extLst>
           </p:cNvPr>
@@ -14248,7 +15132,7 @@
           <p:cNvPr id="137" name="Marcador de contenido 2">
             <a:extLst>
               <a:ext uri="{FF2B5EF4-FFF2-40B4-BE49-F238E27FC236}">
-                <a16:creationId xmlns:a16="http://schemas.microsoft.com/office/drawing/2014/main" id="{7B57F5B3-B11D-4773-ABA8-8E37D808C96E}"/>
+                <a16:creationId xmlns="" xmlns:a16="http://schemas.microsoft.com/office/drawing/2014/main" id="{7B57F5B3-B11D-4773-ABA8-8E37D808C96E}"/>
               </a:ext>
             </a:extLst>
           </p:cNvPr>
@@ -14311,7 +15195,7 @@
           <p:cNvPr id="140" name="Marcador de contenido 2">
             <a:extLst>
               <a:ext uri="{FF2B5EF4-FFF2-40B4-BE49-F238E27FC236}">
-                <a16:creationId xmlns:a16="http://schemas.microsoft.com/office/drawing/2014/main" id="{1B1D93A2-19D6-4A7B-83CA-E2306ADF6B29}"/>
+                <a16:creationId xmlns="" xmlns:a16="http://schemas.microsoft.com/office/drawing/2014/main" id="{1B1D93A2-19D6-4A7B-83CA-E2306ADF6B29}"/>
               </a:ext>
             </a:extLst>
           </p:cNvPr>
@@ -14547,7 +15431,7 @@
           <p:cNvPr id="144" name="Marcador de contenido 2">
             <a:extLst>
               <a:ext uri="{FF2B5EF4-FFF2-40B4-BE49-F238E27FC236}">
-                <a16:creationId xmlns:a16="http://schemas.microsoft.com/office/drawing/2014/main" id="{A9A917FF-0AC7-4D10-A980-6469F8FD6FA2}"/>
+                <a16:creationId xmlns="" xmlns:a16="http://schemas.microsoft.com/office/drawing/2014/main" id="{A9A917FF-0AC7-4D10-A980-6469F8FD6FA2}"/>
               </a:ext>
             </a:extLst>
           </p:cNvPr>
@@ -14783,7 +15667,7 @@
           <p:cNvPr id="146" name="Verbinder: gewinkelt 145">
             <a:extLst>
               <a:ext uri="{FF2B5EF4-FFF2-40B4-BE49-F238E27FC236}">
-                <a16:creationId xmlns:a16="http://schemas.microsoft.com/office/drawing/2014/main" id="{89313719-E4E4-48D9-AF45-2121C583856D}"/>
+                <a16:creationId xmlns="" xmlns:a16="http://schemas.microsoft.com/office/drawing/2014/main" id="{89313719-E4E4-48D9-AF45-2121C583856D}"/>
               </a:ext>
             </a:extLst>
           </p:cNvPr>
@@ -14827,7 +15711,7 @@
           <p:cNvPr id="149" name="Marcador de contenido 2">
             <a:extLst>
               <a:ext uri="{FF2B5EF4-FFF2-40B4-BE49-F238E27FC236}">
-                <a16:creationId xmlns:a16="http://schemas.microsoft.com/office/drawing/2014/main" id="{2B3DD6B4-9F02-4ECC-88CF-70B0A026EC38}"/>
+                <a16:creationId xmlns="" xmlns:a16="http://schemas.microsoft.com/office/drawing/2014/main" id="{2B3DD6B4-9F02-4ECC-88CF-70B0A026EC38}"/>
               </a:ext>
             </a:extLst>
           </p:cNvPr>
@@ -15055,7 +15939,7 @@
           <p:cNvPr id="3" name="Marcador de contenido 2">
             <a:extLst>
               <a:ext uri="{FF2B5EF4-FFF2-40B4-BE49-F238E27FC236}">
-                <a16:creationId xmlns:a16="http://schemas.microsoft.com/office/drawing/2014/main" id="{309DCB6A-B000-4AAF-8397-D5EAB2A61565}"/>
+                <a16:creationId xmlns="" xmlns:a16="http://schemas.microsoft.com/office/drawing/2014/main" id="{309DCB6A-B000-4AAF-8397-D5EAB2A61565}"/>
               </a:ext>
             </a:extLst>
           </p:cNvPr>
@@ -15282,7 +16166,7 @@
           <p:cNvPr id="4" name="Marcador de contenido 2">
             <a:extLst>
               <a:ext uri="{FF2B5EF4-FFF2-40B4-BE49-F238E27FC236}">
-                <a16:creationId xmlns:a16="http://schemas.microsoft.com/office/drawing/2014/main" id="{7F4154C4-7488-49F4-8E8F-ED198FE30F5A}"/>
+                <a16:creationId xmlns="" xmlns:a16="http://schemas.microsoft.com/office/drawing/2014/main" id="{7F4154C4-7488-49F4-8E8F-ED198FE30F5A}"/>
               </a:ext>
             </a:extLst>
           </p:cNvPr>
@@ -15533,7 +16417,7 @@
           <p:cNvPr id="11" name="Marcador de contenido 2">
             <a:extLst>
               <a:ext uri="{FF2B5EF4-FFF2-40B4-BE49-F238E27FC236}">
-                <a16:creationId xmlns:a16="http://schemas.microsoft.com/office/drawing/2014/main" id="{E7451AF3-B598-423C-915F-0F32771B3A10}"/>
+                <a16:creationId xmlns="" xmlns:a16="http://schemas.microsoft.com/office/drawing/2014/main" id="{E7451AF3-B598-423C-915F-0F32771B3A10}"/>
               </a:ext>
             </a:extLst>
           </p:cNvPr>
@@ -15769,7 +16653,7 @@
           <p:cNvPr id="14" name="Marcador de contenido 2">
             <a:extLst>
               <a:ext uri="{FF2B5EF4-FFF2-40B4-BE49-F238E27FC236}">
-                <a16:creationId xmlns:a16="http://schemas.microsoft.com/office/drawing/2014/main" id="{54EFD35A-3ECC-4C4F-9450-D32D942809E1}"/>
+                <a16:creationId xmlns="" xmlns:a16="http://schemas.microsoft.com/office/drawing/2014/main" id="{54EFD35A-3ECC-4C4F-9450-D32D942809E1}"/>
               </a:ext>
             </a:extLst>
           </p:cNvPr>
@@ -15996,7 +16880,7 @@
           <p:cNvPr id="16" name="Marcador de contenido 2">
             <a:extLst>
               <a:ext uri="{FF2B5EF4-FFF2-40B4-BE49-F238E27FC236}">
-                <a16:creationId xmlns:a16="http://schemas.microsoft.com/office/drawing/2014/main" id="{8E70CBE7-1859-4051-9307-E7A681B55F66}"/>
+                <a16:creationId xmlns="" xmlns:a16="http://schemas.microsoft.com/office/drawing/2014/main" id="{8E70CBE7-1859-4051-9307-E7A681B55F66}"/>
               </a:ext>
             </a:extLst>
           </p:cNvPr>
@@ -16231,7 +17115,7 @@
           <p:cNvPr id="31" name="Marcador de contenido 2">
             <a:extLst>
               <a:ext uri="{FF2B5EF4-FFF2-40B4-BE49-F238E27FC236}">
-                <a16:creationId xmlns:a16="http://schemas.microsoft.com/office/drawing/2014/main" id="{29748B47-B27C-480F-BE2A-C31E3BE2D44B}"/>
+                <a16:creationId xmlns="" xmlns:a16="http://schemas.microsoft.com/office/drawing/2014/main" id="{29748B47-B27C-480F-BE2A-C31E3BE2D44B}"/>
               </a:ext>
             </a:extLst>
           </p:cNvPr>
@@ -16466,7 +17350,7 @@
           <p:cNvPr id="20" name="Marcador de contenido 2">
             <a:extLst>
               <a:ext uri="{FF2B5EF4-FFF2-40B4-BE49-F238E27FC236}">
-                <a16:creationId xmlns:a16="http://schemas.microsoft.com/office/drawing/2014/main" id="{1315786D-D146-400B-B9F6-208743877097}"/>
+                <a16:creationId xmlns="" xmlns:a16="http://schemas.microsoft.com/office/drawing/2014/main" id="{1315786D-D146-400B-B9F6-208743877097}"/>
               </a:ext>
             </a:extLst>
           </p:cNvPr>
@@ -16705,7 +17589,7 @@
           <p:cNvPr id="7" name="Rectángulo 7">
             <a:extLst>
               <a:ext uri="{FF2B5EF4-FFF2-40B4-BE49-F238E27FC236}">
-                <a16:creationId xmlns:a16="http://schemas.microsoft.com/office/drawing/2014/main" id="{1F0890FE-F9FE-453E-92EA-6F6CDB43F4C1}"/>
+                <a16:creationId xmlns="" xmlns:a16="http://schemas.microsoft.com/office/drawing/2014/main" id="{1F0890FE-F9FE-453E-92EA-6F6CDB43F4C1}"/>
               </a:ext>
             </a:extLst>
           </p:cNvPr>
@@ -16772,6 +17656,62 @@
           </a:p>
         </p:txBody>
       </p:sp>
+      <p:sp>
+        <p:nvSpPr>
+          <p:cNvPr id="23" name="Rectángulo 7">
+            <a:extLst>
+              <a:ext uri="{FF2B5EF4-FFF2-40B4-BE49-F238E27FC236}">
+                <a16:creationId xmlns="" xmlns:a16="http://schemas.microsoft.com/office/drawing/2014/main" id="{A11A2109-062E-4812-927D-38C165E290A1}"/>
+              </a:ext>
+            </a:extLst>
+          </p:cNvPr>
+          <p:cNvSpPr/>
+          <p:nvPr/>
+        </p:nvSpPr>
+        <p:spPr>
+          <a:xfrm>
+            <a:off x="515131" y="1650044"/>
+            <a:ext cx="1104608" cy="728435"/>
+          </a:xfrm>
+          <a:prstGeom prst="rect">
+            <a:avLst/>
+          </a:prstGeom>
+          <a:solidFill>
+            <a:schemeClr val="tx1"/>
+          </a:solidFill>
+        </p:spPr>
+        <p:style>
+          <a:lnRef idx="2">
+            <a:schemeClr val="accent1">
+              <a:shade val="50000"/>
+            </a:schemeClr>
+          </a:lnRef>
+          <a:fillRef idx="1">
+            <a:schemeClr val="accent1"/>
+          </a:fillRef>
+          <a:effectRef idx="0">
+            <a:schemeClr val="accent1"/>
+          </a:effectRef>
+          <a:fontRef idx="minor">
+            <a:schemeClr val="lt1"/>
+          </a:fontRef>
+        </p:style>
+        <p:txBody>
+          <a:bodyPr rtlCol="0" anchor="ctr"/>
+          <a:lstStyle/>
+          <a:p>
+            <a:pPr algn="ctr"/>
+            <a:r>
+              <a:rPr lang="en-GB" sz="2200" b="1" dirty="0">
+                <a:solidFill>
+                  <a:schemeClr val="bg1"/>
+                </a:solidFill>
+              </a:rPr>
+              <a:t>Sample store</a:t>
+            </a:r>
+          </a:p>
+        </p:txBody>
+      </p:sp>
     </p:spTree>
     <p:extLst>
       <p:ext uri="{BB962C8B-B14F-4D97-AF65-F5344CB8AC3E}">
@@ -16782,6 +17722,13 @@
   <p:clrMapOvr>
     <a:masterClrMapping/>
   </p:clrMapOvr>
+  <p:timing>
+    <p:tnLst>
+      <p:par>
+        <p:cTn id="1" dur="indefinite" restart="never" nodeType="tmRoot"/>
+      </p:par>
+    </p:tnLst>
+  </p:timing>
 </p:sld>
 </file>
 

</xml_diff>

<commit_message>
Encoder integration within top design. WIP 2
</commit_message>
<xml_diff>
--- a/Block diagram.pptx
+++ b/Block diagram.pptx
@@ -3757,7 +3757,7 @@
           <p:cNvPr id="16" name="Rectángulo 7">
             <a:extLst>
               <a:ext uri="{FF2B5EF4-FFF2-40B4-BE49-F238E27FC236}">
-                <a16:creationId xmlns:a16="http://schemas.microsoft.com/office/drawing/2014/main" xmlns="" id="{1ECC8163-F603-4099-B707-80E03D2D2A6B}"/>
+                <a16:creationId xmlns="" xmlns:a16="http://schemas.microsoft.com/office/drawing/2014/main" id="{1ECC8163-F603-4099-B707-80E03D2D2A6B}"/>
               </a:ext>
             </a:extLst>
           </p:cNvPr>
@@ -3766,7 +3766,7 @@
         </p:nvSpPr>
         <p:spPr>
           <a:xfrm>
-            <a:off x="1885364" y="2045618"/>
+            <a:off x="1923072" y="2045618"/>
             <a:ext cx="8644379" cy="3704734"/>
           </a:xfrm>
           <a:prstGeom prst="rect">
@@ -3908,7 +3908,7 @@
         </p:nvSpPr>
         <p:spPr>
           <a:xfrm>
-            <a:off x="5014274" y="3288456"/>
+            <a:off x="5051982" y="3288456"/>
             <a:ext cx="1952135" cy="1358957"/>
           </a:xfrm>
           <a:prstGeom prst="rect">
@@ -3963,7 +3963,7 @@
         </p:nvCxnSpPr>
         <p:spPr>
           <a:xfrm>
-            <a:off x="688160" y="3628567"/>
+            <a:off x="725868" y="3628567"/>
             <a:ext cx="4326114" cy="0"/>
           </a:xfrm>
           <a:prstGeom prst="straightConnector1">
@@ -4003,8 +4003,8 @@
         </p:nvSpPr>
         <p:spPr>
           <a:xfrm>
-            <a:off x="47137" y="2921186"/>
-            <a:ext cx="1923069" cy="734539"/>
+            <a:off x="84845" y="2921186"/>
+            <a:ext cx="1838227" cy="734539"/>
           </a:xfrm>
         </p:spPr>
         <p:txBody>
@@ -4079,7 +4079,7 @@
         </p:nvCxnSpPr>
         <p:spPr>
           <a:xfrm>
-            <a:off x="6963740" y="3628567"/>
+            <a:off x="7001448" y="3628567"/>
             <a:ext cx="1423447" cy="1"/>
           </a:xfrm>
           <a:prstGeom prst="straightConnector1">
@@ -4117,7 +4117,7 @@
         </p:nvSpPr>
         <p:spPr>
           <a:xfrm>
-            <a:off x="6245260" y="2921186"/>
+            <a:off x="6301822" y="2921186"/>
             <a:ext cx="2175709" cy="719352"/>
           </a:xfrm>
           <a:prstGeom prst="rect">
@@ -4318,15 +4318,7 @@
                   <a:srgbClr val="FFC000"/>
                 </a:solidFill>
               </a:rPr>
-              <a:t> </a:t>
-            </a:r>
-            <a:r>
-              <a:rPr lang="en-GB" sz="2000" b="1" dirty="0" smtClean="0">
-                <a:solidFill>
-                  <a:srgbClr val="FFC000"/>
-                </a:solidFill>
-              </a:rPr>
-              <a:t>index “</a:t>
+              <a:t> index “</a:t>
             </a:r>
             <a:r>
               <a:rPr lang="el-GR" sz="2000" b="1" dirty="0" smtClean="0">
@@ -4376,7 +4368,7 @@
         </p:nvSpPr>
         <p:spPr>
           <a:xfrm>
-            <a:off x="8401799" y="3288456"/>
+            <a:off x="8439507" y="3288456"/>
             <a:ext cx="1952136" cy="1358957"/>
           </a:xfrm>
           <a:prstGeom prst="rect">
@@ -4446,7 +4438,7 @@
         </p:nvCxnSpPr>
         <p:spPr>
           <a:xfrm>
-            <a:off x="10346077" y="3967934"/>
+            <a:off x="10383785" y="3967934"/>
             <a:ext cx="1423447" cy="1"/>
           </a:xfrm>
           <a:prstGeom prst="straightConnector1">
@@ -4484,8 +4476,8 @@
         </p:nvSpPr>
         <p:spPr>
           <a:xfrm>
-            <a:off x="10543570" y="3288456"/>
-            <a:ext cx="1588730" cy="679478"/>
+            <a:off x="10581278" y="3288456"/>
+            <a:ext cx="1532166" cy="679478"/>
           </a:xfrm>
           <a:prstGeom prst="rect">
             <a:avLst/>
@@ -4689,7 +4681,7 @@
         </p:nvCxnSpPr>
         <p:spPr>
           <a:xfrm>
-            <a:off x="3565218" y="4327723"/>
+            <a:off x="3602926" y="4327723"/>
             <a:ext cx="1450626" cy="1"/>
           </a:xfrm>
           <a:prstGeom prst="straightConnector1">
@@ -4727,7 +4719,7 @@
         </p:nvSpPr>
         <p:spPr>
           <a:xfrm>
-            <a:off x="3469067" y="4349848"/>
+            <a:off x="3506775" y="4349848"/>
             <a:ext cx="1565942" cy="688568"/>
           </a:xfrm>
           <a:prstGeom prst="rect">
@@ -4955,7 +4947,7 @@
         </p:nvCxnSpPr>
         <p:spPr>
           <a:xfrm>
-            <a:off x="6964525" y="4327723"/>
+            <a:off x="7002233" y="4327723"/>
             <a:ext cx="1423447" cy="1"/>
           </a:xfrm>
           <a:prstGeom prst="straightConnector1">
@@ -4993,7 +4985,7 @@
         </p:nvSpPr>
         <p:spPr>
           <a:xfrm>
-            <a:off x="6875912" y="4364611"/>
+            <a:off x="6913620" y="4364611"/>
             <a:ext cx="1561394" cy="653793"/>
           </a:xfrm>
           <a:prstGeom prst="rect">
@@ -5213,7 +5205,7 @@
         </p:nvSpPr>
         <p:spPr>
           <a:xfrm>
-            <a:off x="2072640" y="3954989"/>
+            <a:off x="2110348" y="3954989"/>
             <a:ext cx="1492578" cy="745468"/>
           </a:xfrm>
           <a:prstGeom prst="rect">
@@ -5293,8 +5285,8 @@
         </p:nvSpPr>
         <p:spPr>
           <a:xfrm>
-            <a:off x="141405" y="4960067"/>
-            <a:ext cx="1730132" cy="734539"/>
+            <a:off x="179113" y="4366179"/>
+            <a:ext cx="1730132" cy="652398"/>
           </a:xfrm>
           <a:prstGeom prst="rect">
             <a:avLst/>
@@ -5512,13 +5504,13 @@
           <p:nvPr/>
         </p:nvCxnSpPr>
         <p:spPr>
-          <a:xfrm flipV="1">
-            <a:off x="979604" y="4647415"/>
-            <a:ext cx="4671373" cy="923827"/>
+          <a:xfrm rot="5400000" flipH="1" flipV="1">
+            <a:off x="4076456" y="3088228"/>
+            <a:ext cx="53044" cy="3171413"/>
           </a:xfrm>
           <a:prstGeom prst="bentConnector3">
             <a:avLst>
-              <a:gd name="adj1" fmla="val 100046"/>
+              <a:gd name="adj1" fmla="val -1586127"/>
             </a:avLst>
           </a:prstGeom>
           <a:ln w="38100">
@@ -5548,7 +5540,7 @@
         </p:nvCxnSpPr>
         <p:spPr>
           <a:xfrm rot="5400000">
-            <a:off x="8042325" y="2953651"/>
+            <a:off x="8080033" y="2953651"/>
             <a:ext cx="12700" cy="3387525"/>
           </a:xfrm>
           <a:prstGeom prst="bentConnector3">
@@ -5586,7 +5578,7 @@
         </p:nvSpPr>
         <p:spPr>
           <a:xfrm>
-            <a:off x="6545728" y="5207889"/>
+            <a:off x="6583436" y="5207889"/>
             <a:ext cx="3005893" cy="355420"/>
           </a:xfrm>
           <a:prstGeom prst="rect">
@@ -5762,7 +5754,7 @@
             </a:lvl9pPr>
           </a:lstStyle>
           <a:p>
-            <a:pPr marL="0" indent="0" algn="r">
+            <a:pPr marL="0" indent="0" algn="ctr">
               <a:buFont typeface="Arial" panose="020B0604020202020204" pitchFamily="34" charset="0"/>
               <a:buNone/>
             </a:pPr>
@@ -5798,6 +5790,266 @@
           </a:p>
         </p:txBody>
       </p:sp>
+      <p:sp>
+        <p:nvSpPr>
+          <p:cNvPr id="27" name="Marcador de contenido 2"/>
+          <p:cNvSpPr txBox="1">
+            <a:spLocks/>
+          </p:cNvSpPr>
+          <p:nvPr/>
+        </p:nvSpPr>
+        <p:spPr>
+          <a:xfrm>
+            <a:off x="2599421" y="5207889"/>
+            <a:ext cx="3005893" cy="355420"/>
+          </a:xfrm>
+          <a:prstGeom prst="rect">
+            <a:avLst/>
+          </a:prstGeom>
+        </p:spPr>
+        <p:txBody>
+          <a:bodyPr vert="horz" lIns="91440" tIns="45720" rIns="91440" bIns="45720" rtlCol="0">
+            <a:noAutofit/>
+          </a:bodyPr>
+          <a:lstStyle>
+            <a:lvl1pPr marL="228600" indent="-228600" algn="l" defTabSz="914400" rtl="0" eaLnBrk="1" latinLnBrk="0" hangingPunct="1">
+              <a:lnSpc>
+                <a:spcPct val="90000"/>
+              </a:lnSpc>
+              <a:spcBef>
+                <a:spcPts val="1000"/>
+              </a:spcBef>
+              <a:buFont typeface="Arial" panose="020B0604020202020204" pitchFamily="34" charset="0"/>
+              <a:buChar char="•"/>
+              <a:defRPr sz="2800" kern="1200">
+                <a:solidFill>
+                  <a:schemeClr val="tx1"/>
+                </a:solidFill>
+                <a:latin typeface="+mn-lt"/>
+                <a:ea typeface="+mn-ea"/>
+                <a:cs typeface="+mn-cs"/>
+              </a:defRPr>
+            </a:lvl1pPr>
+            <a:lvl2pPr marL="685800" indent="-228600" algn="l" defTabSz="914400" rtl="0" eaLnBrk="1" latinLnBrk="0" hangingPunct="1">
+              <a:lnSpc>
+                <a:spcPct val="90000"/>
+              </a:lnSpc>
+              <a:spcBef>
+                <a:spcPts val="500"/>
+              </a:spcBef>
+              <a:buFont typeface="Arial" panose="020B0604020202020204" pitchFamily="34" charset="0"/>
+              <a:buChar char="•"/>
+              <a:defRPr sz="2400" kern="1200">
+                <a:solidFill>
+                  <a:schemeClr val="tx1"/>
+                </a:solidFill>
+                <a:latin typeface="+mn-lt"/>
+                <a:ea typeface="+mn-ea"/>
+                <a:cs typeface="+mn-cs"/>
+              </a:defRPr>
+            </a:lvl2pPr>
+            <a:lvl3pPr marL="1143000" indent="-228600" algn="l" defTabSz="914400" rtl="0" eaLnBrk="1" latinLnBrk="0" hangingPunct="1">
+              <a:lnSpc>
+                <a:spcPct val="90000"/>
+              </a:lnSpc>
+              <a:spcBef>
+                <a:spcPts val="500"/>
+              </a:spcBef>
+              <a:buFont typeface="Arial" panose="020B0604020202020204" pitchFamily="34" charset="0"/>
+              <a:buChar char="•"/>
+              <a:defRPr sz="2000" kern="1200">
+                <a:solidFill>
+                  <a:schemeClr val="tx1"/>
+                </a:solidFill>
+                <a:latin typeface="+mn-lt"/>
+                <a:ea typeface="+mn-ea"/>
+                <a:cs typeface="+mn-cs"/>
+              </a:defRPr>
+            </a:lvl3pPr>
+            <a:lvl4pPr marL="1600200" indent="-228600" algn="l" defTabSz="914400" rtl="0" eaLnBrk="1" latinLnBrk="0" hangingPunct="1">
+              <a:lnSpc>
+                <a:spcPct val="90000"/>
+              </a:lnSpc>
+              <a:spcBef>
+                <a:spcPts val="500"/>
+              </a:spcBef>
+              <a:buFont typeface="Arial" panose="020B0604020202020204" pitchFamily="34" charset="0"/>
+              <a:buChar char="•"/>
+              <a:defRPr sz="1800" kern="1200">
+                <a:solidFill>
+                  <a:schemeClr val="tx1"/>
+                </a:solidFill>
+                <a:latin typeface="+mn-lt"/>
+                <a:ea typeface="+mn-ea"/>
+                <a:cs typeface="+mn-cs"/>
+              </a:defRPr>
+            </a:lvl4pPr>
+            <a:lvl5pPr marL="2057400" indent="-228600" algn="l" defTabSz="914400" rtl="0" eaLnBrk="1" latinLnBrk="0" hangingPunct="1">
+              <a:lnSpc>
+                <a:spcPct val="90000"/>
+              </a:lnSpc>
+              <a:spcBef>
+                <a:spcPts val="500"/>
+              </a:spcBef>
+              <a:buFont typeface="Arial" panose="020B0604020202020204" pitchFamily="34" charset="0"/>
+              <a:buChar char="•"/>
+              <a:defRPr sz="1800" kern="1200">
+                <a:solidFill>
+                  <a:schemeClr val="tx1"/>
+                </a:solidFill>
+                <a:latin typeface="+mn-lt"/>
+                <a:ea typeface="+mn-ea"/>
+                <a:cs typeface="+mn-cs"/>
+              </a:defRPr>
+            </a:lvl5pPr>
+            <a:lvl6pPr marL="2514600" indent="-228600" algn="l" defTabSz="914400" rtl="0" eaLnBrk="1" latinLnBrk="0" hangingPunct="1">
+              <a:lnSpc>
+                <a:spcPct val="90000"/>
+              </a:lnSpc>
+              <a:spcBef>
+                <a:spcPts val="500"/>
+              </a:spcBef>
+              <a:buFont typeface="Arial" panose="020B0604020202020204" pitchFamily="34" charset="0"/>
+              <a:buChar char="•"/>
+              <a:defRPr sz="1800" kern="1200">
+                <a:solidFill>
+                  <a:schemeClr val="tx1"/>
+                </a:solidFill>
+                <a:latin typeface="+mn-lt"/>
+                <a:ea typeface="+mn-ea"/>
+                <a:cs typeface="+mn-cs"/>
+              </a:defRPr>
+            </a:lvl6pPr>
+            <a:lvl7pPr marL="2971800" indent="-228600" algn="l" defTabSz="914400" rtl="0" eaLnBrk="1" latinLnBrk="0" hangingPunct="1">
+              <a:lnSpc>
+                <a:spcPct val="90000"/>
+              </a:lnSpc>
+              <a:spcBef>
+                <a:spcPts val="500"/>
+              </a:spcBef>
+              <a:buFont typeface="Arial" panose="020B0604020202020204" pitchFamily="34" charset="0"/>
+              <a:buChar char="•"/>
+              <a:defRPr sz="1800" kern="1200">
+                <a:solidFill>
+                  <a:schemeClr val="tx1"/>
+                </a:solidFill>
+                <a:latin typeface="+mn-lt"/>
+                <a:ea typeface="+mn-ea"/>
+                <a:cs typeface="+mn-cs"/>
+              </a:defRPr>
+            </a:lvl7pPr>
+            <a:lvl8pPr marL="3429000" indent="-228600" algn="l" defTabSz="914400" rtl="0" eaLnBrk="1" latinLnBrk="0" hangingPunct="1">
+              <a:lnSpc>
+                <a:spcPct val="90000"/>
+              </a:lnSpc>
+              <a:spcBef>
+                <a:spcPts val="500"/>
+              </a:spcBef>
+              <a:buFont typeface="Arial" panose="020B0604020202020204" pitchFamily="34" charset="0"/>
+              <a:buChar char="•"/>
+              <a:defRPr sz="1800" kern="1200">
+                <a:solidFill>
+                  <a:schemeClr val="tx1"/>
+                </a:solidFill>
+                <a:latin typeface="+mn-lt"/>
+                <a:ea typeface="+mn-ea"/>
+                <a:cs typeface="+mn-cs"/>
+              </a:defRPr>
+            </a:lvl8pPr>
+            <a:lvl9pPr marL="3886200" indent="-228600" algn="l" defTabSz="914400" rtl="0" eaLnBrk="1" latinLnBrk="0" hangingPunct="1">
+              <a:lnSpc>
+                <a:spcPct val="90000"/>
+              </a:lnSpc>
+              <a:spcBef>
+                <a:spcPts val="500"/>
+              </a:spcBef>
+              <a:buFont typeface="Arial" panose="020B0604020202020204" pitchFamily="34" charset="0"/>
+              <a:buChar char="•"/>
+              <a:defRPr sz="1800" kern="1200">
+                <a:solidFill>
+                  <a:schemeClr val="tx1"/>
+                </a:solidFill>
+                <a:latin typeface="+mn-lt"/>
+                <a:ea typeface="+mn-ea"/>
+                <a:cs typeface="+mn-cs"/>
+              </a:defRPr>
+            </a:lvl9pPr>
+          </a:lstStyle>
+          <a:p>
+            <a:pPr marL="0" indent="0" algn="ctr">
+              <a:buFont typeface="Arial" panose="020B0604020202020204" pitchFamily="34" charset="0"/>
+              <a:buNone/>
+            </a:pPr>
+            <a:r>
+              <a:rPr lang="en-GB" sz="2000" b="1" dirty="0" smtClean="0">
+                <a:solidFill>
+                  <a:srgbClr val="0070C0"/>
+                </a:solidFill>
+              </a:rPr>
+              <a:t>Abs/</a:t>
+            </a:r>
+            <a:r>
+              <a:rPr lang="en-GB" sz="2000" b="1" dirty="0" err="1" smtClean="0">
+                <a:solidFill>
+                  <a:srgbClr val="0070C0"/>
+                </a:solidFill>
+              </a:rPr>
+              <a:t>Rel</a:t>
+            </a:r>
+            <a:r>
+              <a:rPr lang="en-GB" sz="2000" b="1" dirty="0" smtClean="0">
+                <a:solidFill>
+                  <a:srgbClr val="0070C0"/>
+                </a:solidFill>
+              </a:rPr>
+              <a:t> error limit values</a:t>
+            </a:r>
+            <a:endParaRPr lang="en-GB" sz="2000" b="1" dirty="0">
+              <a:solidFill>
+                <a:srgbClr val="0070C0"/>
+              </a:solidFill>
+            </a:endParaRPr>
+          </a:p>
+        </p:txBody>
+      </p:sp>
+      <p:cxnSp>
+        <p:nvCxnSpPr>
+          <p:cNvPr id="28" name="Conector recto de flecha 27"/>
+          <p:cNvCxnSpPr>
+            <a:endCxn id="15" idx="1"/>
+          </p:cNvCxnSpPr>
+          <p:nvPr/>
+        </p:nvCxnSpPr>
+        <p:spPr>
+          <a:xfrm>
+            <a:off x="725868" y="4327723"/>
+            <a:ext cx="1384480" cy="0"/>
+          </a:xfrm>
+          <a:prstGeom prst="straightConnector1">
+            <a:avLst/>
+          </a:prstGeom>
+          <a:ln w="38100">
+            <a:solidFill>
+              <a:srgbClr val="0070C0"/>
+            </a:solidFill>
+            <a:tailEnd type="triangle"/>
+          </a:ln>
+        </p:spPr>
+        <p:style>
+          <a:lnRef idx="1">
+            <a:schemeClr val="accent1"/>
+          </a:lnRef>
+          <a:fillRef idx="0">
+            <a:schemeClr val="accent1"/>
+          </a:fillRef>
+          <a:effectRef idx="0">
+            <a:schemeClr val="accent1"/>
+          </a:effectRef>
+          <a:fontRef idx="minor">
+            <a:schemeClr val="tx1"/>
+          </a:fontRef>
+        </p:style>
+      </p:cxnSp>
     </p:spTree>
     <p:extLst>
       <p:ext uri="{BB962C8B-B14F-4D97-AF65-F5344CB8AC3E}">
@@ -5840,7 +6092,7 @@
           <p:cNvPr id="5" name="Rectángulo 7">
             <a:extLst>
               <a:ext uri="{FF2B5EF4-FFF2-40B4-BE49-F238E27FC236}">
-                <a16:creationId xmlns:a16="http://schemas.microsoft.com/office/drawing/2014/main" xmlns="" id="{1ECC8163-F603-4099-B707-80E03D2D2A6B}"/>
+                <a16:creationId xmlns="" xmlns:a16="http://schemas.microsoft.com/office/drawing/2014/main" id="{1ECC8163-F603-4099-B707-80E03D2D2A6B}"/>
               </a:ext>
             </a:extLst>
           </p:cNvPr>
@@ -6052,7 +6304,7 @@
           <p:cNvPr id="47" name="Gerade Verbindung mit Pfeil 46">
             <a:extLst>
               <a:ext uri="{FF2B5EF4-FFF2-40B4-BE49-F238E27FC236}">
-                <a16:creationId xmlns:a16="http://schemas.microsoft.com/office/drawing/2014/main" xmlns="" id="{BB85F613-CED4-4663-9529-33358615403B}"/>
+                <a16:creationId xmlns="" xmlns:a16="http://schemas.microsoft.com/office/drawing/2014/main" id="{BB85F613-CED4-4663-9529-33358615403B}"/>
               </a:ext>
             </a:extLst>
           </p:cNvPr>
@@ -6098,7 +6350,7 @@
           <p:cNvPr id="136" name="Marcador de contenido 2">
             <a:extLst>
               <a:ext uri="{FF2B5EF4-FFF2-40B4-BE49-F238E27FC236}">
-                <a16:creationId xmlns:a16="http://schemas.microsoft.com/office/drawing/2014/main" xmlns="" id="{9E7F5DF6-DB42-477A-BCDB-54940BDE3B0D}"/>
+                <a16:creationId xmlns="" xmlns:a16="http://schemas.microsoft.com/office/drawing/2014/main" id="{9E7F5DF6-DB42-477A-BCDB-54940BDE3B0D}"/>
               </a:ext>
             </a:extLst>
           </p:cNvPr>
@@ -6301,7 +6553,7 @@
           <p:cNvPr id="20" name="Marcador de contenido 2">
             <a:extLst>
               <a:ext uri="{FF2B5EF4-FFF2-40B4-BE49-F238E27FC236}">
-                <a16:creationId xmlns:a16="http://schemas.microsoft.com/office/drawing/2014/main" xmlns="" id="{1315786D-D146-400B-B9F6-208743877097}"/>
+                <a16:creationId xmlns="" xmlns:a16="http://schemas.microsoft.com/office/drawing/2014/main" id="{1315786D-D146-400B-B9F6-208743877097}"/>
               </a:ext>
             </a:extLst>
           </p:cNvPr>
@@ -6637,7 +6889,7 @@
           <p:cNvPr id="75" name="Rectángulo 7">
             <a:extLst>
               <a:ext uri="{FF2B5EF4-FFF2-40B4-BE49-F238E27FC236}">
-                <a16:creationId xmlns:a16="http://schemas.microsoft.com/office/drawing/2014/main" xmlns="" id="{D89BC219-78D8-48A1-9D78-97F58D16063A}"/>
+                <a16:creationId xmlns="" xmlns:a16="http://schemas.microsoft.com/office/drawing/2014/main" id="{D89BC219-78D8-48A1-9D78-97F58D16063A}"/>
               </a:ext>
             </a:extLst>
           </p:cNvPr>
@@ -6963,7 +7215,7 @@
           <p:cNvPr id="42" name="Marcador de contenido 2">
             <a:extLst>
               <a:ext uri="{FF2B5EF4-FFF2-40B4-BE49-F238E27FC236}">
-                <a16:creationId xmlns:a16="http://schemas.microsoft.com/office/drawing/2014/main" xmlns="" id="{54EFD35A-3ECC-4C4F-9450-D32D942809E1}"/>
+                <a16:creationId xmlns="" xmlns:a16="http://schemas.microsoft.com/office/drawing/2014/main" id="{54EFD35A-3ECC-4C4F-9450-D32D942809E1}"/>
               </a:ext>
             </a:extLst>
           </p:cNvPr>
@@ -7269,7 +7521,7 @@
           <p:cNvPr id="43" name="Marcador de contenido 2">
             <a:extLst>
               <a:ext uri="{FF2B5EF4-FFF2-40B4-BE49-F238E27FC236}">
-                <a16:creationId xmlns:a16="http://schemas.microsoft.com/office/drawing/2014/main" xmlns="" id="{8E70CBE7-1859-4051-9307-E7A681B55F66}"/>
+                <a16:creationId xmlns="" xmlns:a16="http://schemas.microsoft.com/office/drawing/2014/main" id="{8E70CBE7-1859-4051-9307-E7A681B55F66}"/>
               </a:ext>
             </a:extLst>
           </p:cNvPr>
@@ -8222,7 +8474,7 @@
           <p:cNvPr id="173" name="Gerade Verbindung mit Pfeil 46">
             <a:extLst>
               <a:ext uri="{FF2B5EF4-FFF2-40B4-BE49-F238E27FC236}">
-                <a16:creationId xmlns:a16="http://schemas.microsoft.com/office/drawing/2014/main" xmlns="" id="{BB85F613-CED4-4663-9529-33358615403B}"/>
+                <a16:creationId xmlns="" xmlns:a16="http://schemas.microsoft.com/office/drawing/2014/main" id="{BB85F613-CED4-4663-9529-33358615403B}"/>
               </a:ext>
             </a:extLst>
           </p:cNvPr>
@@ -8309,7 +8561,7 @@
           <p:cNvPr id="193" name="Gerade Verbindung mit Pfeil 46">
             <a:extLst>
               <a:ext uri="{FF2B5EF4-FFF2-40B4-BE49-F238E27FC236}">
-                <a16:creationId xmlns:a16="http://schemas.microsoft.com/office/drawing/2014/main" xmlns="" id="{BB85F613-CED4-4663-9529-33358615403B}"/>
+                <a16:creationId xmlns="" xmlns:a16="http://schemas.microsoft.com/office/drawing/2014/main" id="{BB85F613-CED4-4663-9529-33358615403B}"/>
               </a:ext>
             </a:extLst>
           </p:cNvPr>
@@ -8585,7 +8837,7 @@
           <p:cNvPr id="281" name="Marcador de contenido 2">
             <a:extLst>
               <a:ext uri="{FF2B5EF4-FFF2-40B4-BE49-F238E27FC236}">
-                <a16:creationId xmlns:a16="http://schemas.microsoft.com/office/drawing/2014/main" xmlns="" id="{54EFD35A-3ECC-4C4F-9450-D32D942809E1}"/>
+                <a16:creationId xmlns="" xmlns:a16="http://schemas.microsoft.com/office/drawing/2014/main" id="{54EFD35A-3ECC-4C4F-9450-D32D942809E1}"/>
               </a:ext>
             </a:extLst>
           </p:cNvPr>
@@ -8841,7 +9093,7 @@
           <p:cNvPr id="5" name="Rectángulo 7">
             <a:extLst>
               <a:ext uri="{FF2B5EF4-FFF2-40B4-BE49-F238E27FC236}">
-                <a16:creationId xmlns:a16="http://schemas.microsoft.com/office/drawing/2014/main" xmlns="" id="{1ECC8163-F603-4099-B707-80E03D2D2A6B}"/>
+                <a16:creationId xmlns="" xmlns:a16="http://schemas.microsoft.com/office/drawing/2014/main" id="{1ECC8163-F603-4099-B707-80E03D2D2A6B}"/>
               </a:ext>
             </a:extLst>
           </p:cNvPr>
@@ -8975,7 +9227,7 @@
           <p:cNvPr id="136" name="Marcador de contenido 2">
             <a:extLst>
               <a:ext uri="{FF2B5EF4-FFF2-40B4-BE49-F238E27FC236}">
-                <a16:creationId xmlns:a16="http://schemas.microsoft.com/office/drawing/2014/main" xmlns="" id="{9E7F5DF6-DB42-477A-BCDB-54940BDE3B0D}"/>
+                <a16:creationId xmlns="" xmlns:a16="http://schemas.microsoft.com/office/drawing/2014/main" id="{9E7F5DF6-DB42-477A-BCDB-54940BDE3B0D}"/>
               </a:ext>
             </a:extLst>
           </p:cNvPr>
@@ -9216,7 +9468,7 @@
           <p:cNvPr id="281" name="Marcador de contenido 2">
             <a:extLst>
               <a:ext uri="{FF2B5EF4-FFF2-40B4-BE49-F238E27FC236}">
-                <a16:creationId xmlns:a16="http://schemas.microsoft.com/office/drawing/2014/main" xmlns="" id="{54EFD35A-3ECC-4C4F-9450-D32D942809E1}"/>
+                <a16:creationId xmlns="" xmlns:a16="http://schemas.microsoft.com/office/drawing/2014/main" id="{54EFD35A-3ECC-4C4F-9450-D32D942809E1}"/>
               </a:ext>
             </a:extLst>
           </p:cNvPr>
@@ -9427,7 +9679,7 @@
           <p:cNvPr id="44" name="Rectángulo 7">
             <a:extLst>
               <a:ext uri="{FF2B5EF4-FFF2-40B4-BE49-F238E27FC236}">
-                <a16:creationId xmlns:a16="http://schemas.microsoft.com/office/drawing/2014/main" xmlns="" id="{71BD35C5-AEBB-4FD4-9D25-E86EF7E0C0D5}"/>
+                <a16:creationId xmlns="" xmlns:a16="http://schemas.microsoft.com/office/drawing/2014/main" id="{71BD35C5-AEBB-4FD4-9D25-E86EF7E0C0D5}"/>
               </a:ext>
             </a:extLst>
           </p:cNvPr>
@@ -9954,7 +10206,7 @@
           <p:cNvPr id="79" name="Marcador de contenido 2">
             <a:extLst>
               <a:ext uri="{FF2B5EF4-FFF2-40B4-BE49-F238E27FC236}">
-                <a16:creationId xmlns:a16="http://schemas.microsoft.com/office/drawing/2014/main" xmlns="" id="{54EFD35A-3ECC-4C4F-9450-D32D942809E1}"/>
+                <a16:creationId xmlns="" xmlns:a16="http://schemas.microsoft.com/office/drawing/2014/main" id="{54EFD35A-3ECC-4C4F-9450-D32D942809E1}"/>
               </a:ext>
             </a:extLst>
           </p:cNvPr>
@@ -10283,7 +10535,7 @@
           <p:cNvPr id="45" name="Rectángulo 7">
             <a:extLst>
               <a:ext uri="{FF2B5EF4-FFF2-40B4-BE49-F238E27FC236}">
-                <a16:creationId xmlns:a16="http://schemas.microsoft.com/office/drawing/2014/main" xmlns="" id="{71BD35C5-AEBB-4FD4-9D25-E86EF7E0C0D5}"/>
+                <a16:creationId xmlns="" xmlns:a16="http://schemas.microsoft.com/office/drawing/2014/main" id="{71BD35C5-AEBB-4FD4-9D25-E86EF7E0C0D5}"/>
               </a:ext>
             </a:extLst>
           </p:cNvPr>
@@ -12857,7 +13109,7 @@
           <p:cNvPr id="38" name="Marcador de contenido 2">
             <a:extLst>
               <a:ext uri="{FF2B5EF4-FFF2-40B4-BE49-F238E27FC236}">
-                <a16:creationId xmlns:a16="http://schemas.microsoft.com/office/drawing/2014/main" xmlns="" id="{3EE211A9-695F-4D32-867F-D6F32A429FE6}"/>
+                <a16:creationId xmlns="" xmlns:a16="http://schemas.microsoft.com/office/drawing/2014/main" id="{3EE211A9-695F-4D32-867F-D6F32A429FE6}"/>
               </a:ext>
             </a:extLst>
           </p:cNvPr>
@@ -13097,7 +13349,7 @@
           <p:cNvPr id="5" name="Rectángulo 7">
             <a:extLst>
               <a:ext uri="{FF2B5EF4-FFF2-40B4-BE49-F238E27FC236}">
-                <a16:creationId xmlns:a16="http://schemas.microsoft.com/office/drawing/2014/main" xmlns="" id="{1ECC8163-F603-4099-B707-80E03D2D2A6B}"/>
+                <a16:creationId xmlns="" xmlns:a16="http://schemas.microsoft.com/office/drawing/2014/main" id="{1ECC8163-F603-4099-B707-80E03D2D2A6B}"/>
               </a:ext>
             </a:extLst>
           </p:cNvPr>
@@ -14257,7 +14509,7 @@
           <p:cNvPr id="11" name="Rectángulo 7">
             <a:extLst>
               <a:ext uri="{FF2B5EF4-FFF2-40B4-BE49-F238E27FC236}">
-                <a16:creationId xmlns:a16="http://schemas.microsoft.com/office/drawing/2014/main" xmlns="" id="{71BD35C5-AEBB-4FD4-9D25-E86EF7E0C0D5}"/>
+                <a16:creationId xmlns="" xmlns:a16="http://schemas.microsoft.com/office/drawing/2014/main" id="{71BD35C5-AEBB-4FD4-9D25-E86EF7E0C0D5}"/>
               </a:ext>
             </a:extLst>
           </p:cNvPr>
@@ -14320,7 +14572,7 @@
           <p:cNvPr id="17" name="Verbinder: gewinkelt 16">
             <a:extLst>
               <a:ext uri="{FF2B5EF4-FFF2-40B4-BE49-F238E27FC236}">
-                <a16:creationId xmlns:a16="http://schemas.microsoft.com/office/drawing/2014/main" xmlns="" id="{3AB05A42-C510-4141-ADA2-415420603577}"/>
+                <a16:creationId xmlns="" xmlns:a16="http://schemas.microsoft.com/office/drawing/2014/main" id="{3AB05A42-C510-4141-ADA2-415420603577}"/>
               </a:ext>
             </a:extLst>
           </p:cNvPr>
@@ -14365,7 +14617,7 @@
           <p:cNvPr id="26" name="Gerade Verbindung mit Pfeil 25">
             <a:extLst>
               <a:ext uri="{FF2B5EF4-FFF2-40B4-BE49-F238E27FC236}">
-                <a16:creationId xmlns:a16="http://schemas.microsoft.com/office/drawing/2014/main" xmlns="" id="{DB8EABC4-920D-45BD-842D-61F1DC324FB2}"/>
+                <a16:creationId xmlns="" xmlns:a16="http://schemas.microsoft.com/office/drawing/2014/main" id="{DB8EABC4-920D-45BD-842D-61F1DC324FB2}"/>
               </a:ext>
             </a:extLst>
           </p:cNvPr>
@@ -14410,7 +14662,7 @@
           <p:cNvPr id="50" name="Gerade Verbindung mit Pfeil 49">
             <a:extLst>
               <a:ext uri="{FF2B5EF4-FFF2-40B4-BE49-F238E27FC236}">
-                <a16:creationId xmlns:a16="http://schemas.microsoft.com/office/drawing/2014/main" xmlns="" id="{5F06E84D-000A-4028-A540-78FACC5CD61F}"/>
+                <a16:creationId xmlns="" xmlns:a16="http://schemas.microsoft.com/office/drawing/2014/main" id="{5F06E84D-000A-4028-A540-78FACC5CD61F}"/>
               </a:ext>
             </a:extLst>
           </p:cNvPr>
@@ -14454,7 +14706,7 @@
           <p:cNvPr id="45" name="Marcador de contenido 2">
             <a:extLst>
               <a:ext uri="{FF2B5EF4-FFF2-40B4-BE49-F238E27FC236}">
-                <a16:creationId xmlns:a16="http://schemas.microsoft.com/office/drawing/2014/main" xmlns="" id="{3EE211A9-695F-4D32-867F-D6F32A429FE6}"/>
+                <a16:creationId xmlns="" xmlns:a16="http://schemas.microsoft.com/office/drawing/2014/main" id="{3EE211A9-695F-4D32-867F-D6F32A429FE6}"/>
               </a:ext>
             </a:extLst>
           </p:cNvPr>
@@ -14694,7 +14946,7 @@
           <p:cNvPr id="5" name="Rectángulo 7">
             <a:extLst>
               <a:ext uri="{FF2B5EF4-FFF2-40B4-BE49-F238E27FC236}">
-                <a16:creationId xmlns:a16="http://schemas.microsoft.com/office/drawing/2014/main" xmlns="" id="{1ECC8163-F603-4099-B707-80E03D2D2A6B}"/>
+                <a16:creationId xmlns="" xmlns:a16="http://schemas.microsoft.com/office/drawing/2014/main" id="{1ECC8163-F603-4099-B707-80E03D2D2A6B}"/>
               </a:ext>
             </a:extLst>
           </p:cNvPr>
@@ -15637,7 +15889,7 @@
           <p:cNvPr id="11" name="Rectángulo 7">
             <a:extLst>
               <a:ext uri="{FF2B5EF4-FFF2-40B4-BE49-F238E27FC236}">
-                <a16:creationId xmlns:a16="http://schemas.microsoft.com/office/drawing/2014/main" xmlns="" id="{71BD35C5-AEBB-4FD4-9D25-E86EF7E0C0D5}"/>
+                <a16:creationId xmlns="" xmlns:a16="http://schemas.microsoft.com/office/drawing/2014/main" id="{71BD35C5-AEBB-4FD4-9D25-E86EF7E0C0D5}"/>
               </a:ext>
             </a:extLst>
           </p:cNvPr>
@@ -15700,7 +15952,7 @@
           <p:cNvPr id="17" name="Verbinder: gewinkelt 16">
             <a:extLst>
               <a:ext uri="{FF2B5EF4-FFF2-40B4-BE49-F238E27FC236}">
-                <a16:creationId xmlns:a16="http://schemas.microsoft.com/office/drawing/2014/main" xmlns="" id="{3AB05A42-C510-4141-ADA2-415420603577}"/>
+                <a16:creationId xmlns="" xmlns:a16="http://schemas.microsoft.com/office/drawing/2014/main" id="{3AB05A42-C510-4141-ADA2-415420603577}"/>
               </a:ext>
             </a:extLst>
           </p:cNvPr>
@@ -15746,7 +15998,7 @@
           <p:cNvPr id="26" name="Gerade Verbindung mit Pfeil 25">
             <a:extLst>
               <a:ext uri="{FF2B5EF4-FFF2-40B4-BE49-F238E27FC236}">
-                <a16:creationId xmlns:a16="http://schemas.microsoft.com/office/drawing/2014/main" xmlns="" id="{DB8EABC4-920D-45BD-842D-61F1DC324FB2}"/>
+                <a16:creationId xmlns="" xmlns:a16="http://schemas.microsoft.com/office/drawing/2014/main" id="{DB8EABC4-920D-45BD-842D-61F1DC324FB2}"/>
               </a:ext>
             </a:extLst>
           </p:cNvPr>
@@ -15790,7 +16042,7 @@
           <p:cNvPr id="45" name="Marcador de contenido 2">
             <a:extLst>
               <a:ext uri="{FF2B5EF4-FFF2-40B4-BE49-F238E27FC236}">
-                <a16:creationId xmlns:a16="http://schemas.microsoft.com/office/drawing/2014/main" xmlns="" id="{3EE211A9-695F-4D32-867F-D6F32A429FE6}"/>
+                <a16:creationId xmlns="" xmlns:a16="http://schemas.microsoft.com/office/drawing/2014/main" id="{3EE211A9-695F-4D32-867F-D6F32A429FE6}"/>
               </a:ext>
             </a:extLst>
           </p:cNvPr>
@@ -15993,7 +16245,7 @@
           <p:cNvPr id="18" name="Gerade Verbindung mit Pfeil 17">
             <a:extLst>
               <a:ext uri="{FF2B5EF4-FFF2-40B4-BE49-F238E27FC236}">
-                <a16:creationId xmlns:a16="http://schemas.microsoft.com/office/drawing/2014/main" xmlns="" id="{B8F7B892-C2D7-45A6-970D-4FD58CB6B03B}"/>
+                <a16:creationId xmlns="" xmlns:a16="http://schemas.microsoft.com/office/drawing/2014/main" id="{B8F7B892-C2D7-45A6-970D-4FD58CB6B03B}"/>
               </a:ext>
             </a:extLst>
           </p:cNvPr>
@@ -16037,7 +16289,7 @@
           <p:cNvPr id="3" name="Marcador de contenido 2">
             <a:extLst>
               <a:ext uri="{FF2B5EF4-FFF2-40B4-BE49-F238E27FC236}">
-                <a16:creationId xmlns:a16="http://schemas.microsoft.com/office/drawing/2014/main" xmlns="" id="{7F380432-ABF4-4795-9B7C-FCFA63447678}"/>
+                <a16:creationId xmlns="" xmlns:a16="http://schemas.microsoft.com/office/drawing/2014/main" id="{7F380432-ABF4-4795-9B7C-FCFA63447678}"/>
               </a:ext>
             </a:extLst>
           </p:cNvPr>
@@ -16282,7 +16534,7 @@
           <p:cNvPr id="22" name="Marcador de contenido 2">
             <a:extLst>
               <a:ext uri="{FF2B5EF4-FFF2-40B4-BE49-F238E27FC236}">
-                <a16:creationId xmlns:a16="http://schemas.microsoft.com/office/drawing/2014/main" xmlns="" id="{A3AF7771-BF25-45F5-884B-16ACFE48791D}"/>
+                <a16:creationId xmlns="" xmlns:a16="http://schemas.microsoft.com/office/drawing/2014/main" id="{A3AF7771-BF25-45F5-884B-16ACFE48791D}"/>
               </a:ext>
             </a:extLst>
           </p:cNvPr>
@@ -16544,7 +16796,7 @@
           <p:cNvPr id="5" name="Rectángulo 7">
             <a:extLst>
               <a:ext uri="{FF2B5EF4-FFF2-40B4-BE49-F238E27FC236}">
-                <a16:creationId xmlns:a16="http://schemas.microsoft.com/office/drawing/2014/main" xmlns="" id="{1ECC8163-F603-4099-B707-80E03D2D2A6B}"/>
+                <a16:creationId xmlns="" xmlns:a16="http://schemas.microsoft.com/office/drawing/2014/main" id="{1ECC8163-F603-4099-B707-80E03D2D2A6B}"/>
               </a:ext>
             </a:extLst>
           </p:cNvPr>
@@ -17728,7 +17980,7 @@
           <p:cNvPr id="11" name="Rectángulo 7">
             <a:extLst>
               <a:ext uri="{FF2B5EF4-FFF2-40B4-BE49-F238E27FC236}">
-                <a16:creationId xmlns:a16="http://schemas.microsoft.com/office/drawing/2014/main" xmlns="" id="{71BD35C5-AEBB-4FD4-9D25-E86EF7E0C0D5}"/>
+                <a16:creationId xmlns="" xmlns:a16="http://schemas.microsoft.com/office/drawing/2014/main" id="{71BD35C5-AEBB-4FD4-9D25-E86EF7E0C0D5}"/>
               </a:ext>
             </a:extLst>
           </p:cNvPr>
@@ -17791,7 +18043,7 @@
           <p:cNvPr id="17" name="Verbinder: gewinkelt 16">
             <a:extLst>
               <a:ext uri="{FF2B5EF4-FFF2-40B4-BE49-F238E27FC236}">
-                <a16:creationId xmlns:a16="http://schemas.microsoft.com/office/drawing/2014/main" xmlns="" id="{3AB05A42-C510-4141-ADA2-415420603577}"/>
+                <a16:creationId xmlns="" xmlns:a16="http://schemas.microsoft.com/office/drawing/2014/main" id="{3AB05A42-C510-4141-ADA2-415420603577}"/>
               </a:ext>
             </a:extLst>
           </p:cNvPr>
@@ -17837,7 +18089,7 @@
           <p:cNvPr id="26" name="Gerade Verbindung mit Pfeil 25">
             <a:extLst>
               <a:ext uri="{FF2B5EF4-FFF2-40B4-BE49-F238E27FC236}">
-                <a16:creationId xmlns:a16="http://schemas.microsoft.com/office/drawing/2014/main" xmlns="" id="{DB8EABC4-920D-45BD-842D-61F1DC324FB2}"/>
+                <a16:creationId xmlns="" xmlns:a16="http://schemas.microsoft.com/office/drawing/2014/main" id="{DB8EABC4-920D-45BD-842D-61F1DC324FB2}"/>
               </a:ext>
             </a:extLst>
           </p:cNvPr>
@@ -17881,7 +18133,7 @@
           <p:cNvPr id="50" name="Gerade Verbindung mit Pfeil 49">
             <a:extLst>
               <a:ext uri="{FF2B5EF4-FFF2-40B4-BE49-F238E27FC236}">
-                <a16:creationId xmlns:a16="http://schemas.microsoft.com/office/drawing/2014/main" xmlns="" id="{5F06E84D-000A-4028-A540-78FACC5CD61F}"/>
+                <a16:creationId xmlns="" xmlns:a16="http://schemas.microsoft.com/office/drawing/2014/main" id="{5F06E84D-000A-4028-A540-78FACC5CD61F}"/>
               </a:ext>
             </a:extLst>
           </p:cNvPr>
@@ -17925,7 +18177,7 @@
           <p:cNvPr id="45" name="Marcador de contenido 2">
             <a:extLst>
               <a:ext uri="{FF2B5EF4-FFF2-40B4-BE49-F238E27FC236}">
-                <a16:creationId xmlns:a16="http://schemas.microsoft.com/office/drawing/2014/main" xmlns="" id="{3EE211A9-695F-4D32-867F-D6F32A429FE6}"/>
+                <a16:creationId xmlns="" xmlns:a16="http://schemas.microsoft.com/office/drawing/2014/main" id="{3EE211A9-695F-4D32-867F-D6F32A429FE6}"/>
               </a:ext>
             </a:extLst>
           </p:cNvPr>
@@ -18128,7 +18380,7 @@
           <p:cNvPr id="15" name="Rectángulo 7">
             <a:extLst>
               <a:ext uri="{FF2B5EF4-FFF2-40B4-BE49-F238E27FC236}">
-                <a16:creationId xmlns:a16="http://schemas.microsoft.com/office/drawing/2014/main" xmlns="" id="{B625A4D9-CFEC-4FAC-82EC-2BFA2DCC5868}"/>
+                <a16:creationId xmlns="" xmlns:a16="http://schemas.microsoft.com/office/drawing/2014/main" id="{B625A4D9-CFEC-4FAC-82EC-2BFA2DCC5868}"/>
               </a:ext>
             </a:extLst>
           </p:cNvPr>
@@ -18205,7 +18457,7 @@
           <p:cNvPr id="48" name="Verbinder: gewinkelt 47">
             <a:extLst>
               <a:ext uri="{FF2B5EF4-FFF2-40B4-BE49-F238E27FC236}">
-                <a16:creationId xmlns:a16="http://schemas.microsoft.com/office/drawing/2014/main" xmlns="" id="{DB56B9FE-3839-4A58-8A37-7142F36EE39F}"/>
+                <a16:creationId xmlns="" xmlns:a16="http://schemas.microsoft.com/office/drawing/2014/main" id="{DB56B9FE-3839-4A58-8A37-7142F36EE39F}"/>
               </a:ext>
             </a:extLst>
           </p:cNvPr>
@@ -18251,7 +18503,7 @@
           <p:cNvPr id="53" name="Verbinder: gewinkelt 52">
             <a:extLst>
               <a:ext uri="{FF2B5EF4-FFF2-40B4-BE49-F238E27FC236}">
-                <a16:creationId xmlns:a16="http://schemas.microsoft.com/office/drawing/2014/main" xmlns="" id="{3702386D-9223-4C63-A2B5-3187FE1D4453}"/>
+                <a16:creationId xmlns="" xmlns:a16="http://schemas.microsoft.com/office/drawing/2014/main" id="{3702386D-9223-4C63-A2B5-3187FE1D4453}"/>
               </a:ext>
             </a:extLst>
           </p:cNvPr>
@@ -18298,7 +18550,7 @@
           <p:cNvPr id="56" name="Gerade Verbindung mit Pfeil 55">
             <a:extLst>
               <a:ext uri="{FF2B5EF4-FFF2-40B4-BE49-F238E27FC236}">
-                <a16:creationId xmlns:a16="http://schemas.microsoft.com/office/drawing/2014/main" xmlns="" id="{9D3DCB1B-916C-40EB-9497-CC584C428CDB}"/>
+                <a16:creationId xmlns="" xmlns:a16="http://schemas.microsoft.com/office/drawing/2014/main" id="{9D3DCB1B-916C-40EB-9497-CC584C428CDB}"/>
               </a:ext>
             </a:extLst>
           </p:cNvPr>
@@ -18344,7 +18596,7 @@
           <p:cNvPr id="64" name="Gerade Verbindung mit Pfeil 63">
             <a:extLst>
               <a:ext uri="{FF2B5EF4-FFF2-40B4-BE49-F238E27FC236}">
-                <a16:creationId xmlns:a16="http://schemas.microsoft.com/office/drawing/2014/main" xmlns="" id="{35C35D07-4F11-4963-8F5D-D351F6A8DC85}"/>
+                <a16:creationId xmlns="" xmlns:a16="http://schemas.microsoft.com/office/drawing/2014/main" id="{35C35D07-4F11-4963-8F5D-D351F6A8DC85}"/>
               </a:ext>
             </a:extLst>
           </p:cNvPr>
@@ -18388,7 +18640,7 @@
           <p:cNvPr id="68" name="Gerade Verbindung mit Pfeil 67">
             <a:extLst>
               <a:ext uri="{FF2B5EF4-FFF2-40B4-BE49-F238E27FC236}">
-                <a16:creationId xmlns:a16="http://schemas.microsoft.com/office/drawing/2014/main" xmlns="" id="{A706B8BF-B77D-4323-B72B-61CE0E7289F9}"/>
+                <a16:creationId xmlns="" xmlns:a16="http://schemas.microsoft.com/office/drawing/2014/main" id="{A706B8BF-B77D-4323-B72B-61CE0E7289F9}"/>
               </a:ext>
             </a:extLst>
           </p:cNvPr>
@@ -18432,7 +18684,7 @@
           <p:cNvPr id="66" name="Marcador de contenido 2">
             <a:extLst>
               <a:ext uri="{FF2B5EF4-FFF2-40B4-BE49-F238E27FC236}">
-                <a16:creationId xmlns:a16="http://schemas.microsoft.com/office/drawing/2014/main" xmlns="" id="{67AFBC5F-11DB-4AFD-B983-37506272AC6E}"/>
+                <a16:creationId xmlns="" xmlns:a16="http://schemas.microsoft.com/office/drawing/2014/main" id="{67AFBC5F-11DB-4AFD-B983-37506272AC6E}"/>
               </a:ext>
             </a:extLst>
           </p:cNvPr>
@@ -18668,7 +18920,7 @@
           <p:cNvPr id="69" name="Marcador de contenido 2">
             <a:extLst>
               <a:ext uri="{FF2B5EF4-FFF2-40B4-BE49-F238E27FC236}">
-                <a16:creationId xmlns:a16="http://schemas.microsoft.com/office/drawing/2014/main" xmlns="" id="{83317A75-5D50-4518-9832-3DBDD18B0FE9}"/>
+                <a16:creationId xmlns="" xmlns:a16="http://schemas.microsoft.com/office/drawing/2014/main" id="{83317A75-5D50-4518-9832-3DBDD18B0FE9}"/>
               </a:ext>
             </a:extLst>
           </p:cNvPr>
@@ -18904,7 +19156,7 @@
           <p:cNvPr id="78" name="Verbinder: gewinkelt 77">
             <a:extLst>
               <a:ext uri="{FF2B5EF4-FFF2-40B4-BE49-F238E27FC236}">
-                <a16:creationId xmlns:a16="http://schemas.microsoft.com/office/drawing/2014/main" xmlns="" id="{3B91319E-C7F0-4CAD-97A9-E4944A8721ED}"/>
+                <a16:creationId xmlns="" xmlns:a16="http://schemas.microsoft.com/office/drawing/2014/main" id="{3B91319E-C7F0-4CAD-97A9-E4944A8721ED}"/>
               </a:ext>
             </a:extLst>
           </p:cNvPr>
@@ -18950,7 +19202,7 @@
           <p:cNvPr id="86" name="Marcador de contenido 2">
             <a:extLst>
               <a:ext uri="{FF2B5EF4-FFF2-40B4-BE49-F238E27FC236}">
-                <a16:creationId xmlns:a16="http://schemas.microsoft.com/office/drawing/2014/main" xmlns="" id="{463492BC-41A5-4E3E-9E3F-C639B565FA16}"/>
+                <a16:creationId xmlns="" xmlns:a16="http://schemas.microsoft.com/office/drawing/2014/main" id="{463492BC-41A5-4E3E-9E3F-C639B565FA16}"/>
               </a:ext>
             </a:extLst>
           </p:cNvPr>
@@ -19178,7 +19430,7 @@
           <p:cNvPr id="27" name="Marcador de contenido 2">
             <a:extLst>
               <a:ext uri="{FF2B5EF4-FFF2-40B4-BE49-F238E27FC236}">
-                <a16:creationId xmlns:a16="http://schemas.microsoft.com/office/drawing/2014/main" xmlns="" id="{A3AF7771-BF25-45F5-884B-16ACFE48791D}"/>
+                <a16:creationId xmlns="" xmlns:a16="http://schemas.microsoft.com/office/drawing/2014/main" id="{A3AF7771-BF25-45F5-884B-16ACFE48791D}"/>
               </a:ext>
             </a:extLst>
           </p:cNvPr>
@@ -19476,7 +19728,7 @@
           <p:cNvPr id="5" name="Rectángulo 7">
             <a:extLst>
               <a:ext uri="{FF2B5EF4-FFF2-40B4-BE49-F238E27FC236}">
-                <a16:creationId xmlns:a16="http://schemas.microsoft.com/office/drawing/2014/main" xmlns="" id="{1ECC8163-F603-4099-B707-80E03D2D2A6B}"/>
+                <a16:creationId xmlns="" xmlns:a16="http://schemas.microsoft.com/office/drawing/2014/main" id="{1ECC8163-F603-4099-B707-80E03D2D2A6B}"/>
               </a:ext>
             </a:extLst>
           </p:cNvPr>
@@ -20371,7 +20623,7 @@
           <p:cNvPr id="6" name="Rectángulo 7">
             <a:extLst>
               <a:ext uri="{FF2B5EF4-FFF2-40B4-BE49-F238E27FC236}">
-                <a16:creationId xmlns:a16="http://schemas.microsoft.com/office/drawing/2014/main" xmlns="" id="{5903C895-12E9-439D-9159-CC2D857F46B5}"/>
+                <a16:creationId xmlns="" xmlns:a16="http://schemas.microsoft.com/office/drawing/2014/main" id="{5903C895-12E9-439D-9159-CC2D857F46B5}"/>
               </a:ext>
             </a:extLst>
           </p:cNvPr>
@@ -20451,7 +20703,7 @@
           <p:cNvPr id="9" name="Rectángulo 7">
             <a:extLst>
               <a:ext uri="{FF2B5EF4-FFF2-40B4-BE49-F238E27FC236}">
-                <a16:creationId xmlns:a16="http://schemas.microsoft.com/office/drawing/2014/main" xmlns="" id="{FE2AEA42-CDB6-4A48-AF2B-4AD1DBF8AB03}"/>
+                <a16:creationId xmlns="" xmlns:a16="http://schemas.microsoft.com/office/drawing/2014/main" id="{FE2AEA42-CDB6-4A48-AF2B-4AD1DBF8AB03}"/>
               </a:ext>
             </a:extLst>
           </p:cNvPr>
@@ -20531,7 +20783,7 @@
           <p:cNvPr id="10" name="Rectángulo 7">
             <a:extLst>
               <a:ext uri="{FF2B5EF4-FFF2-40B4-BE49-F238E27FC236}">
-                <a16:creationId xmlns:a16="http://schemas.microsoft.com/office/drawing/2014/main" xmlns="" id="{0FE4B587-7F1D-4AE0-8B87-9D22B4A10EAB}"/>
+                <a16:creationId xmlns="" xmlns:a16="http://schemas.microsoft.com/office/drawing/2014/main" id="{0FE4B587-7F1D-4AE0-8B87-9D22B4A10EAB}"/>
               </a:ext>
             </a:extLst>
           </p:cNvPr>
@@ -20603,7 +20855,7 @@
           <p:cNvPr id="12" name="Rectángulo 7">
             <a:extLst>
               <a:ext uri="{FF2B5EF4-FFF2-40B4-BE49-F238E27FC236}">
-                <a16:creationId xmlns:a16="http://schemas.microsoft.com/office/drawing/2014/main" xmlns="" id="{BD2B439C-CEE8-4F32-AED0-65EF9A04DD12}"/>
+                <a16:creationId xmlns="" xmlns:a16="http://schemas.microsoft.com/office/drawing/2014/main" id="{BD2B439C-CEE8-4F32-AED0-65EF9A04DD12}"/>
               </a:ext>
             </a:extLst>
           </p:cNvPr>
@@ -20667,7 +20919,7 @@
           <p:cNvPr id="13" name="Rectángulo 7">
             <a:extLst>
               <a:ext uri="{FF2B5EF4-FFF2-40B4-BE49-F238E27FC236}">
-                <a16:creationId xmlns:a16="http://schemas.microsoft.com/office/drawing/2014/main" xmlns="" id="{22EC68C4-217B-4AE1-950D-BF62F7632DFF}"/>
+                <a16:creationId xmlns="" xmlns:a16="http://schemas.microsoft.com/office/drawing/2014/main" id="{22EC68C4-217B-4AE1-950D-BF62F7632DFF}"/>
               </a:ext>
             </a:extLst>
           </p:cNvPr>
@@ -20723,7 +20975,7 @@
           <p:cNvPr id="15" name="Rectángulo 7">
             <a:extLst>
               <a:ext uri="{FF2B5EF4-FFF2-40B4-BE49-F238E27FC236}">
-                <a16:creationId xmlns:a16="http://schemas.microsoft.com/office/drawing/2014/main" xmlns="" id="{5F7D1610-EEA2-4A89-A7D9-FCC867A8DD33}"/>
+                <a16:creationId xmlns="" xmlns:a16="http://schemas.microsoft.com/office/drawing/2014/main" id="{5F7D1610-EEA2-4A89-A7D9-FCC867A8DD33}"/>
               </a:ext>
             </a:extLst>
           </p:cNvPr>
@@ -20779,7 +21031,7 @@
           <p:cNvPr id="19" name="Rectángulo 7">
             <a:extLst>
               <a:ext uri="{FF2B5EF4-FFF2-40B4-BE49-F238E27FC236}">
-                <a16:creationId xmlns:a16="http://schemas.microsoft.com/office/drawing/2014/main" xmlns="" id="{F016A086-D83E-41A9-BAC8-C9C02AF18D88}"/>
+                <a16:creationId xmlns="" xmlns:a16="http://schemas.microsoft.com/office/drawing/2014/main" id="{F016A086-D83E-41A9-BAC8-C9C02AF18D88}"/>
               </a:ext>
             </a:extLst>
           </p:cNvPr>
@@ -20835,7 +21087,7 @@
           <p:cNvPr id="21" name="Rectángulo 7">
             <a:extLst>
               <a:ext uri="{FF2B5EF4-FFF2-40B4-BE49-F238E27FC236}">
-                <a16:creationId xmlns:a16="http://schemas.microsoft.com/office/drawing/2014/main" xmlns="" id="{D89BC219-78D8-48A1-9D78-97F58D16063A}"/>
+                <a16:creationId xmlns="" xmlns:a16="http://schemas.microsoft.com/office/drawing/2014/main" id="{D89BC219-78D8-48A1-9D78-97F58D16063A}"/>
               </a:ext>
             </a:extLst>
           </p:cNvPr>
@@ -20891,7 +21143,7 @@
           <p:cNvPr id="35" name="Gerade Verbindung mit Pfeil 34">
             <a:extLst>
               <a:ext uri="{FF2B5EF4-FFF2-40B4-BE49-F238E27FC236}">
-                <a16:creationId xmlns:a16="http://schemas.microsoft.com/office/drawing/2014/main" xmlns="" id="{0801C7E1-4E67-4B3D-BBC0-A1ABB2790C94}"/>
+                <a16:creationId xmlns="" xmlns:a16="http://schemas.microsoft.com/office/drawing/2014/main" id="{0801C7E1-4E67-4B3D-BBC0-A1ABB2790C94}"/>
               </a:ext>
             </a:extLst>
           </p:cNvPr>
@@ -20937,7 +21189,7 @@
           <p:cNvPr id="47" name="Gerade Verbindung mit Pfeil 46">
             <a:extLst>
               <a:ext uri="{FF2B5EF4-FFF2-40B4-BE49-F238E27FC236}">
-                <a16:creationId xmlns:a16="http://schemas.microsoft.com/office/drawing/2014/main" xmlns="" id="{BB85F613-CED4-4663-9529-33358615403B}"/>
+                <a16:creationId xmlns="" xmlns:a16="http://schemas.microsoft.com/office/drawing/2014/main" id="{BB85F613-CED4-4663-9529-33358615403B}"/>
               </a:ext>
             </a:extLst>
           </p:cNvPr>
@@ -20985,7 +21237,7 @@
           <p:cNvPr id="49" name="Verbinder: gewinkelt 48">
             <a:extLst>
               <a:ext uri="{FF2B5EF4-FFF2-40B4-BE49-F238E27FC236}">
-                <a16:creationId xmlns:a16="http://schemas.microsoft.com/office/drawing/2014/main" xmlns="" id="{6E09AE40-8954-4915-B5AF-456622FB63B0}"/>
+                <a16:creationId xmlns="" xmlns:a16="http://schemas.microsoft.com/office/drawing/2014/main" id="{6E09AE40-8954-4915-B5AF-456622FB63B0}"/>
               </a:ext>
             </a:extLst>
           </p:cNvPr>
@@ -21032,7 +21284,7 @@
           <p:cNvPr id="58" name="Gerade Verbindung mit Pfeil 57">
             <a:extLst>
               <a:ext uri="{FF2B5EF4-FFF2-40B4-BE49-F238E27FC236}">
-                <a16:creationId xmlns:a16="http://schemas.microsoft.com/office/drawing/2014/main" xmlns="" id="{B156E089-0A03-4B29-938D-CAD7DD8A32FF}"/>
+                <a16:creationId xmlns="" xmlns:a16="http://schemas.microsoft.com/office/drawing/2014/main" id="{B156E089-0A03-4B29-938D-CAD7DD8A32FF}"/>
               </a:ext>
             </a:extLst>
           </p:cNvPr>
@@ -21078,7 +21330,7 @@
           <p:cNvPr id="62" name="Verbinder: gewinkelt 61">
             <a:extLst>
               <a:ext uri="{FF2B5EF4-FFF2-40B4-BE49-F238E27FC236}">
-                <a16:creationId xmlns:a16="http://schemas.microsoft.com/office/drawing/2014/main" xmlns="" id="{DEF7EEA7-1609-472E-8632-9AB35FE0595A}"/>
+                <a16:creationId xmlns="" xmlns:a16="http://schemas.microsoft.com/office/drawing/2014/main" id="{DEF7EEA7-1609-472E-8632-9AB35FE0595A}"/>
               </a:ext>
             </a:extLst>
           </p:cNvPr>
@@ -21125,7 +21377,7 @@
           <p:cNvPr id="64" name="Gerade Verbindung mit Pfeil 63">
             <a:extLst>
               <a:ext uri="{FF2B5EF4-FFF2-40B4-BE49-F238E27FC236}">
-                <a16:creationId xmlns:a16="http://schemas.microsoft.com/office/drawing/2014/main" xmlns="" id="{F3F9138E-22B1-41CD-B502-F19F637F0C54}"/>
+                <a16:creationId xmlns="" xmlns:a16="http://schemas.microsoft.com/office/drawing/2014/main" id="{F3F9138E-22B1-41CD-B502-F19F637F0C54}"/>
               </a:ext>
             </a:extLst>
           </p:cNvPr>
@@ -21172,7 +21424,7 @@
           <p:cNvPr id="66" name="Gerade Verbindung mit Pfeil 65">
             <a:extLst>
               <a:ext uri="{FF2B5EF4-FFF2-40B4-BE49-F238E27FC236}">
-                <a16:creationId xmlns:a16="http://schemas.microsoft.com/office/drawing/2014/main" xmlns="" id="{CC51581C-AA6A-4C49-A9F2-F1BE3BD0794A}"/>
+                <a16:creationId xmlns="" xmlns:a16="http://schemas.microsoft.com/office/drawing/2014/main" id="{CC51581C-AA6A-4C49-A9F2-F1BE3BD0794A}"/>
               </a:ext>
             </a:extLst>
           </p:cNvPr>
@@ -21216,7 +21468,7 @@
           <p:cNvPr id="68" name="Gerade Verbindung mit Pfeil 67">
             <a:extLst>
               <a:ext uri="{FF2B5EF4-FFF2-40B4-BE49-F238E27FC236}">
-                <a16:creationId xmlns:a16="http://schemas.microsoft.com/office/drawing/2014/main" xmlns="" id="{D74EFDDC-F45A-4A39-ABB6-DEC1AF1A13EB}"/>
+                <a16:creationId xmlns="" xmlns:a16="http://schemas.microsoft.com/office/drawing/2014/main" id="{D74EFDDC-F45A-4A39-ABB6-DEC1AF1A13EB}"/>
               </a:ext>
             </a:extLst>
           </p:cNvPr>
@@ -21261,7 +21513,7 @@
           <p:cNvPr id="77" name="Gerade Verbindung mit Pfeil 76">
             <a:extLst>
               <a:ext uri="{FF2B5EF4-FFF2-40B4-BE49-F238E27FC236}">
-                <a16:creationId xmlns:a16="http://schemas.microsoft.com/office/drawing/2014/main" xmlns="" id="{762E819D-8F2D-408C-B871-AFE9B9BD4758}"/>
+                <a16:creationId xmlns="" xmlns:a16="http://schemas.microsoft.com/office/drawing/2014/main" id="{762E819D-8F2D-408C-B871-AFE9B9BD4758}"/>
               </a:ext>
             </a:extLst>
           </p:cNvPr>
@@ -21306,7 +21558,7 @@
           <p:cNvPr id="84" name="Verbinder: gewinkelt 83">
             <a:extLst>
               <a:ext uri="{FF2B5EF4-FFF2-40B4-BE49-F238E27FC236}">
-                <a16:creationId xmlns:a16="http://schemas.microsoft.com/office/drawing/2014/main" xmlns="" id="{EAC92638-4F92-484D-9D68-76A311C79DB9}"/>
+                <a16:creationId xmlns="" xmlns:a16="http://schemas.microsoft.com/office/drawing/2014/main" id="{EAC92638-4F92-484D-9D68-76A311C79DB9}"/>
               </a:ext>
             </a:extLst>
           </p:cNvPr>
@@ -21350,7 +21602,7 @@
           <p:cNvPr id="89" name="Verbinder: gewinkelt 88">
             <a:extLst>
               <a:ext uri="{FF2B5EF4-FFF2-40B4-BE49-F238E27FC236}">
-                <a16:creationId xmlns:a16="http://schemas.microsoft.com/office/drawing/2014/main" xmlns="" id="{F6A8991C-54FD-4BC6-BBE4-E8FD6B443304}"/>
+                <a16:creationId xmlns="" xmlns:a16="http://schemas.microsoft.com/office/drawing/2014/main" id="{F6A8991C-54FD-4BC6-BBE4-E8FD6B443304}"/>
               </a:ext>
             </a:extLst>
           </p:cNvPr>
@@ -21396,7 +21648,7 @@
           <p:cNvPr id="94" name="Gerade Verbindung mit Pfeil 93">
             <a:extLst>
               <a:ext uri="{FF2B5EF4-FFF2-40B4-BE49-F238E27FC236}">
-                <a16:creationId xmlns:a16="http://schemas.microsoft.com/office/drawing/2014/main" xmlns="" id="{211FC14A-D98B-461D-AC7E-A1580AC3803D}"/>
+                <a16:creationId xmlns="" xmlns:a16="http://schemas.microsoft.com/office/drawing/2014/main" id="{211FC14A-D98B-461D-AC7E-A1580AC3803D}"/>
               </a:ext>
             </a:extLst>
           </p:cNvPr>
@@ -21441,7 +21693,7 @@
           <p:cNvPr id="106" name="Gerade Verbindung mit Pfeil 105">
             <a:extLst>
               <a:ext uri="{FF2B5EF4-FFF2-40B4-BE49-F238E27FC236}">
-                <a16:creationId xmlns:a16="http://schemas.microsoft.com/office/drawing/2014/main" xmlns="" id="{6456C598-7929-4E21-BDD5-5F2BBEF95CDE}"/>
+                <a16:creationId xmlns="" xmlns:a16="http://schemas.microsoft.com/office/drawing/2014/main" id="{6456C598-7929-4E21-BDD5-5F2BBEF95CDE}"/>
               </a:ext>
             </a:extLst>
           </p:cNvPr>
@@ -21485,7 +21737,7 @@
           <p:cNvPr id="112" name="Verbinder: gewinkelt 111">
             <a:extLst>
               <a:ext uri="{FF2B5EF4-FFF2-40B4-BE49-F238E27FC236}">
-                <a16:creationId xmlns:a16="http://schemas.microsoft.com/office/drawing/2014/main" xmlns="" id="{11754048-6F6B-4FE9-ACC8-B27B40CAB5B9}"/>
+                <a16:creationId xmlns="" xmlns:a16="http://schemas.microsoft.com/office/drawing/2014/main" id="{11754048-6F6B-4FE9-ACC8-B27B40CAB5B9}"/>
               </a:ext>
             </a:extLst>
           </p:cNvPr>
@@ -21531,7 +21783,7 @@
           <p:cNvPr id="115" name="Gerade Verbindung mit Pfeil 114">
             <a:extLst>
               <a:ext uri="{FF2B5EF4-FFF2-40B4-BE49-F238E27FC236}">
-                <a16:creationId xmlns:a16="http://schemas.microsoft.com/office/drawing/2014/main" xmlns="" id="{EB4D37A0-899A-4135-B446-D504B7B66BA1}"/>
+                <a16:creationId xmlns="" xmlns:a16="http://schemas.microsoft.com/office/drawing/2014/main" id="{EB4D37A0-899A-4135-B446-D504B7B66BA1}"/>
               </a:ext>
             </a:extLst>
           </p:cNvPr>
@@ -21576,7 +21828,7 @@
           <p:cNvPr id="120" name="Gerade Verbindung mit Pfeil 119">
             <a:extLst>
               <a:ext uri="{FF2B5EF4-FFF2-40B4-BE49-F238E27FC236}">
-                <a16:creationId xmlns:a16="http://schemas.microsoft.com/office/drawing/2014/main" xmlns="" id="{91801948-4FEA-4FDD-AF58-00FFB683304C}"/>
+                <a16:creationId xmlns="" xmlns:a16="http://schemas.microsoft.com/office/drawing/2014/main" id="{91801948-4FEA-4FDD-AF58-00FFB683304C}"/>
               </a:ext>
             </a:extLst>
           </p:cNvPr>
@@ -21620,7 +21872,7 @@
           <p:cNvPr id="125" name="Verbinder: gewinkelt 124">
             <a:extLst>
               <a:ext uri="{FF2B5EF4-FFF2-40B4-BE49-F238E27FC236}">
-                <a16:creationId xmlns:a16="http://schemas.microsoft.com/office/drawing/2014/main" xmlns="" id="{CA5402BA-A1E7-4E98-A3FC-1DADCE9EF67B}"/>
+                <a16:creationId xmlns="" xmlns:a16="http://schemas.microsoft.com/office/drawing/2014/main" id="{CA5402BA-A1E7-4E98-A3FC-1DADCE9EF67B}"/>
               </a:ext>
             </a:extLst>
           </p:cNvPr>
@@ -21666,7 +21918,7 @@
           <p:cNvPr id="132" name="Gerade Verbindung mit Pfeil 131">
             <a:extLst>
               <a:ext uri="{FF2B5EF4-FFF2-40B4-BE49-F238E27FC236}">
-                <a16:creationId xmlns:a16="http://schemas.microsoft.com/office/drawing/2014/main" xmlns="" id="{9F2F45A7-2831-470F-8445-96018BF8ACBF}"/>
+                <a16:creationId xmlns="" xmlns:a16="http://schemas.microsoft.com/office/drawing/2014/main" id="{9F2F45A7-2831-470F-8445-96018BF8ACBF}"/>
               </a:ext>
             </a:extLst>
           </p:cNvPr>
@@ -21710,7 +21962,7 @@
           <p:cNvPr id="136" name="Marcador de contenido 2">
             <a:extLst>
               <a:ext uri="{FF2B5EF4-FFF2-40B4-BE49-F238E27FC236}">
-                <a16:creationId xmlns:a16="http://schemas.microsoft.com/office/drawing/2014/main" xmlns="" id="{9E7F5DF6-DB42-477A-BCDB-54940BDE3B0D}"/>
+                <a16:creationId xmlns="" xmlns:a16="http://schemas.microsoft.com/office/drawing/2014/main" id="{9E7F5DF6-DB42-477A-BCDB-54940BDE3B0D}"/>
               </a:ext>
             </a:extLst>
           </p:cNvPr>
@@ -21913,7 +22165,7 @@
           <p:cNvPr id="137" name="Marcador de contenido 2">
             <a:extLst>
               <a:ext uri="{FF2B5EF4-FFF2-40B4-BE49-F238E27FC236}">
-                <a16:creationId xmlns:a16="http://schemas.microsoft.com/office/drawing/2014/main" xmlns="" id="{7B57F5B3-B11D-4773-ABA8-8E37D808C96E}"/>
+                <a16:creationId xmlns="" xmlns:a16="http://schemas.microsoft.com/office/drawing/2014/main" id="{7B57F5B3-B11D-4773-ABA8-8E37D808C96E}"/>
               </a:ext>
             </a:extLst>
           </p:cNvPr>
@@ -21976,7 +22228,7 @@
           <p:cNvPr id="140" name="Marcador de contenido 2">
             <a:extLst>
               <a:ext uri="{FF2B5EF4-FFF2-40B4-BE49-F238E27FC236}">
-                <a16:creationId xmlns:a16="http://schemas.microsoft.com/office/drawing/2014/main" xmlns="" id="{1B1D93A2-19D6-4A7B-83CA-E2306ADF6B29}"/>
+                <a16:creationId xmlns="" xmlns:a16="http://schemas.microsoft.com/office/drawing/2014/main" id="{1B1D93A2-19D6-4A7B-83CA-E2306ADF6B29}"/>
               </a:ext>
             </a:extLst>
           </p:cNvPr>
@@ -22212,7 +22464,7 @@
           <p:cNvPr id="144" name="Marcador de contenido 2">
             <a:extLst>
               <a:ext uri="{FF2B5EF4-FFF2-40B4-BE49-F238E27FC236}">
-                <a16:creationId xmlns:a16="http://schemas.microsoft.com/office/drawing/2014/main" xmlns="" id="{A9A917FF-0AC7-4D10-A980-6469F8FD6FA2}"/>
+                <a16:creationId xmlns="" xmlns:a16="http://schemas.microsoft.com/office/drawing/2014/main" id="{A9A917FF-0AC7-4D10-A980-6469F8FD6FA2}"/>
               </a:ext>
             </a:extLst>
           </p:cNvPr>
@@ -22448,7 +22700,7 @@
           <p:cNvPr id="146" name="Verbinder: gewinkelt 145">
             <a:extLst>
               <a:ext uri="{FF2B5EF4-FFF2-40B4-BE49-F238E27FC236}">
-                <a16:creationId xmlns:a16="http://schemas.microsoft.com/office/drawing/2014/main" xmlns="" id="{89313719-E4E4-48D9-AF45-2121C583856D}"/>
+                <a16:creationId xmlns="" xmlns:a16="http://schemas.microsoft.com/office/drawing/2014/main" id="{89313719-E4E4-48D9-AF45-2121C583856D}"/>
               </a:ext>
             </a:extLst>
           </p:cNvPr>
@@ -22492,7 +22744,7 @@
           <p:cNvPr id="149" name="Marcador de contenido 2">
             <a:extLst>
               <a:ext uri="{FF2B5EF4-FFF2-40B4-BE49-F238E27FC236}">
-                <a16:creationId xmlns:a16="http://schemas.microsoft.com/office/drawing/2014/main" xmlns="" id="{2B3DD6B4-9F02-4ECC-88CF-70B0A026EC38}"/>
+                <a16:creationId xmlns="" xmlns:a16="http://schemas.microsoft.com/office/drawing/2014/main" id="{2B3DD6B4-9F02-4ECC-88CF-70B0A026EC38}"/>
               </a:ext>
             </a:extLst>
           </p:cNvPr>
@@ -22720,7 +22972,7 @@
           <p:cNvPr id="3" name="Marcador de contenido 2">
             <a:extLst>
               <a:ext uri="{FF2B5EF4-FFF2-40B4-BE49-F238E27FC236}">
-                <a16:creationId xmlns:a16="http://schemas.microsoft.com/office/drawing/2014/main" xmlns="" id="{309DCB6A-B000-4AAF-8397-D5EAB2A61565}"/>
+                <a16:creationId xmlns="" xmlns:a16="http://schemas.microsoft.com/office/drawing/2014/main" id="{309DCB6A-B000-4AAF-8397-D5EAB2A61565}"/>
               </a:ext>
             </a:extLst>
           </p:cNvPr>
@@ -22947,7 +23199,7 @@
           <p:cNvPr id="4" name="Marcador de contenido 2">
             <a:extLst>
               <a:ext uri="{FF2B5EF4-FFF2-40B4-BE49-F238E27FC236}">
-                <a16:creationId xmlns:a16="http://schemas.microsoft.com/office/drawing/2014/main" xmlns="" id="{7F4154C4-7488-49F4-8E8F-ED198FE30F5A}"/>
+                <a16:creationId xmlns="" xmlns:a16="http://schemas.microsoft.com/office/drawing/2014/main" id="{7F4154C4-7488-49F4-8E8F-ED198FE30F5A}"/>
               </a:ext>
             </a:extLst>
           </p:cNvPr>
@@ -23198,7 +23450,7 @@
           <p:cNvPr id="11" name="Marcador de contenido 2">
             <a:extLst>
               <a:ext uri="{FF2B5EF4-FFF2-40B4-BE49-F238E27FC236}">
-                <a16:creationId xmlns:a16="http://schemas.microsoft.com/office/drawing/2014/main" xmlns="" id="{E7451AF3-B598-423C-915F-0F32771B3A10}"/>
+                <a16:creationId xmlns="" xmlns:a16="http://schemas.microsoft.com/office/drawing/2014/main" id="{E7451AF3-B598-423C-915F-0F32771B3A10}"/>
               </a:ext>
             </a:extLst>
           </p:cNvPr>
@@ -23434,7 +23686,7 @@
           <p:cNvPr id="14" name="Marcador de contenido 2">
             <a:extLst>
               <a:ext uri="{FF2B5EF4-FFF2-40B4-BE49-F238E27FC236}">
-                <a16:creationId xmlns:a16="http://schemas.microsoft.com/office/drawing/2014/main" xmlns="" id="{54EFD35A-3ECC-4C4F-9450-D32D942809E1}"/>
+                <a16:creationId xmlns="" xmlns:a16="http://schemas.microsoft.com/office/drawing/2014/main" id="{54EFD35A-3ECC-4C4F-9450-D32D942809E1}"/>
               </a:ext>
             </a:extLst>
           </p:cNvPr>
@@ -23661,7 +23913,7 @@
           <p:cNvPr id="16" name="Marcador de contenido 2">
             <a:extLst>
               <a:ext uri="{FF2B5EF4-FFF2-40B4-BE49-F238E27FC236}">
-                <a16:creationId xmlns:a16="http://schemas.microsoft.com/office/drawing/2014/main" xmlns="" id="{8E70CBE7-1859-4051-9307-E7A681B55F66}"/>
+                <a16:creationId xmlns="" xmlns:a16="http://schemas.microsoft.com/office/drawing/2014/main" id="{8E70CBE7-1859-4051-9307-E7A681B55F66}"/>
               </a:ext>
             </a:extLst>
           </p:cNvPr>
@@ -23896,7 +24148,7 @@
           <p:cNvPr id="31" name="Marcador de contenido 2">
             <a:extLst>
               <a:ext uri="{FF2B5EF4-FFF2-40B4-BE49-F238E27FC236}">
-                <a16:creationId xmlns:a16="http://schemas.microsoft.com/office/drawing/2014/main" xmlns="" id="{29748B47-B27C-480F-BE2A-C31E3BE2D44B}"/>
+                <a16:creationId xmlns="" xmlns:a16="http://schemas.microsoft.com/office/drawing/2014/main" id="{29748B47-B27C-480F-BE2A-C31E3BE2D44B}"/>
               </a:ext>
             </a:extLst>
           </p:cNvPr>
@@ -24131,7 +24383,7 @@
           <p:cNvPr id="20" name="Marcador de contenido 2">
             <a:extLst>
               <a:ext uri="{FF2B5EF4-FFF2-40B4-BE49-F238E27FC236}">
-                <a16:creationId xmlns:a16="http://schemas.microsoft.com/office/drawing/2014/main" xmlns="" id="{1315786D-D146-400B-B9F6-208743877097}"/>
+                <a16:creationId xmlns="" xmlns:a16="http://schemas.microsoft.com/office/drawing/2014/main" id="{1315786D-D146-400B-B9F6-208743877097}"/>
               </a:ext>
             </a:extLst>
           </p:cNvPr>
@@ -24370,7 +24622,7 @@
           <p:cNvPr id="7" name="Rectángulo 7">
             <a:extLst>
               <a:ext uri="{FF2B5EF4-FFF2-40B4-BE49-F238E27FC236}">
-                <a16:creationId xmlns:a16="http://schemas.microsoft.com/office/drawing/2014/main" xmlns="" id="{1F0890FE-F9FE-453E-92EA-6F6CDB43F4C1}"/>
+                <a16:creationId xmlns="" xmlns:a16="http://schemas.microsoft.com/office/drawing/2014/main" id="{1F0890FE-F9FE-453E-92EA-6F6CDB43F4C1}"/>
               </a:ext>
             </a:extLst>
           </p:cNvPr>
@@ -24442,7 +24694,7 @@
           <p:cNvPr id="23" name="Rectángulo 7">
             <a:extLst>
               <a:ext uri="{FF2B5EF4-FFF2-40B4-BE49-F238E27FC236}">
-                <a16:creationId xmlns:a16="http://schemas.microsoft.com/office/drawing/2014/main" xmlns="" id="{A11A2109-062E-4812-927D-38C165E290A1}"/>
+                <a16:creationId xmlns="" xmlns:a16="http://schemas.microsoft.com/office/drawing/2014/main" id="{A11A2109-062E-4812-927D-38C165E290A1}"/>
               </a:ext>
             </a:extLst>
           </p:cNvPr>
@@ -24535,7 +24787,7 @@
           <p:cNvPr id="5" name="Rectángulo 7">
             <a:extLst>
               <a:ext uri="{FF2B5EF4-FFF2-40B4-BE49-F238E27FC236}">
-                <a16:creationId xmlns:a16="http://schemas.microsoft.com/office/drawing/2014/main" xmlns="" id="{1ECC8163-F603-4099-B707-80E03D2D2A6B}"/>
+                <a16:creationId xmlns="" xmlns:a16="http://schemas.microsoft.com/office/drawing/2014/main" id="{1ECC8163-F603-4099-B707-80E03D2D2A6B}"/>
               </a:ext>
             </a:extLst>
           </p:cNvPr>
@@ -24730,7 +24982,7 @@
           <p:cNvPr id="21" name="Rectángulo 7">
             <a:extLst>
               <a:ext uri="{FF2B5EF4-FFF2-40B4-BE49-F238E27FC236}">
-                <a16:creationId xmlns:a16="http://schemas.microsoft.com/office/drawing/2014/main" xmlns="" id="{D89BC219-78D8-48A1-9D78-97F58D16063A}"/>
+                <a16:creationId xmlns="" xmlns:a16="http://schemas.microsoft.com/office/drawing/2014/main" id="{D89BC219-78D8-48A1-9D78-97F58D16063A}"/>
               </a:ext>
             </a:extLst>
           </p:cNvPr>
@@ -24791,7 +25043,7 @@
           <p:cNvPr id="136" name="Marcador de contenido 2">
             <a:extLst>
               <a:ext uri="{FF2B5EF4-FFF2-40B4-BE49-F238E27FC236}">
-                <a16:creationId xmlns:a16="http://schemas.microsoft.com/office/drawing/2014/main" xmlns="" id="{9E7F5DF6-DB42-477A-BCDB-54940BDE3B0D}"/>
+                <a16:creationId xmlns="" xmlns:a16="http://schemas.microsoft.com/office/drawing/2014/main" id="{9E7F5DF6-DB42-477A-BCDB-54940BDE3B0D}"/>
               </a:ext>
             </a:extLst>
           </p:cNvPr>
@@ -24994,7 +25246,7 @@
           <p:cNvPr id="52" name="Rectángulo 7">
             <a:extLst>
               <a:ext uri="{FF2B5EF4-FFF2-40B4-BE49-F238E27FC236}">
-                <a16:creationId xmlns:a16="http://schemas.microsoft.com/office/drawing/2014/main" xmlns="" id="{D89BC219-78D8-48A1-9D78-97F58D16063A}"/>
+                <a16:creationId xmlns="" xmlns:a16="http://schemas.microsoft.com/office/drawing/2014/main" id="{D89BC219-78D8-48A1-9D78-97F58D16063A}"/>
               </a:ext>
             </a:extLst>
           </p:cNvPr>
@@ -25055,7 +25307,7 @@
           <p:cNvPr id="53" name="Rectángulo 7">
             <a:extLst>
               <a:ext uri="{FF2B5EF4-FFF2-40B4-BE49-F238E27FC236}">
-                <a16:creationId xmlns:a16="http://schemas.microsoft.com/office/drawing/2014/main" xmlns="" id="{D89BC219-78D8-48A1-9D78-97F58D16063A}"/>
+                <a16:creationId xmlns="" xmlns:a16="http://schemas.microsoft.com/office/drawing/2014/main" id="{D89BC219-78D8-48A1-9D78-97F58D16063A}"/>
               </a:ext>
             </a:extLst>
           </p:cNvPr>
@@ -25116,7 +25368,7 @@
           <p:cNvPr id="54" name="Rectángulo 7">
             <a:extLst>
               <a:ext uri="{FF2B5EF4-FFF2-40B4-BE49-F238E27FC236}">
-                <a16:creationId xmlns:a16="http://schemas.microsoft.com/office/drawing/2014/main" xmlns="" id="{D89BC219-78D8-48A1-9D78-97F58D16063A}"/>
+                <a16:creationId xmlns="" xmlns:a16="http://schemas.microsoft.com/office/drawing/2014/main" id="{D89BC219-78D8-48A1-9D78-97F58D16063A}"/>
               </a:ext>
             </a:extLst>
           </p:cNvPr>
@@ -25177,7 +25429,7 @@
           <p:cNvPr id="55" name="Rectángulo 7">
             <a:extLst>
               <a:ext uri="{FF2B5EF4-FFF2-40B4-BE49-F238E27FC236}">
-                <a16:creationId xmlns:a16="http://schemas.microsoft.com/office/drawing/2014/main" xmlns="" id="{D89BC219-78D8-48A1-9D78-97F58D16063A}"/>
+                <a16:creationId xmlns="" xmlns:a16="http://schemas.microsoft.com/office/drawing/2014/main" id="{D89BC219-78D8-48A1-9D78-97F58D16063A}"/>
               </a:ext>
             </a:extLst>
           </p:cNvPr>
@@ -25708,7 +25960,7 @@
           <p:cNvPr id="157" name="Marcador de contenido 2">
             <a:extLst>
               <a:ext uri="{FF2B5EF4-FFF2-40B4-BE49-F238E27FC236}">
-                <a16:creationId xmlns:a16="http://schemas.microsoft.com/office/drawing/2014/main" xmlns="" id="{A9A917FF-0AC7-4D10-A980-6469F8FD6FA2}"/>
+                <a16:creationId xmlns="" xmlns:a16="http://schemas.microsoft.com/office/drawing/2014/main" id="{A9A917FF-0AC7-4D10-A980-6469F8FD6FA2}"/>
               </a:ext>
             </a:extLst>
           </p:cNvPr>
@@ -25997,7 +26249,7 @@
           <p:cNvPr id="158" name="Marcador de contenido 2">
             <a:extLst>
               <a:ext uri="{FF2B5EF4-FFF2-40B4-BE49-F238E27FC236}">
-                <a16:creationId xmlns:a16="http://schemas.microsoft.com/office/drawing/2014/main" xmlns="" id="{E7451AF3-B598-423C-915F-0F32771B3A10}"/>
+                <a16:creationId xmlns="" xmlns:a16="http://schemas.microsoft.com/office/drawing/2014/main" id="{E7451AF3-B598-423C-915F-0F32771B3A10}"/>
               </a:ext>
             </a:extLst>
           </p:cNvPr>
@@ -26272,7 +26524,7 @@
           <p:cNvPr id="103" name="Rectángulo 7">
             <a:extLst>
               <a:ext uri="{FF2B5EF4-FFF2-40B4-BE49-F238E27FC236}">
-                <a16:creationId xmlns:a16="http://schemas.microsoft.com/office/drawing/2014/main" xmlns="" id="{D89BC219-78D8-48A1-9D78-97F58D16063A}"/>
+                <a16:creationId xmlns="" xmlns:a16="http://schemas.microsoft.com/office/drawing/2014/main" id="{D89BC219-78D8-48A1-9D78-97F58D16063A}"/>
               </a:ext>
             </a:extLst>
           </p:cNvPr>
@@ -26370,7 +26622,7 @@
           <p:cNvPr id="5" name="Rectángulo 7">
             <a:extLst>
               <a:ext uri="{FF2B5EF4-FFF2-40B4-BE49-F238E27FC236}">
-                <a16:creationId xmlns:a16="http://schemas.microsoft.com/office/drawing/2014/main" xmlns="" id="{1ECC8163-F603-4099-B707-80E03D2D2A6B}"/>
+                <a16:creationId xmlns="" xmlns:a16="http://schemas.microsoft.com/office/drawing/2014/main" id="{1ECC8163-F603-4099-B707-80E03D2D2A6B}"/>
               </a:ext>
             </a:extLst>
           </p:cNvPr>
@@ -26524,7 +26776,7 @@
           <p:cNvPr id="47" name="Gerade Verbindung mit Pfeil 46">
             <a:extLst>
               <a:ext uri="{FF2B5EF4-FFF2-40B4-BE49-F238E27FC236}">
-                <a16:creationId xmlns:a16="http://schemas.microsoft.com/office/drawing/2014/main" xmlns="" id="{BB85F613-CED4-4663-9529-33358615403B}"/>
+                <a16:creationId xmlns="" xmlns:a16="http://schemas.microsoft.com/office/drawing/2014/main" id="{BB85F613-CED4-4663-9529-33358615403B}"/>
               </a:ext>
             </a:extLst>
           </p:cNvPr>
@@ -26571,7 +26823,7 @@
           <p:cNvPr id="136" name="Marcador de contenido 2">
             <a:extLst>
               <a:ext uri="{FF2B5EF4-FFF2-40B4-BE49-F238E27FC236}">
-                <a16:creationId xmlns:a16="http://schemas.microsoft.com/office/drawing/2014/main" xmlns="" id="{9E7F5DF6-DB42-477A-BCDB-54940BDE3B0D}"/>
+                <a16:creationId xmlns="" xmlns:a16="http://schemas.microsoft.com/office/drawing/2014/main" id="{9E7F5DF6-DB42-477A-BCDB-54940BDE3B0D}"/>
               </a:ext>
             </a:extLst>
           </p:cNvPr>
@@ -26774,7 +27026,7 @@
           <p:cNvPr id="3" name="Marcador de contenido 2">
             <a:extLst>
               <a:ext uri="{FF2B5EF4-FFF2-40B4-BE49-F238E27FC236}">
-                <a16:creationId xmlns:a16="http://schemas.microsoft.com/office/drawing/2014/main" xmlns="" id="{309DCB6A-B000-4AAF-8397-D5EAB2A61565}"/>
+                <a16:creationId xmlns="" xmlns:a16="http://schemas.microsoft.com/office/drawing/2014/main" id="{309DCB6A-B000-4AAF-8397-D5EAB2A61565}"/>
               </a:ext>
             </a:extLst>
           </p:cNvPr>
@@ -27001,7 +27253,7 @@
           <p:cNvPr id="11" name="Marcador de contenido 2">
             <a:extLst>
               <a:ext uri="{FF2B5EF4-FFF2-40B4-BE49-F238E27FC236}">
-                <a16:creationId xmlns:a16="http://schemas.microsoft.com/office/drawing/2014/main" xmlns="" id="{E7451AF3-B598-423C-915F-0F32771B3A10}"/>
+                <a16:creationId xmlns="" xmlns:a16="http://schemas.microsoft.com/office/drawing/2014/main" id="{E7451AF3-B598-423C-915F-0F32771B3A10}"/>
               </a:ext>
             </a:extLst>
           </p:cNvPr>
@@ -27237,7 +27489,7 @@
           <p:cNvPr id="20" name="Marcador de contenido 2">
             <a:extLst>
               <a:ext uri="{FF2B5EF4-FFF2-40B4-BE49-F238E27FC236}">
-                <a16:creationId xmlns:a16="http://schemas.microsoft.com/office/drawing/2014/main" xmlns="" id="{1315786D-D146-400B-B9F6-208743877097}"/>
+                <a16:creationId xmlns="" xmlns:a16="http://schemas.microsoft.com/office/drawing/2014/main" id="{1315786D-D146-400B-B9F6-208743877097}"/>
               </a:ext>
             </a:extLst>
           </p:cNvPr>
@@ -27660,7 +27912,7 @@
           <p:cNvPr id="75" name="Rectángulo 7">
             <a:extLst>
               <a:ext uri="{FF2B5EF4-FFF2-40B4-BE49-F238E27FC236}">
-                <a16:creationId xmlns:a16="http://schemas.microsoft.com/office/drawing/2014/main" xmlns="" id="{D89BC219-78D8-48A1-9D78-97F58D16063A}"/>
+                <a16:creationId xmlns="" xmlns:a16="http://schemas.microsoft.com/office/drawing/2014/main" id="{D89BC219-78D8-48A1-9D78-97F58D16063A}"/>
               </a:ext>
             </a:extLst>
           </p:cNvPr>
@@ -27833,7 +28085,7 @@
           <p:cNvPr id="56" name="Rectángulo 7">
             <a:extLst>
               <a:ext uri="{FF2B5EF4-FFF2-40B4-BE49-F238E27FC236}">
-                <a16:creationId xmlns:a16="http://schemas.microsoft.com/office/drawing/2014/main" xmlns="" id="{D89BC219-78D8-48A1-9D78-97F58D16063A}"/>
+                <a16:creationId xmlns="" xmlns:a16="http://schemas.microsoft.com/office/drawing/2014/main" id="{D89BC219-78D8-48A1-9D78-97F58D16063A}"/>
               </a:ext>
             </a:extLst>
           </p:cNvPr>
@@ -28090,7 +28342,7 @@
           <p:cNvPr id="127" name="Marcador de contenido 2">
             <a:extLst>
               <a:ext uri="{FF2B5EF4-FFF2-40B4-BE49-F238E27FC236}">
-                <a16:creationId xmlns:a16="http://schemas.microsoft.com/office/drawing/2014/main" xmlns="" id="{A9A917FF-0AC7-4D10-A980-6469F8FD6FA2}"/>
+                <a16:creationId xmlns="" xmlns:a16="http://schemas.microsoft.com/office/drawing/2014/main" id="{A9A917FF-0AC7-4D10-A980-6469F8FD6FA2}"/>
               </a:ext>
             </a:extLst>
           </p:cNvPr>
@@ -28577,7 +28829,7 @@
           <p:cNvPr id="138" name="Marcador de contenido 2">
             <a:extLst>
               <a:ext uri="{FF2B5EF4-FFF2-40B4-BE49-F238E27FC236}">
-                <a16:creationId xmlns:a16="http://schemas.microsoft.com/office/drawing/2014/main" xmlns="" id="{A9A917FF-0AC7-4D10-A980-6469F8FD6FA2}"/>
+                <a16:creationId xmlns="" xmlns:a16="http://schemas.microsoft.com/office/drawing/2014/main" id="{A9A917FF-0AC7-4D10-A980-6469F8FD6FA2}"/>
               </a:ext>
             </a:extLst>
           </p:cNvPr>
@@ -28876,7 +29128,7 @@
           <p:cNvPr id="5" name="Rectángulo 7">
             <a:extLst>
               <a:ext uri="{FF2B5EF4-FFF2-40B4-BE49-F238E27FC236}">
-                <a16:creationId xmlns:a16="http://schemas.microsoft.com/office/drawing/2014/main" xmlns="" id="{1ECC8163-F603-4099-B707-80E03D2D2A6B}"/>
+                <a16:creationId xmlns="" xmlns:a16="http://schemas.microsoft.com/office/drawing/2014/main" id="{1ECC8163-F603-4099-B707-80E03D2D2A6B}"/>
               </a:ext>
             </a:extLst>
           </p:cNvPr>
@@ -29038,7 +29290,7 @@
           <p:cNvPr id="47" name="Gerade Verbindung mit Pfeil 46">
             <a:extLst>
               <a:ext uri="{FF2B5EF4-FFF2-40B4-BE49-F238E27FC236}">
-                <a16:creationId xmlns:a16="http://schemas.microsoft.com/office/drawing/2014/main" xmlns="" id="{BB85F613-CED4-4663-9529-33358615403B}"/>
+                <a16:creationId xmlns="" xmlns:a16="http://schemas.microsoft.com/office/drawing/2014/main" id="{BB85F613-CED4-4663-9529-33358615403B}"/>
               </a:ext>
             </a:extLst>
           </p:cNvPr>
@@ -29082,7 +29334,7 @@
           <p:cNvPr id="136" name="Marcador de contenido 2">
             <a:extLst>
               <a:ext uri="{FF2B5EF4-FFF2-40B4-BE49-F238E27FC236}">
-                <a16:creationId xmlns:a16="http://schemas.microsoft.com/office/drawing/2014/main" xmlns="" id="{9E7F5DF6-DB42-477A-BCDB-54940BDE3B0D}"/>
+                <a16:creationId xmlns="" xmlns:a16="http://schemas.microsoft.com/office/drawing/2014/main" id="{9E7F5DF6-DB42-477A-BCDB-54940BDE3B0D}"/>
               </a:ext>
             </a:extLst>
           </p:cNvPr>
@@ -29340,7 +29592,7 @@
           <p:cNvPr id="42" name="Marcador de contenido 2">
             <a:extLst>
               <a:ext uri="{FF2B5EF4-FFF2-40B4-BE49-F238E27FC236}">
-                <a16:creationId xmlns:a16="http://schemas.microsoft.com/office/drawing/2014/main" xmlns="" id="{54EFD35A-3ECC-4C4F-9450-D32D942809E1}"/>
+                <a16:creationId xmlns="" xmlns:a16="http://schemas.microsoft.com/office/drawing/2014/main" id="{54EFD35A-3ECC-4C4F-9450-D32D942809E1}"/>
               </a:ext>
             </a:extLst>
           </p:cNvPr>
@@ -29551,7 +29803,7 @@
           <p:cNvPr id="193" name="Gerade Verbindung mit Pfeil 46">
             <a:extLst>
               <a:ext uri="{FF2B5EF4-FFF2-40B4-BE49-F238E27FC236}">
-                <a16:creationId xmlns:a16="http://schemas.microsoft.com/office/drawing/2014/main" xmlns="" id="{BB85F613-CED4-4663-9529-33358615403B}"/>
+                <a16:creationId xmlns="" xmlns:a16="http://schemas.microsoft.com/office/drawing/2014/main" id="{BB85F613-CED4-4663-9529-33358615403B}"/>
               </a:ext>
             </a:extLst>
           </p:cNvPr>
@@ -30118,7 +30370,7 @@
           <p:cNvPr id="90" name="Marcador de contenido 2">
             <a:extLst>
               <a:ext uri="{FF2B5EF4-FFF2-40B4-BE49-F238E27FC236}">
-                <a16:creationId xmlns:a16="http://schemas.microsoft.com/office/drawing/2014/main" xmlns="" id="{309DCB6A-B000-4AAF-8397-D5EAB2A61565}"/>
+                <a16:creationId xmlns="" xmlns:a16="http://schemas.microsoft.com/office/drawing/2014/main" id="{309DCB6A-B000-4AAF-8397-D5EAB2A61565}"/>
               </a:ext>
             </a:extLst>
           </p:cNvPr>
@@ -30345,7 +30597,7 @@
           <p:cNvPr id="91" name="Marcador de contenido 2">
             <a:extLst>
               <a:ext uri="{FF2B5EF4-FFF2-40B4-BE49-F238E27FC236}">
-                <a16:creationId xmlns:a16="http://schemas.microsoft.com/office/drawing/2014/main" xmlns="" id="{E7451AF3-B598-423C-915F-0F32771B3A10}"/>
+                <a16:creationId xmlns="" xmlns:a16="http://schemas.microsoft.com/office/drawing/2014/main" id="{E7451AF3-B598-423C-915F-0F32771B3A10}"/>
               </a:ext>
             </a:extLst>
           </p:cNvPr>
@@ -30581,7 +30833,7 @@
           <p:cNvPr id="92" name="Gerade Verbindung mit Pfeil 46">
             <a:extLst>
               <a:ext uri="{FF2B5EF4-FFF2-40B4-BE49-F238E27FC236}">
-                <a16:creationId xmlns:a16="http://schemas.microsoft.com/office/drawing/2014/main" xmlns="" id="{BB85F613-CED4-4663-9529-33358615403B}"/>
+                <a16:creationId xmlns="" xmlns:a16="http://schemas.microsoft.com/office/drawing/2014/main" id="{BB85F613-CED4-4663-9529-33358615403B}"/>
               </a:ext>
             </a:extLst>
           </p:cNvPr>

</xml_diff>